<commit_message>
Charges and Fields done
- Ready for figure update, student opinions, end of chapter activities, formula sheet.
</commit_message>
<xml_diff>
--- a/tex/figures/ChargesFields/Figures.pptx
+++ b/tex/figures/ChargesFields/Figures.pptx
@@ -6242,6 +6242,519 @@
             </a:fontRef>
           </p:style>
         </p:cxnSp>
+      </p:grpSp>
+      <p:grpSp>
+        <p:nvGrpSpPr>
+          <p:cNvPr id="80" name="Group 79"/>
+          <p:cNvGrpSpPr/>
+          <p:nvPr/>
+        </p:nvGrpSpPr>
+        <p:grpSpPr>
+          <a:xfrm>
+            <a:off x="6303462" y="1500637"/>
+            <a:ext cx="983624" cy="709995"/>
+            <a:chOff x="8248391" y="2564515"/>
+            <a:chExt cx="983624" cy="709995"/>
+          </a:xfrm>
+        </p:grpSpPr>
+        <p:grpSp>
+          <p:nvGrpSpPr>
+            <p:cNvPr id="81" name="Group 80"/>
+            <p:cNvGrpSpPr/>
+            <p:nvPr/>
+          </p:nvGrpSpPr>
+          <p:grpSpPr>
+            <a:xfrm>
+              <a:off x="8248391" y="2564515"/>
+              <a:ext cx="888156" cy="709995"/>
+              <a:chOff x="758520" y="708040"/>
+              <a:chExt cx="2565390" cy="2135605"/>
+            </a:xfrm>
+          </p:grpSpPr>
+          <p:grpSp>
+            <p:nvGrpSpPr>
+              <p:cNvPr id="84" name="Group 83"/>
+              <p:cNvGrpSpPr/>
+              <p:nvPr/>
+            </p:nvGrpSpPr>
+            <p:grpSpPr>
+              <a:xfrm>
+                <a:off x="758520" y="708040"/>
+                <a:ext cx="2565390" cy="2135605"/>
+                <a:chOff x="785815" y="680744"/>
+                <a:chExt cx="2565390" cy="2135605"/>
+              </a:xfrm>
+            </p:grpSpPr>
+            <p:cxnSp>
+              <p:nvCxnSpPr>
+                <p:cNvPr id="86" name="Straight Arrow Connector 85"/>
+                <p:cNvCxnSpPr/>
+                <p:nvPr/>
+              </p:nvCxnSpPr>
+              <p:spPr>
+                <a:xfrm flipV="1">
+                  <a:off x="1516583" y="680744"/>
+                  <a:ext cx="7683" cy="1859535"/>
+                </a:xfrm>
+                <a:prstGeom prst="straightConnector1">
+                  <a:avLst/>
+                </a:prstGeom>
+                <a:ln w="38100">
+                  <a:solidFill>
+                    <a:schemeClr val="tx1"/>
+                  </a:solidFill>
+                  <a:tailEnd type="triangle"/>
+                </a:ln>
+              </p:spPr>
+              <p:style>
+                <a:lnRef idx="1">
+                  <a:schemeClr val="accent1"/>
+                </a:lnRef>
+                <a:fillRef idx="0">
+                  <a:schemeClr val="accent1"/>
+                </a:fillRef>
+                <a:effectRef idx="0">
+                  <a:schemeClr val="accent1"/>
+                </a:effectRef>
+                <a:fontRef idx="minor">
+                  <a:schemeClr val="tx1"/>
+                </a:fontRef>
+              </p:style>
+            </p:cxnSp>
+            <p:cxnSp>
+              <p:nvCxnSpPr>
+                <p:cNvPr id="87" name="Straight Arrow Connector 86"/>
+                <p:cNvCxnSpPr/>
+                <p:nvPr/>
+              </p:nvCxnSpPr>
+              <p:spPr>
+                <a:xfrm flipV="1">
+                  <a:off x="1476301" y="2503276"/>
+                  <a:ext cx="1874904" cy="0"/>
+                </a:xfrm>
+                <a:prstGeom prst="straightConnector1">
+                  <a:avLst/>
+                </a:prstGeom>
+                <a:ln w="38100">
+                  <a:solidFill>
+                    <a:schemeClr val="tx1"/>
+                  </a:solidFill>
+                  <a:tailEnd type="triangle"/>
+                </a:ln>
+              </p:spPr>
+              <p:style>
+                <a:lnRef idx="1">
+                  <a:schemeClr val="accent1"/>
+                </a:lnRef>
+                <a:fillRef idx="0">
+                  <a:schemeClr val="accent1"/>
+                </a:fillRef>
+                <a:effectRef idx="0">
+                  <a:schemeClr val="accent1"/>
+                </a:effectRef>
+                <a:fontRef idx="minor">
+                  <a:schemeClr val="tx1"/>
+                </a:fontRef>
+              </p:style>
+            </p:cxnSp>
+            <mc:AlternateContent xmlns:mc="http://schemas.openxmlformats.org/markup-compatibility/2006" xmlns:a14="http://schemas.microsoft.com/office/drawing/2010/main">
+              <mc:Choice Requires="a14">
+                <p:sp>
+                  <p:nvSpPr>
+                    <p:cNvPr id="88" name="Rectangle 87"/>
+                    <p:cNvSpPr/>
+                    <p:nvPr/>
+                  </p:nvSpPr>
+                  <p:spPr>
+                    <a:xfrm>
+                      <a:off x="2697555" y="2447016"/>
+                      <a:ext cx="367985" cy="369333"/>
+                    </a:xfrm>
+                    <a:prstGeom prst="rect">
+                      <a:avLst/>
+                    </a:prstGeom>
+                  </p:spPr>
+                  <p:txBody>
+                    <a:bodyPr wrap="none">
+                      <a:spAutoFit/>
+                    </a:bodyPr>
+                    <a:lstStyle/>
+                    <a:p>
+                      <a:pPr/>
+                      <a14:m>
+                        <m:oMathPara xmlns:m="http://schemas.openxmlformats.org/officeDocument/2006/math">
+                          <m:oMathParaPr>
+                            <m:jc m:val="centerGroup"/>
+                          </m:oMathParaPr>
+                          <m:oMath xmlns:m="http://schemas.openxmlformats.org/officeDocument/2006/math">
+                            <m:r>
+                              <a:rPr lang="en-US" i="1">
+                                <a:latin typeface="Cambria Math" panose="02040503050406030204" pitchFamily="18" charset="0"/>
+                                <a:cs typeface="Arial" panose="020B0604020202020204" pitchFamily="34" charset="0"/>
+                              </a:rPr>
+                              <m:t>𝑥</m:t>
+                            </m:r>
+                          </m:oMath>
+                        </m:oMathPara>
+                      </a14:m>
+                      <a:endParaRPr lang="en-CA" dirty="0"/>
+                    </a:p>
+                  </p:txBody>
+                </p:sp>
+              </mc:Choice>
+              <mc:Fallback xmlns="">
+                <p:sp>
+                  <p:nvSpPr>
+                    <p:cNvPr id="107" name="Rectangle 106"/>
+                    <p:cNvSpPr>
+                      <a:spLocks noRot="1" noChangeAspect="1" noMove="1" noResize="1" noEditPoints="1" noAdjustHandles="1" noChangeArrowheads="1" noChangeShapeType="1" noTextEdit="1"/>
+                    </p:cNvSpPr>
+                    <p:nvPr/>
+                  </p:nvSpPr>
+                  <p:spPr>
+                    <a:xfrm>
+                      <a:off x="2697555" y="2447016"/>
+                      <a:ext cx="367985" cy="369333"/>
+                    </a:xfrm>
+                    <a:prstGeom prst="rect">
+                      <a:avLst/>
+                    </a:prstGeom>
+                    <a:blipFill>
+                      <a:blip r:embed="rId27"/>
+                      <a:stretch>
+                        <a:fillRect r="-95238" b="-160000"/>
+                      </a:stretch>
+                    </a:blipFill>
+                  </p:spPr>
+                  <p:txBody>
+                    <a:bodyPr/>
+                    <a:lstStyle/>
+                    <a:p>
+                      <a:r>
+                        <a:rPr lang="en-US">
+                          <a:noFill/>
+                        </a:rPr>
+                        <a:t> </a:t>
+                      </a:r>
+                    </a:p>
+                  </p:txBody>
+                </p:sp>
+              </mc:Fallback>
+            </mc:AlternateContent>
+            <mc:AlternateContent xmlns:mc="http://schemas.openxmlformats.org/markup-compatibility/2006">
+              <mc:Choice xmlns:a14="http://schemas.microsoft.com/office/drawing/2010/main" Requires="a14">
+                <p:sp>
+                  <p:nvSpPr>
+                    <p:cNvPr id="89" name="Rectangle 88"/>
+                    <p:cNvSpPr/>
+                    <p:nvPr/>
+                  </p:nvSpPr>
+                  <p:spPr>
+                    <a:xfrm>
+                      <a:off x="785815" y="912420"/>
+                      <a:ext cx="1021790" cy="1110919"/>
+                    </a:xfrm>
+                    <a:prstGeom prst="rect">
+                      <a:avLst/>
+                    </a:prstGeom>
+                  </p:spPr>
+                  <p:txBody>
+                    <a:bodyPr wrap="none">
+                      <a:spAutoFit/>
+                    </a:bodyPr>
+                    <a:lstStyle/>
+                    <a:p>
+                      <a:pPr/>
+                      <a14:m>
+                        <m:oMathPara xmlns:m="http://schemas.openxmlformats.org/officeDocument/2006/math">
+                          <m:oMathParaPr>
+                            <m:jc m:val="centerGroup"/>
+                          </m:oMathParaPr>
+                          <m:oMath xmlns:m="http://schemas.openxmlformats.org/officeDocument/2006/math">
+                            <m:r>
+                              <a:rPr lang="en-US" b="0" i="1" smtClean="0">
+                                <a:latin typeface="Cambria Math" panose="02040503050406030204" pitchFamily="18" charset="0"/>
+                              </a:rPr>
+                              <m:t>𝑧</m:t>
+                            </m:r>
+                          </m:oMath>
+                        </m:oMathPara>
+                      </a14:m>
+                      <a:endParaRPr lang="en-CA" dirty="0"/>
+                    </a:p>
+                  </p:txBody>
+                </p:sp>
+              </mc:Choice>
+              <mc:Fallback>
+                <p:sp>
+                  <p:nvSpPr>
+                    <p:cNvPr id="89" name="Rectangle 88"/>
+                    <p:cNvSpPr>
+                      <a:spLocks noRot="1" noChangeAspect="1" noMove="1" noResize="1" noEditPoints="1" noAdjustHandles="1" noChangeArrowheads="1" noChangeShapeType="1" noTextEdit="1"/>
+                    </p:cNvSpPr>
+                    <p:nvPr/>
+                  </p:nvSpPr>
+                  <p:spPr>
+                    <a:xfrm>
+                      <a:off x="785815" y="912420"/>
+                      <a:ext cx="1021790" cy="1110919"/>
+                    </a:xfrm>
+                    <a:prstGeom prst="rect">
+                      <a:avLst/>
+                    </a:prstGeom>
+                    <a:blipFill>
+                      <a:blip r:embed="rId32"/>
+                      <a:stretch>
+                        <a:fillRect/>
+                      </a:stretch>
+                    </a:blipFill>
+                  </p:spPr>
+                  <p:txBody>
+                    <a:bodyPr/>
+                    <a:lstStyle/>
+                    <a:p>
+                      <a:r>
+                        <a:rPr lang="en-US">
+                          <a:noFill/>
+                        </a:rPr>
+                        <a:t> </a:t>
+                      </a:r>
+                    </a:p>
+                  </p:txBody>
+                </p:sp>
+              </mc:Fallback>
+            </mc:AlternateContent>
+            <mc:AlternateContent xmlns:mc="http://schemas.openxmlformats.org/markup-compatibility/2006" xmlns:a14="http://schemas.microsoft.com/office/drawing/2010/main">
+              <mc:Choice Requires="a14">
+                <p:sp>
+                  <p:nvSpPr>
+                    <p:cNvPr id="90" name="Rectangle 89"/>
+                    <p:cNvSpPr/>
+                    <p:nvPr/>
+                  </p:nvSpPr>
+                  <p:spPr>
+                    <a:xfrm>
+                      <a:off x="1006642" y="2350591"/>
+                      <a:ext cx="367985" cy="369333"/>
+                    </a:xfrm>
+                    <a:prstGeom prst="rect">
+                      <a:avLst/>
+                    </a:prstGeom>
+                  </p:spPr>
+                  <p:txBody>
+                    <a:bodyPr wrap="none">
+                      <a:spAutoFit/>
+                    </a:bodyPr>
+                    <a:lstStyle/>
+                    <a:p>
+                      <a:pPr/>
+                      <a14:m>
+                        <m:oMathPara xmlns:m="http://schemas.openxmlformats.org/officeDocument/2006/math">
+                          <m:oMathParaPr>
+                            <m:jc m:val="centerGroup"/>
+                          </m:oMathParaPr>
+                          <m:oMath xmlns:m="http://schemas.openxmlformats.org/officeDocument/2006/math">
+                            <m:r>
+                              <a:rPr lang="en-US" b="0" i="1" smtClean="0">
+                                <a:latin typeface="Cambria Math" panose="02040503050406030204" pitchFamily="18" charset="0"/>
+                                <a:cs typeface="Arial" panose="020B0604020202020204" pitchFamily="34" charset="0"/>
+                              </a:rPr>
+                              <m:t>0</m:t>
+                            </m:r>
+                          </m:oMath>
+                        </m:oMathPara>
+                      </a14:m>
+                      <a:endParaRPr lang="en-CA" dirty="0"/>
+                    </a:p>
+                  </p:txBody>
+                </p:sp>
+              </mc:Choice>
+              <mc:Fallback xmlns="">
+                <p:sp>
+                  <p:nvSpPr>
+                    <p:cNvPr id="109" name="Rectangle 108"/>
+                    <p:cNvSpPr>
+                      <a:spLocks noRot="1" noChangeAspect="1" noMove="1" noResize="1" noEditPoints="1" noAdjustHandles="1" noChangeArrowheads="1" noChangeShapeType="1" noTextEdit="1"/>
+                    </p:cNvSpPr>
+                    <p:nvPr/>
+                  </p:nvSpPr>
+                  <p:spPr>
+                    <a:xfrm>
+                      <a:off x="1006642" y="2350591"/>
+                      <a:ext cx="367985" cy="369333"/>
+                    </a:xfrm>
+                    <a:prstGeom prst="rect">
+                      <a:avLst/>
+                    </a:prstGeom>
+                    <a:blipFill>
+                      <a:blip r:embed="rId29"/>
+                      <a:stretch>
+                        <a:fillRect l="-14286" r="-114286" b="-180000"/>
+                      </a:stretch>
+                    </a:blipFill>
+                  </p:spPr>
+                  <p:txBody>
+                    <a:bodyPr/>
+                    <a:lstStyle/>
+                    <a:p>
+                      <a:r>
+                        <a:rPr lang="en-US">
+                          <a:noFill/>
+                        </a:rPr>
+                        <a:t> </a:t>
+                      </a:r>
+                    </a:p>
+                  </p:txBody>
+                </p:sp>
+              </mc:Fallback>
+            </mc:AlternateContent>
+          </p:grpSp>
+          <p:sp>
+            <p:nvSpPr>
+              <p:cNvPr id="85" name="Rectangle 84"/>
+              <p:cNvSpPr/>
+              <p:nvPr/>
+            </p:nvSpPr>
+            <p:spPr>
+              <a:xfrm>
+                <a:off x="1129904" y="1614682"/>
+                <a:ext cx="184731" cy="369332"/>
+              </a:xfrm>
+              <a:prstGeom prst="rect">
+                <a:avLst/>
+              </a:prstGeom>
+            </p:spPr>
+            <p:txBody>
+              <a:bodyPr wrap="none">
+                <a:spAutoFit/>
+              </a:bodyPr>
+              <a:lstStyle/>
+              <a:p>
+                <a:endParaRPr lang="en-CA" dirty="0"/>
+              </a:p>
+            </p:txBody>
+          </p:sp>
+        </p:grpSp>
+        <p:cxnSp>
+          <p:nvCxnSpPr>
+            <p:cNvPr id="82" name="Straight Arrow Connector 81"/>
+            <p:cNvCxnSpPr/>
+            <p:nvPr/>
+          </p:nvCxnSpPr>
+          <p:spPr>
+            <a:xfrm flipV="1">
+              <a:off x="8499634" y="2899233"/>
+              <a:ext cx="474314" cy="273145"/>
+            </a:xfrm>
+            <a:prstGeom prst="straightConnector1">
+              <a:avLst/>
+            </a:prstGeom>
+            <a:ln w="38100">
+              <a:solidFill>
+                <a:schemeClr val="tx1"/>
+              </a:solidFill>
+              <a:prstDash val="sysDot"/>
+              <a:tailEnd type="triangle"/>
+            </a:ln>
+          </p:spPr>
+          <p:style>
+            <a:lnRef idx="1">
+              <a:schemeClr val="accent1"/>
+            </a:lnRef>
+            <a:fillRef idx="0">
+              <a:schemeClr val="accent1"/>
+            </a:fillRef>
+            <a:effectRef idx="0">
+              <a:schemeClr val="accent1"/>
+            </a:effectRef>
+            <a:fontRef idx="minor">
+              <a:schemeClr val="tx1"/>
+            </a:fontRef>
+          </p:style>
+        </p:cxnSp>
+        <mc:AlternateContent xmlns:mc="http://schemas.openxmlformats.org/markup-compatibility/2006">
+          <mc:Choice xmlns:a14="http://schemas.microsoft.com/office/drawing/2010/main" Requires="a14">
+            <p:sp>
+              <p:nvSpPr>
+                <p:cNvPr id="83" name="Rectangle 82"/>
+                <p:cNvSpPr/>
+                <p:nvPr/>
+              </p:nvSpPr>
+              <p:spPr>
+                <a:xfrm>
+                  <a:off x="8860631" y="2742661"/>
+                  <a:ext cx="371384" cy="369332"/>
+                </a:xfrm>
+                <a:prstGeom prst="rect">
+                  <a:avLst/>
+                </a:prstGeom>
+              </p:spPr>
+              <p:txBody>
+                <a:bodyPr wrap="none">
+                  <a:spAutoFit/>
+                </a:bodyPr>
+                <a:lstStyle/>
+                <a:p>
+                  <a:pPr/>
+                  <a14:m>
+                    <m:oMathPara xmlns:m="http://schemas.openxmlformats.org/officeDocument/2006/math">
+                      <m:oMathParaPr>
+                        <m:jc m:val="centerGroup"/>
+                      </m:oMathParaPr>
+                      <m:oMath xmlns:m="http://schemas.openxmlformats.org/officeDocument/2006/math">
+                        <m:r>
+                          <a:rPr lang="en-US" b="0" i="1" smtClean="0">
+                            <a:latin typeface="Cambria Math" panose="02040503050406030204" pitchFamily="18" charset="0"/>
+                          </a:rPr>
+                          <m:t>𝑦</m:t>
+                        </m:r>
+                      </m:oMath>
+                    </m:oMathPara>
+                  </a14:m>
+                  <a:endParaRPr lang="en-CA" dirty="0"/>
+                </a:p>
+              </p:txBody>
+            </p:sp>
+          </mc:Choice>
+          <mc:Fallback>
+            <p:sp>
+              <p:nvSpPr>
+                <p:cNvPr id="83" name="Rectangle 82"/>
+                <p:cNvSpPr>
+                  <a:spLocks noRot="1" noChangeAspect="1" noMove="1" noResize="1" noEditPoints="1" noAdjustHandles="1" noChangeArrowheads="1" noChangeShapeType="1" noTextEdit="1"/>
+                </p:cNvSpPr>
+                <p:nvPr/>
+              </p:nvSpPr>
+              <p:spPr>
+                <a:xfrm>
+                  <a:off x="8860631" y="2742661"/>
+                  <a:ext cx="371384" cy="369332"/>
+                </a:xfrm>
+                <a:prstGeom prst="rect">
+                  <a:avLst/>
+                </a:prstGeom>
+                <a:blipFill>
+                  <a:blip r:embed="rId33"/>
+                  <a:stretch>
+                    <a:fillRect b="-6557"/>
+                  </a:stretch>
+                </a:blipFill>
+              </p:spPr>
+              <p:txBody>
+                <a:bodyPr/>
+                <a:lstStyle/>
+                <a:p>
+                  <a:r>
+                    <a:rPr lang="en-US">
+                      <a:noFill/>
+                    </a:rPr>
+                    <a:t> </a:t>
+                  </a:r>
+                </a:p>
+              </p:txBody>
+            </p:sp>
+          </mc:Fallback>
+        </mc:AlternateContent>
       </p:grpSp>
     </p:spTree>
     <p:extLst>
@@ -25725,16 +26238,16 @@
       </p:grpSp>
       <p:grpSp>
         <p:nvGrpSpPr>
-          <p:cNvPr id="91" name="Group 90"/>
+          <p:cNvPr id="99" name="Group 98"/>
           <p:cNvGrpSpPr/>
           <p:nvPr/>
         </p:nvGrpSpPr>
         <p:grpSpPr>
           <a:xfrm>
-            <a:off x="8323951" y="596230"/>
-            <a:ext cx="3134976" cy="2964729"/>
-            <a:chOff x="8111299" y="1681447"/>
-            <a:chExt cx="3134976" cy="2964729"/>
+            <a:off x="8248391" y="596230"/>
+            <a:ext cx="3210536" cy="2678280"/>
+            <a:chOff x="8248391" y="596230"/>
+            <a:chExt cx="3210536" cy="2678280"/>
           </a:xfrm>
         </p:grpSpPr>
         <p:sp>
@@ -25745,7 +26258,7 @@
           </p:nvSpPr>
           <p:spPr>
             <a:xfrm>
-              <a:off x="8286982" y="2928457"/>
+              <a:off x="8499634" y="1843240"/>
               <a:ext cx="2959293" cy="1028071"/>
             </a:xfrm>
             <a:prstGeom prst="ellipse">
@@ -25795,7 +26308,7 @@
           </p:nvSpPr>
           <p:spPr>
             <a:xfrm>
-              <a:off x="8773617" y="3133258"/>
+              <a:off x="8986269" y="2048041"/>
               <a:ext cx="1970476" cy="584763"/>
             </a:xfrm>
             <a:prstGeom prst="ellipse">
@@ -25841,7 +26354,7 @@
           </p:nvSpPr>
           <p:spPr>
             <a:xfrm>
-              <a:off x="8988822" y="3249751"/>
+              <a:off x="9201474" y="2164534"/>
               <a:ext cx="1555611" cy="356406"/>
             </a:xfrm>
             <a:prstGeom prst="ellipse">
@@ -25891,7 +26404,7 @@
           </p:nvCxnSpPr>
           <p:spPr>
             <a:xfrm>
-              <a:off x="8976153" y="3216405"/>
+              <a:off x="9188805" y="2131188"/>
               <a:ext cx="240483" cy="85540"/>
             </a:xfrm>
             <a:prstGeom prst="straightConnector1">
@@ -25928,7 +26441,7 @@
           </p:nvCxnSpPr>
           <p:spPr>
             <a:xfrm>
-              <a:off x="9766627" y="3442492"/>
+              <a:off x="9979279" y="2357275"/>
               <a:ext cx="790475" cy="14562"/>
             </a:xfrm>
             <a:prstGeom prst="straightConnector1">
@@ -25967,7 +26480,7 @@
               </p:nvSpPr>
               <p:spPr>
                 <a:xfrm>
-                  <a:off x="8988822" y="2935504"/>
+                  <a:off x="9201474" y="1850287"/>
                   <a:ext cx="543966" cy="307777"/>
                 </a:xfrm>
                 <a:prstGeom prst="rect">
@@ -26024,7 +26537,7 @@
               </p:nvSpPr>
               <p:spPr>
                 <a:xfrm>
-                  <a:off x="8988822" y="2935504"/>
+                  <a:off x="9201474" y="1850287"/>
                   <a:ext cx="543966" cy="307777"/>
                 </a:xfrm>
                 <a:prstGeom prst="rect">
@@ -26062,7 +26575,7 @@
               </p:nvSpPr>
               <p:spPr>
                 <a:xfrm>
-                  <a:off x="9203857" y="3631094"/>
+                  <a:off x="9416509" y="2545877"/>
                   <a:ext cx="241541" cy="307777"/>
                 </a:xfrm>
                 <a:prstGeom prst="rect">
@@ -26112,7 +26625,7 @@
               </p:nvSpPr>
               <p:spPr>
                 <a:xfrm>
-                  <a:off x="9203857" y="3631094"/>
+                  <a:off x="9416509" y="2545877"/>
                   <a:ext cx="241541" cy="307777"/>
                 </a:xfrm>
                 <a:prstGeom prst="rect">
@@ -26148,7 +26661,7 @@
           </p:nvCxnSpPr>
           <p:spPr>
             <a:xfrm flipV="1">
-              <a:off x="9766627" y="2286011"/>
+              <a:off x="9979279" y="1200794"/>
               <a:ext cx="1673" cy="1156481"/>
             </a:xfrm>
             <a:prstGeom prst="line">
@@ -26186,7 +26699,7 @@
               </p:nvSpPr>
               <p:spPr>
                 <a:xfrm>
-                  <a:off x="9936883" y="2506831"/>
+                  <a:off x="10149535" y="1421614"/>
                   <a:ext cx="219483" cy="307777"/>
                 </a:xfrm>
                 <a:prstGeom prst="rect">
@@ -26235,7 +26748,7 @@
               </p:nvSpPr>
               <p:spPr>
                 <a:xfrm>
-                  <a:off x="9936883" y="2506831"/>
+                  <a:off x="10149535" y="1421614"/>
                   <a:ext cx="219483" cy="307777"/>
                 </a:xfrm>
                 <a:prstGeom prst="rect">
@@ -26273,7 +26786,7 @@
               </p:nvSpPr>
               <p:spPr>
                 <a:xfrm>
-                  <a:off x="8441217" y="3208673"/>
+                  <a:off x="8653869" y="2123456"/>
                   <a:ext cx="365228" cy="307777"/>
                 </a:xfrm>
                 <a:prstGeom prst="rect">
@@ -26328,7 +26841,7 @@
               </p:nvSpPr>
               <p:spPr>
                 <a:xfrm>
-                  <a:off x="8441217" y="3208673"/>
+                  <a:off x="8653869" y="2123456"/>
                   <a:ext cx="365228" cy="307777"/>
                 </a:xfrm>
                 <a:prstGeom prst="rect">
@@ -26366,7 +26879,7 @@
               </p:nvSpPr>
               <p:spPr>
                 <a:xfrm>
-                  <a:off x="10073772" y="3167651"/>
+                  <a:off x="10286424" y="2082434"/>
                   <a:ext cx="198003" cy="307777"/>
                 </a:xfrm>
                 <a:prstGeom prst="rect">
@@ -26416,7 +26929,7 @@
               </p:nvSpPr>
               <p:spPr>
                 <a:xfrm>
-                  <a:off x="10073772" y="3167651"/>
+                  <a:off x="10286424" y="2082434"/>
                   <a:ext cx="198003" cy="307777"/>
                 </a:xfrm>
                 <a:prstGeom prst="rect">
@@ -26452,7 +26965,7 @@
           </p:nvCxnSpPr>
           <p:spPr>
             <a:xfrm flipV="1">
-              <a:off x="9766471" y="1690206"/>
+              <a:off x="9979123" y="604989"/>
               <a:ext cx="156" cy="586795"/>
             </a:xfrm>
             <a:prstGeom prst="straightConnector1">
@@ -26490,7 +27003,7 @@
               </p:nvSpPr>
               <p:spPr>
                 <a:xfrm>
-                  <a:off x="9096394" y="1681447"/>
+                  <a:off x="9309046" y="596230"/>
                   <a:ext cx="531235" cy="402931"/>
                 </a:xfrm>
                 <a:prstGeom prst="rect">
@@ -26565,7 +27078,7 @@
               </p:nvSpPr>
               <p:spPr>
                 <a:xfrm>
-                  <a:off x="9096394" y="1681447"/>
+                  <a:off x="9309046" y="596230"/>
                   <a:ext cx="531235" cy="402931"/>
                 </a:xfrm>
                 <a:prstGeom prst="rect">
@@ -26601,7 +27114,7 @@
           </p:nvCxnSpPr>
           <p:spPr>
             <a:xfrm flipV="1">
-              <a:off x="8896797" y="3436708"/>
+              <a:off x="9109449" y="2351491"/>
               <a:ext cx="855663" cy="397806"/>
             </a:xfrm>
             <a:prstGeom prst="line">
@@ -26639,7 +27152,7 @@
               </p:nvSpPr>
               <p:spPr>
                 <a:xfrm>
-                  <a:off x="10877576" y="3282819"/>
+                  <a:off x="11090228" y="2197602"/>
                   <a:ext cx="227498" cy="307777"/>
                 </a:xfrm>
                 <a:prstGeom prst="rect">
@@ -26688,7 +27201,7 @@
               </p:nvSpPr>
               <p:spPr>
                 <a:xfrm>
-                  <a:off x="10877576" y="3282819"/>
+                  <a:off x="11090228" y="2197602"/>
                   <a:ext cx="227498" cy="307777"/>
                 </a:xfrm>
                 <a:prstGeom prst="rect">
@@ -26718,431 +27231,380 @@
         </mc:AlternateContent>
         <p:grpSp>
           <p:nvGrpSpPr>
-            <p:cNvPr id="72" name="Group 71"/>
+            <p:cNvPr id="98" name="Group 97"/>
             <p:cNvGrpSpPr/>
             <p:nvPr/>
           </p:nvGrpSpPr>
           <p:grpSpPr>
             <a:xfrm>
-              <a:off x="8111299" y="3936181"/>
-              <a:ext cx="888156" cy="709995"/>
-              <a:chOff x="758520" y="708040"/>
-              <a:chExt cx="2565390" cy="2135605"/>
+              <a:off x="8248391" y="2564515"/>
+              <a:ext cx="983624" cy="709995"/>
+              <a:chOff x="8248391" y="2564515"/>
+              <a:chExt cx="983624" cy="709995"/>
             </a:xfrm>
           </p:grpSpPr>
           <p:grpSp>
             <p:nvGrpSpPr>
-              <p:cNvPr id="73" name="Group 72"/>
+              <p:cNvPr id="72" name="Group 71"/>
               <p:cNvGrpSpPr/>
               <p:nvPr/>
             </p:nvGrpSpPr>
             <p:grpSpPr>
               <a:xfrm>
-                <a:off x="758520" y="708040"/>
-                <a:ext cx="2565390" cy="2135605"/>
-                <a:chOff x="785815" y="680744"/>
+                <a:off x="8248391" y="2564515"/>
+                <a:ext cx="888156" cy="709995"/>
+                <a:chOff x="758520" y="708040"/>
                 <a:chExt cx="2565390" cy="2135605"/>
               </a:xfrm>
             </p:grpSpPr>
-            <p:cxnSp>
-              <p:nvCxnSpPr>
-                <p:cNvPr id="75" name="Straight Arrow Connector 74"/>
-                <p:cNvCxnSpPr/>
+            <p:grpSp>
+              <p:nvGrpSpPr>
+                <p:cNvPr id="73" name="Group 72"/>
+                <p:cNvGrpSpPr/>
                 <p:nvPr/>
-              </p:nvCxnSpPr>
-              <p:spPr>
-                <a:xfrm flipV="1">
-                  <a:off x="1516583" y="680744"/>
-                  <a:ext cx="7683" cy="1859535"/>
+              </p:nvGrpSpPr>
+              <p:grpSpPr>
+                <a:xfrm>
+                  <a:off x="758520" y="708040"/>
+                  <a:ext cx="2565390" cy="2135605"/>
+                  <a:chOff x="785815" y="680744"/>
+                  <a:chExt cx="2565390" cy="2135605"/>
                 </a:xfrm>
-                <a:prstGeom prst="straightConnector1">
-                  <a:avLst/>
-                </a:prstGeom>
-                <a:ln w="38100">
-                  <a:solidFill>
+              </p:grpSpPr>
+              <p:cxnSp>
+                <p:nvCxnSpPr>
+                  <p:cNvPr id="75" name="Straight Arrow Connector 74"/>
+                  <p:cNvCxnSpPr/>
+                  <p:nvPr/>
+                </p:nvCxnSpPr>
+                <p:spPr>
+                  <a:xfrm flipV="1">
+                    <a:off x="1516583" y="680744"/>
+                    <a:ext cx="7683" cy="1859535"/>
+                  </a:xfrm>
+                  <a:prstGeom prst="straightConnector1">
+                    <a:avLst/>
+                  </a:prstGeom>
+                  <a:ln w="38100">
+                    <a:solidFill>
+                      <a:schemeClr val="tx1"/>
+                    </a:solidFill>
+                    <a:tailEnd type="triangle"/>
+                  </a:ln>
+                </p:spPr>
+                <p:style>
+                  <a:lnRef idx="1">
+                    <a:schemeClr val="accent1"/>
+                  </a:lnRef>
+                  <a:fillRef idx="0">
+                    <a:schemeClr val="accent1"/>
+                  </a:fillRef>
+                  <a:effectRef idx="0">
+                    <a:schemeClr val="accent1"/>
+                  </a:effectRef>
+                  <a:fontRef idx="minor">
                     <a:schemeClr val="tx1"/>
-                  </a:solidFill>
-                  <a:tailEnd type="triangle"/>
-                </a:ln>
-              </p:spPr>
-              <p:style>
-                <a:lnRef idx="1">
-                  <a:schemeClr val="accent1"/>
-                </a:lnRef>
-                <a:fillRef idx="0">
-                  <a:schemeClr val="accent1"/>
-                </a:fillRef>
-                <a:effectRef idx="0">
-                  <a:schemeClr val="accent1"/>
-                </a:effectRef>
-                <a:fontRef idx="minor">
-                  <a:schemeClr val="tx1"/>
-                </a:fontRef>
-              </p:style>
-            </p:cxnSp>
-            <p:cxnSp>
-              <p:nvCxnSpPr>
-                <p:cNvPr id="76" name="Straight Arrow Connector 75"/>
-                <p:cNvCxnSpPr/>
-                <p:nvPr/>
-              </p:nvCxnSpPr>
-              <p:spPr>
-                <a:xfrm flipV="1">
-                  <a:off x="1476301" y="2503276"/>
-                  <a:ext cx="1874904" cy="0"/>
-                </a:xfrm>
-                <a:prstGeom prst="straightConnector1">
-                  <a:avLst/>
-                </a:prstGeom>
-                <a:ln w="38100">
-                  <a:solidFill>
+                  </a:fontRef>
+                </p:style>
+              </p:cxnSp>
+              <p:cxnSp>
+                <p:nvCxnSpPr>
+                  <p:cNvPr id="76" name="Straight Arrow Connector 75"/>
+                  <p:cNvCxnSpPr/>
+                  <p:nvPr/>
+                </p:nvCxnSpPr>
+                <p:spPr>
+                  <a:xfrm flipV="1">
+                    <a:off x="1476301" y="2503276"/>
+                    <a:ext cx="1874904" cy="0"/>
+                  </a:xfrm>
+                  <a:prstGeom prst="straightConnector1">
+                    <a:avLst/>
+                  </a:prstGeom>
+                  <a:ln w="38100">
+                    <a:solidFill>
+                      <a:schemeClr val="tx1"/>
+                    </a:solidFill>
+                    <a:tailEnd type="triangle"/>
+                  </a:ln>
+                </p:spPr>
+                <p:style>
+                  <a:lnRef idx="1">
+                    <a:schemeClr val="accent1"/>
+                  </a:lnRef>
+                  <a:fillRef idx="0">
+                    <a:schemeClr val="accent1"/>
+                  </a:fillRef>
+                  <a:effectRef idx="0">
+                    <a:schemeClr val="accent1"/>
+                  </a:effectRef>
+                  <a:fontRef idx="minor">
                     <a:schemeClr val="tx1"/>
-                  </a:solidFill>
-                  <a:tailEnd type="triangle"/>
-                </a:ln>
-              </p:spPr>
-              <p:style>
-                <a:lnRef idx="1">
-                  <a:schemeClr val="accent1"/>
-                </a:lnRef>
-                <a:fillRef idx="0">
-                  <a:schemeClr val="accent1"/>
-                </a:fillRef>
-                <a:effectRef idx="0">
-                  <a:schemeClr val="accent1"/>
-                </a:effectRef>
-                <a:fontRef idx="minor">
-                  <a:schemeClr val="tx1"/>
-                </a:fontRef>
-              </p:style>
-            </p:cxnSp>
-            <mc:AlternateContent xmlns:mc="http://schemas.openxmlformats.org/markup-compatibility/2006" xmlns:a14="http://schemas.microsoft.com/office/drawing/2010/main">
-              <mc:Choice Requires="a14">
-                <p:sp>
-                  <p:nvSpPr>
-                    <p:cNvPr id="77" name="Rectangle 76"/>
-                    <p:cNvSpPr/>
-                    <p:nvPr/>
-                  </p:nvSpPr>
-                  <p:spPr>
-                    <a:xfrm>
-                      <a:off x="2697555" y="2447016"/>
-                      <a:ext cx="367985" cy="369333"/>
-                    </a:xfrm>
-                    <a:prstGeom prst="rect">
-                      <a:avLst/>
-                    </a:prstGeom>
-                  </p:spPr>
-                  <p:txBody>
-                    <a:bodyPr wrap="none">
-                      <a:spAutoFit/>
-                    </a:bodyPr>
-                    <a:lstStyle/>
-                    <a:p>
-                      <a:pPr/>
-                      <a14:m>
-                        <m:oMathPara xmlns:m="http://schemas.openxmlformats.org/officeDocument/2006/math">
-                          <m:oMathParaPr>
-                            <m:jc m:val="centerGroup"/>
-                          </m:oMathParaPr>
-                          <m:oMath xmlns:m="http://schemas.openxmlformats.org/officeDocument/2006/math">
-                            <m:r>
-                              <a:rPr lang="en-US" i="1">
-                                <a:latin typeface="Cambria Math" panose="02040503050406030204" pitchFamily="18" charset="0"/>
-                                <a:cs typeface="Arial" panose="020B0604020202020204" pitchFamily="34" charset="0"/>
-                              </a:rPr>
-                              <m:t>𝑥</m:t>
-                            </m:r>
-                          </m:oMath>
-                        </m:oMathPara>
-                      </a14:m>
-                      <a:endParaRPr lang="en-CA" dirty="0"/>
-                    </a:p>
-                  </p:txBody>
-                </p:sp>
-              </mc:Choice>
-              <mc:Fallback xmlns="">
-                <p:sp>
-                  <p:nvSpPr>
-                    <p:cNvPr id="107" name="Rectangle 106"/>
-                    <p:cNvSpPr>
-                      <a:spLocks noRot="1" noChangeAspect="1" noMove="1" noResize="1" noEditPoints="1" noAdjustHandles="1" noChangeArrowheads="1" noChangeShapeType="1" noTextEdit="1"/>
-                    </p:cNvSpPr>
-                    <p:nvPr/>
-                  </p:nvSpPr>
-                  <p:spPr>
-                    <a:xfrm>
-                      <a:off x="2697555" y="2447016"/>
-                      <a:ext cx="367985" cy="369333"/>
-                    </a:xfrm>
-                    <a:prstGeom prst="rect">
-                      <a:avLst/>
-                    </a:prstGeom>
-                    <a:blipFill>
-                      <a:blip r:embed="rId27"/>
-                      <a:stretch>
-                        <a:fillRect r="-95238" b="-160000"/>
-                      </a:stretch>
-                    </a:blipFill>
-                  </p:spPr>
-                  <p:txBody>
-                    <a:bodyPr/>
-                    <a:lstStyle/>
-                    <a:p>
-                      <a:r>
-                        <a:rPr lang="en-US">
-                          <a:noFill/>
-                        </a:rPr>
-                        <a:t> </a:t>
-                      </a:r>
-                    </a:p>
-                  </p:txBody>
-                </p:sp>
-              </mc:Fallback>
-            </mc:AlternateContent>
-            <mc:AlternateContent xmlns:mc="http://schemas.openxmlformats.org/markup-compatibility/2006">
-              <mc:Choice xmlns:a14="http://schemas.microsoft.com/office/drawing/2010/main" Requires="a14">
-                <p:sp>
-                  <p:nvSpPr>
-                    <p:cNvPr id="78" name="Rectangle 77"/>
-                    <p:cNvSpPr/>
-                    <p:nvPr/>
-                  </p:nvSpPr>
-                  <p:spPr>
-                    <a:xfrm>
-                      <a:off x="785815" y="912420"/>
-                      <a:ext cx="1021790" cy="1110919"/>
-                    </a:xfrm>
-                    <a:prstGeom prst="rect">
-                      <a:avLst/>
-                    </a:prstGeom>
-                  </p:spPr>
-                  <p:txBody>
-                    <a:bodyPr wrap="none">
-                      <a:spAutoFit/>
-                    </a:bodyPr>
-                    <a:lstStyle/>
-                    <a:p>
-                      <a:pPr/>
-                      <a14:m>
-                        <m:oMathPara xmlns:m="http://schemas.openxmlformats.org/officeDocument/2006/math">
-                          <m:oMathParaPr>
-                            <m:jc m:val="centerGroup"/>
-                          </m:oMathParaPr>
-                          <m:oMath xmlns:m="http://schemas.openxmlformats.org/officeDocument/2006/math">
-                            <m:r>
-                              <a:rPr lang="en-US" b="0" i="1" smtClean="0">
-                                <a:latin typeface="Cambria Math" panose="02040503050406030204" pitchFamily="18" charset="0"/>
-                              </a:rPr>
-                              <m:t>𝑧</m:t>
-                            </m:r>
-                          </m:oMath>
-                        </m:oMathPara>
-                      </a14:m>
-                      <a:endParaRPr lang="en-CA" dirty="0"/>
-                    </a:p>
-                  </p:txBody>
-                </p:sp>
-              </mc:Choice>
-              <mc:Fallback>
-                <p:sp>
-                  <p:nvSpPr>
-                    <p:cNvPr id="78" name="Rectangle 77"/>
-                    <p:cNvSpPr>
-                      <a:spLocks noRot="1" noChangeAspect="1" noMove="1" noResize="1" noEditPoints="1" noAdjustHandles="1" noChangeArrowheads="1" noChangeShapeType="1" noTextEdit="1"/>
-                    </p:cNvSpPr>
-                    <p:nvPr/>
-                  </p:nvSpPr>
-                  <p:spPr>
-                    <a:xfrm>
-                      <a:off x="785815" y="912420"/>
-                      <a:ext cx="1021790" cy="1110919"/>
-                    </a:xfrm>
-                    <a:prstGeom prst="rect">
-                      <a:avLst/>
-                    </a:prstGeom>
-                    <a:blipFill>
-                      <a:blip r:embed="rId28"/>
-                      <a:stretch>
-                        <a:fillRect/>
-                      </a:stretch>
-                    </a:blipFill>
-                  </p:spPr>
-                  <p:txBody>
-                    <a:bodyPr/>
-                    <a:lstStyle/>
-                    <a:p>
-                      <a:r>
-                        <a:rPr lang="en-US">
-                          <a:noFill/>
-                        </a:rPr>
-                        <a:t> </a:t>
-                      </a:r>
-                    </a:p>
-                  </p:txBody>
-                </p:sp>
-              </mc:Fallback>
-            </mc:AlternateContent>
-            <mc:AlternateContent xmlns:mc="http://schemas.openxmlformats.org/markup-compatibility/2006" xmlns:a14="http://schemas.microsoft.com/office/drawing/2010/main">
-              <mc:Choice Requires="a14">
-                <p:sp>
-                  <p:nvSpPr>
-                    <p:cNvPr id="79" name="Rectangle 78"/>
-                    <p:cNvSpPr/>
-                    <p:nvPr/>
-                  </p:nvSpPr>
-                  <p:spPr>
-                    <a:xfrm>
-                      <a:off x="1006642" y="2350591"/>
-                      <a:ext cx="367985" cy="369333"/>
-                    </a:xfrm>
-                    <a:prstGeom prst="rect">
-                      <a:avLst/>
-                    </a:prstGeom>
-                  </p:spPr>
-                  <p:txBody>
-                    <a:bodyPr wrap="none">
-                      <a:spAutoFit/>
-                    </a:bodyPr>
-                    <a:lstStyle/>
-                    <a:p>
-                      <a:pPr/>
-                      <a14:m>
-                        <m:oMathPara xmlns:m="http://schemas.openxmlformats.org/officeDocument/2006/math">
-                          <m:oMathParaPr>
-                            <m:jc m:val="centerGroup"/>
-                          </m:oMathParaPr>
-                          <m:oMath xmlns:m="http://schemas.openxmlformats.org/officeDocument/2006/math">
-                            <m:r>
-                              <a:rPr lang="en-US" b="0" i="1" smtClean="0">
-                                <a:latin typeface="Cambria Math" panose="02040503050406030204" pitchFamily="18" charset="0"/>
-                                <a:cs typeface="Arial" panose="020B0604020202020204" pitchFamily="34" charset="0"/>
-                              </a:rPr>
-                              <m:t>0</m:t>
-                            </m:r>
-                          </m:oMath>
-                        </m:oMathPara>
-                      </a14:m>
-                      <a:endParaRPr lang="en-CA" dirty="0"/>
-                    </a:p>
-                  </p:txBody>
-                </p:sp>
-              </mc:Choice>
-              <mc:Fallback xmlns="">
-                <p:sp>
-                  <p:nvSpPr>
-                    <p:cNvPr id="109" name="Rectangle 108"/>
-                    <p:cNvSpPr>
-                      <a:spLocks noRot="1" noChangeAspect="1" noMove="1" noResize="1" noEditPoints="1" noAdjustHandles="1" noChangeArrowheads="1" noChangeShapeType="1" noTextEdit="1"/>
-                    </p:cNvSpPr>
-                    <p:nvPr/>
-                  </p:nvSpPr>
-                  <p:spPr>
-                    <a:xfrm>
-                      <a:off x="1006642" y="2350591"/>
-                      <a:ext cx="367985" cy="369333"/>
-                    </a:xfrm>
-                    <a:prstGeom prst="rect">
-                      <a:avLst/>
-                    </a:prstGeom>
-                    <a:blipFill>
-                      <a:blip r:embed="rId29"/>
-                      <a:stretch>
-                        <a:fillRect l="-14286" r="-114286" b="-180000"/>
-                      </a:stretch>
-                    </a:blipFill>
-                  </p:spPr>
-                  <p:txBody>
-                    <a:bodyPr/>
-                    <a:lstStyle/>
-                    <a:p>
-                      <a:r>
-                        <a:rPr lang="en-US">
-                          <a:noFill/>
-                        </a:rPr>
-                        <a:t> </a:t>
-                      </a:r>
-                    </a:p>
-                  </p:txBody>
-                </p:sp>
-              </mc:Fallback>
-            </mc:AlternateContent>
-          </p:grpSp>
-          <p:sp>
-            <p:nvSpPr>
-              <p:cNvPr id="74" name="Rectangle 73"/>
-              <p:cNvSpPr/>
-              <p:nvPr/>
-            </p:nvSpPr>
-            <p:spPr>
-              <a:xfrm>
-                <a:off x="1129904" y="1614682"/>
-                <a:ext cx="184731" cy="369332"/>
-              </a:xfrm>
-              <a:prstGeom prst="rect">
-                <a:avLst/>
-              </a:prstGeom>
-            </p:spPr>
-            <p:txBody>
-              <a:bodyPr wrap="none">
-                <a:spAutoFit/>
-              </a:bodyPr>
-              <a:lstStyle/>
-              <a:p>
-                <a:endParaRPr lang="en-CA" dirty="0"/>
-              </a:p>
-            </p:txBody>
-          </p:sp>
-        </p:grpSp>
-        <p:cxnSp>
-          <p:nvCxnSpPr>
-            <p:cNvPr id="81" name="Straight Arrow Connector 80"/>
-            <p:cNvCxnSpPr/>
-            <p:nvPr/>
-          </p:nvCxnSpPr>
-          <p:spPr>
-            <a:xfrm flipV="1">
-              <a:off x="8363645" y="4219934"/>
-              <a:ext cx="361017" cy="315126"/>
-            </a:xfrm>
-            <a:prstGeom prst="straightConnector1">
-              <a:avLst/>
-            </a:prstGeom>
-            <a:ln w="38100">
-              <a:solidFill>
-                <a:schemeClr val="tx1"/>
-              </a:solidFill>
-              <a:prstDash val="sysDot"/>
-              <a:tailEnd type="triangle"/>
-            </a:ln>
-          </p:spPr>
-          <p:style>
-            <a:lnRef idx="1">
-              <a:schemeClr val="accent1"/>
-            </a:lnRef>
-            <a:fillRef idx="0">
-              <a:schemeClr val="accent1"/>
-            </a:fillRef>
-            <a:effectRef idx="0">
-              <a:schemeClr val="accent1"/>
-            </a:effectRef>
-            <a:fontRef idx="minor">
-              <a:schemeClr val="tx1"/>
-            </a:fontRef>
-          </p:style>
-        </p:cxnSp>
-        <mc:AlternateContent xmlns:mc="http://schemas.openxmlformats.org/markup-compatibility/2006">
-          <mc:Choice xmlns:a14="http://schemas.microsoft.com/office/drawing/2010/main" Requires="a14">
+                  </a:fontRef>
+                </p:style>
+              </p:cxnSp>
+              <mc:AlternateContent xmlns:mc="http://schemas.openxmlformats.org/markup-compatibility/2006" xmlns:a14="http://schemas.microsoft.com/office/drawing/2010/main">
+                <mc:Choice Requires="a14">
+                  <p:sp>
+                    <p:nvSpPr>
+                      <p:cNvPr id="77" name="Rectangle 76"/>
+                      <p:cNvSpPr/>
+                      <p:nvPr/>
+                    </p:nvSpPr>
+                    <p:spPr>
+                      <a:xfrm>
+                        <a:off x="2697555" y="2447016"/>
+                        <a:ext cx="367985" cy="369333"/>
+                      </a:xfrm>
+                      <a:prstGeom prst="rect">
+                        <a:avLst/>
+                      </a:prstGeom>
+                    </p:spPr>
+                    <p:txBody>
+                      <a:bodyPr wrap="none">
+                        <a:spAutoFit/>
+                      </a:bodyPr>
+                      <a:lstStyle/>
+                      <a:p>
+                        <a:pPr/>
+                        <a14:m>
+                          <m:oMathPara xmlns:m="http://schemas.openxmlformats.org/officeDocument/2006/math">
+                            <m:oMathParaPr>
+                              <m:jc m:val="centerGroup"/>
+                            </m:oMathParaPr>
+                            <m:oMath xmlns:m="http://schemas.openxmlformats.org/officeDocument/2006/math">
+                              <m:r>
+                                <a:rPr lang="en-US" i="1">
+                                  <a:latin typeface="Cambria Math" panose="02040503050406030204" pitchFamily="18" charset="0"/>
+                                  <a:cs typeface="Arial" panose="020B0604020202020204" pitchFamily="34" charset="0"/>
+                                </a:rPr>
+                                <m:t>𝑥</m:t>
+                              </m:r>
+                            </m:oMath>
+                          </m:oMathPara>
+                        </a14:m>
+                        <a:endParaRPr lang="en-CA" dirty="0"/>
+                      </a:p>
+                    </p:txBody>
+                  </p:sp>
+                </mc:Choice>
+                <mc:Fallback xmlns="">
+                  <p:sp>
+                    <p:nvSpPr>
+                      <p:cNvPr id="107" name="Rectangle 106"/>
+                      <p:cNvSpPr>
+                        <a:spLocks noRot="1" noChangeAspect="1" noMove="1" noResize="1" noEditPoints="1" noAdjustHandles="1" noChangeArrowheads="1" noChangeShapeType="1" noTextEdit="1"/>
+                      </p:cNvSpPr>
+                      <p:nvPr/>
+                    </p:nvSpPr>
+                    <p:spPr>
+                      <a:xfrm>
+                        <a:off x="2697555" y="2447016"/>
+                        <a:ext cx="367985" cy="369333"/>
+                      </a:xfrm>
+                      <a:prstGeom prst="rect">
+                        <a:avLst/>
+                      </a:prstGeom>
+                      <a:blipFill>
+                        <a:blip r:embed="rId27"/>
+                        <a:stretch>
+                          <a:fillRect r="-95238" b="-160000"/>
+                        </a:stretch>
+                      </a:blipFill>
+                    </p:spPr>
+                    <p:txBody>
+                      <a:bodyPr/>
+                      <a:lstStyle/>
+                      <a:p>
+                        <a:r>
+                          <a:rPr lang="en-US">
+                            <a:noFill/>
+                          </a:rPr>
+                          <a:t> </a:t>
+                        </a:r>
+                      </a:p>
+                    </p:txBody>
+                  </p:sp>
+                </mc:Fallback>
+              </mc:AlternateContent>
+              <mc:AlternateContent xmlns:mc="http://schemas.openxmlformats.org/markup-compatibility/2006">
+                <mc:Choice xmlns:a14="http://schemas.microsoft.com/office/drawing/2010/main" Requires="a14">
+                  <p:sp>
+                    <p:nvSpPr>
+                      <p:cNvPr id="78" name="Rectangle 77"/>
+                      <p:cNvSpPr/>
+                      <p:nvPr/>
+                    </p:nvSpPr>
+                    <p:spPr>
+                      <a:xfrm>
+                        <a:off x="785815" y="912420"/>
+                        <a:ext cx="1021790" cy="1110919"/>
+                      </a:xfrm>
+                      <a:prstGeom prst="rect">
+                        <a:avLst/>
+                      </a:prstGeom>
+                    </p:spPr>
+                    <p:txBody>
+                      <a:bodyPr wrap="none">
+                        <a:spAutoFit/>
+                      </a:bodyPr>
+                      <a:lstStyle/>
+                      <a:p>
+                        <a:pPr/>
+                        <a14:m>
+                          <m:oMathPara xmlns:m="http://schemas.openxmlformats.org/officeDocument/2006/math">
+                            <m:oMathParaPr>
+                              <m:jc m:val="centerGroup"/>
+                            </m:oMathParaPr>
+                            <m:oMath xmlns:m="http://schemas.openxmlformats.org/officeDocument/2006/math">
+                              <m:r>
+                                <a:rPr lang="en-US" b="0" i="1" smtClean="0">
+                                  <a:latin typeface="Cambria Math" panose="02040503050406030204" pitchFamily="18" charset="0"/>
+                                </a:rPr>
+                                <m:t>𝑧</m:t>
+                              </m:r>
+                            </m:oMath>
+                          </m:oMathPara>
+                        </a14:m>
+                        <a:endParaRPr lang="en-CA" dirty="0"/>
+                      </a:p>
+                    </p:txBody>
+                  </p:sp>
+                </mc:Choice>
+                <mc:Fallback>
+                  <p:sp>
+                    <p:nvSpPr>
+                      <p:cNvPr id="78" name="Rectangle 77"/>
+                      <p:cNvSpPr>
+                        <a:spLocks noRot="1" noChangeAspect="1" noMove="1" noResize="1" noEditPoints="1" noAdjustHandles="1" noChangeArrowheads="1" noChangeShapeType="1" noTextEdit="1"/>
+                      </p:cNvSpPr>
+                      <p:nvPr/>
+                    </p:nvSpPr>
+                    <p:spPr>
+                      <a:xfrm>
+                        <a:off x="785815" y="912420"/>
+                        <a:ext cx="1021790" cy="1110919"/>
+                      </a:xfrm>
+                      <a:prstGeom prst="rect">
+                        <a:avLst/>
+                      </a:prstGeom>
+                      <a:blipFill>
+                        <a:blip r:embed="rId28"/>
+                        <a:stretch>
+                          <a:fillRect/>
+                        </a:stretch>
+                      </a:blipFill>
+                    </p:spPr>
+                    <p:txBody>
+                      <a:bodyPr/>
+                      <a:lstStyle/>
+                      <a:p>
+                        <a:r>
+                          <a:rPr lang="en-US">
+                            <a:noFill/>
+                          </a:rPr>
+                          <a:t> </a:t>
+                        </a:r>
+                      </a:p>
+                    </p:txBody>
+                  </p:sp>
+                </mc:Fallback>
+              </mc:AlternateContent>
+              <mc:AlternateContent xmlns:mc="http://schemas.openxmlformats.org/markup-compatibility/2006" xmlns:a14="http://schemas.microsoft.com/office/drawing/2010/main">
+                <mc:Choice Requires="a14">
+                  <p:sp>
+                    <p:nvSpPr>
+                      <p:cNvPr id="79" name="Rectangle 78"/>
+                      <p:cNvSpPr/>
+                      <p:nvPr/>
+                    </p:nvSpPr>
+                    <p:spPr>
+                      <a:xfrm>
+                        <a:off x="1006642" y="2350591"/>
+                        <a:ext cx="367985" cy="369333"/>
+                      </a:xfrm>
+                      <a:prstGeom prst="rect">
+                        <a:avLst/>
+                      </a:prstGeom>
+                    </p:spPr>
+                    <p:txBody>
+                      <a:bodyPr wrap="none">
+                        <a:spAutoFit/>
+                      </a:bodyPr>
+                      <a:lstStyle/>
+                      <a:p>
+                        <a:pPr/>
+                        <a14:m>
+                          <m:oMathPara xmlns:m="http://schemas.openxmlformats.org/officeDocument/2006/math">
+                            <m:oMathParaPr>
+                              <m:jc m:val="centerGroup"/>
+                            </m:oMathParaPr>
+                            <m:oMath xmlns:m="http://schemas.openxmlformats.org/officeDocument/2006/math">
+                              <m:r>
+                                <a:rPr lang="en-US" b="0" i="1" smtClean="0">
+                                  <a:latin typeface="Cambria Math" panose="02040503050406030204" pitchFamily="18" charset="0"/>
+                                  <a:cs typeface="Arial" panose="020B0604020202020204" pitchFamily="34" charset="0"/>
+                                </a:rPr>
+                                <m:t>0</m:t>
+                              </m:r>
+                            </m:oMath>
+                          </m:oMathPara>
+                        </a14:m>
+                        <a:endParaRPr lang="en-CA" dirty="0"/>
+                      </a:p>
+                    </p:txBody>
+                  </p:sp>
+                </mc:Choice>
+                <mc:Fallback xmlns="">
+                  <p:sp>
+                    <p:nvSpPr>
+                      <p:cNvPr id="109" name="Rectangle 108"/>
+                      <p:cNvSpPr>
+                        <a:spLocks noRot="1" noChangeAspect="1" noMove="1" noResize="1" noEditPoints="1" noAdjustHandles="1" noChangeArrowheads="1" noChangeShapeType="1" noTextEdit="1"/>
+                      </p:cNvSpPr>
+                      <p:nvPr/>
+                    </p:nvSpPr>
+                    <p:spPr>
+                      <a:xfrm>
+                        <a:off x="1006642" y="2350591"/>
+                        <a:ext cx="367985" cy="369333"/>
+                      </a:xfrm>
+                      <a:prstGeom prst="rect">
+                        <a:avLst/>
+                      </a:prstGeom>
+                      <a:blipFill>
+                        <a:blip r:embed="rId29"/>
+                        <a:stretch>
+                          <a:fillRect l="-14286" r="-114286" b="-180000"/>
+                        </a:stretch>
+                      </a:blipFill>
+                    </p:spPr>
+                    <p:txBody>
+                      <a:bodyPr/>
+                      <a:lstStyle/>
+                      <a:p>
+                        <a:r>
+                          <a:rPr lang="en-US">
+                            <a:noFill/>
+                          </a:rPr>
+                          <a:t> </a:t>
+                        </a:r>
+                      </a:p>
+                    </p:txBody>
+                  </p:sp>
+                </mc:Fallback>
+              </mc:AlternateContent>
+            </p:grpSp>
             <p:sp>
               <p:nvSpPr>
-                <p:cNvPr id="90" name="Rectangle 89"/>
+                <p:cNvPr id="74" name="Rectangle 73"/>
                 <p:cNvSpPr/>
                 <p:nvPr/>
               </p:nvSpPr>
               <p:spPr>
                 <a:xfrm>
-                  <a:off x="8625100" y="4039675"/>
-                  <a:ext cx="371384" cy="369332"/>
+                  <a:off x="1129904" y="1614682"/>
+                  <a:ext cx="184731" cy="369332"/>
                 </a:xfrm>
                 <a:prstGeom prst="rect">
                   <a:avLst/>
@@ -27154,66 +27616,132 @@
                 </a:bodyPr>
                 <a:lstStyle/>
                 <a:p>
-                  <a:pPr/>
-                  <a14:m>
-                    <m:oMathPara xmlns:m="http://schemas.openxmlformats.org/officeDocument/2006/math">
-                      <m:oMathParaPr>
-                        <m:jc m:val="centerGroup"/>
-                      </m:oMathParaPr>
-                      <m:oMath xmlns:m="http://schemas.openxmlformats.org/officeDocument/2006/math">
-                        <m:r>
-                          <a:rPr lang="en-US" b="0" i="1" smtClean="0">
-                            <a:latin typeface="Cambria Math" panose="02040503050406030204" pitchFamily="18" charset="0"/>
-                          </a:rPr>
-                          <m:t>𝑦</m:t>
-                        </m:r>
-                      </m:oMath>
-                    </m:oMathPara>
-                  </a14:m>
                   <a:endParaRPr lang="en-CA" dirty="0"/>
                 </a:p>
               </p:txBody>
             </p:sp>
-          </mc:Choice>
-          <mc:Fallback>
-            <p:sp>
-              <p:nvSpPr>
-                <p:cNvPr id="90" name="Rectangle 89"/>
-                <p:cNvSpPr>
-                  <a:spLocks noRot="1" noChangeAspect="1" noMove="1" noResize="1" noEditPoints="1" noAdjustHandles="1" noChangeArrowheads="1" noChangeShapeType="1" noTextEdit="1"/>
-                </p:cNvSpPr>
-                <p:nvPr/>
-              </p:nvSpPr>
-              <p:spPr>
-                <a:xfrm>
-                  <a:off x="8625100" y="4039675"/>
-                  <a:ext cx="371384" cy="369332"/>
-                </a:xfrm>
-                <a:prstGeom prst="rect">
-                  <a:avLst/>
-                </a:prstGeom>
-                <a:blipFill>
-                  <a:blip r:embed="rId30"/>
-                  <a:stretch>
-                    <a:fillRect b="-6667"/>
-                  </a:stretch>
-                </a:blipFill>
-              </p:spPr>
-              <p:txBody>
-                <a:bodyPr/>
-                <a:lstStyle/>
-                <a:p>
-                  <a:r>
-                    <a:rPr lang="en-US">
-                      <a:noFill/>
-                    </a:rPr>
-                    <a:t> </a:t>
-                  </a:r>
-                </a:p>
-              </p:txBody>
-            </p:sp>
-          </mc:Fallback>
-        </mc:AlternateContent>
+          </p:grpSp>
+          <p:cxnSp>
+            <p:nvCxnSpPr>
+              <p:cNvPr id="81" name="Straight Arrow Connector 80"/>
+              <p:cNvCxnSpPr/>
+              <p:nvPr/>
+            </p:nvCxnSpPr>
+            <p:spPr>
+              <a:xfrm flipV="1">
+                <a:off x="8499634" y="2899233"/>
+                <a:ext cx="474314" cy="273145"/>
+              </a:xfrm>
+              <a:prstGeom prst="straightConnector1">
+                <a:avLst/>
+              </a:prstGeom>
+              <a:ln w="38100">
+                <a:solidFill>
+                  <a:schemeClr val="tx1"/>
+                </a:solidFill>
+                <a:prstDash val="sysDot"/>
+                <a:tailEnd type="triangle"/>
+              </a:ln>
+            </p:spPr>
+            <p:style>
+              <a:lnRef idx="1">
+                <a:schemeClr val="accent1"/>
+              </a:lnRef>
+              <a:fillRef idx="0">
+                <a:schemeClr val="accent1"/>
+              </a:fillRef>
+              <a:effectRef idx="0">
+                <a:schemeClr val="accent1"/>
+              </a:effectRef>
+              <a:fontRef idx="minor">
+                <a:schemeClr val="tx1"/>
+              </a:fontRef>
+            </p:style>
+          </p:cxnSp>
+          <mc:AlternateContent xmlns:mc="http://schemas.openxmlformats.org/markup-compatibility/2006">
+            <mc:Choice xmlns:a14="http://schemas.microsoft.com/office/drawing/2010/main" Requires="a14">
+              <p:sp>
+                <p:nvSpPr>
+                  <p:cNvPr id="90" name="Rectangle 89"/>
+                  <p:cNvSpPr/>
+                  <p:nvPr/>
+                </p:nvSpPr>
+                <p:spPr>
+                  <a:xfrm>
+                    <a:off x="8860631" y="2742661"/>
+                    <a:ext cx="371384" cy="369332"/>
+                  </a:xfrm>
+                  <a:prstGeom prst="rect">
+                    <a:avLst/>
+                  </a:prstGeom>
+                </p:spPr>
+                <p:txBody>
+                  <a:bodyPr wrap="none">
+                    <a:spAutoFit/>
+                  </a:bodyPr>
+                  <a:lstStyle/>
+                  <a:p>
+                    <a:pPr/>
+                    <a14:m>
+                      <m:oMathPara xmlns:m="http://schemas.openxmlformats.org/officeDocument/2006/math">
+                        <m:oMathParaPr>
+                          <m:jc m:val="centerGroup"/>
+                        </m:oMathParaPr>
+                        <m:oMath xmlns:m="http://schemas.openxmlformats.org/officeDocument/2006/math">
+                          <m:r>
+                            <a:rPr lang="en-US" b="0" i="1" smtClean="0">
+                              <a:latin typeface="Cambria Math" panose="02040503050406030204" pitchFamily="18" charset="0"/>
+                            </a:rPr>
+                            <m:t>𝑦</m:t>
+                          </m:r>
+                        </m:oMath>
+                      </m:oMathPara>
+                    </a14:m>
+                    <a:endParaRPr lang="en-CA" dirty="0"/>
+                  </a:p>
+                </p:txBody>
+              </p:sp>
+            </mc:Choice>
+            <mc:Fallback>
+              <p:sp>
+                <p:nvSpPr>
+                  <p:cNvPr id="90" name="Rectangle 89"/>
+                  <p:cNvSpPr>
+                    <a:spLocks noRot="1" noChangeAspect="1" noMove="1" noResize="1" noEditPoints="1" noAdjustHandles="1" noChangeArrowheads="1" noChangeShapeType="1" noTextEdit="1"/>
+                  </p:cNvSpPr>
+                  <p:nvPr/>
+                </p:nvSpPr>
+                <p:spPr>
+                  <a:xfrm>
+                    <a:off x="8860631" y="2742661"/>
+                    <a:ext cx="371384" cy="369332"/>
+                  </a:xfrm>
+                  <a:prstGeom prst="rect">
+                    <a:avLst/>
+                  </a:prstGeom>
+                  <a:blipFill>
+                    <a:blip r:embed="rId30"/>
+                    <a:stretch>
+                      <a:fillRect b="-6667"/>
+                    </a:stretch>
+                  </a:blipFill>
+                </p:spPr>
+                <p:txBody>
+                  <a:bodyPr/>
+                  <a:lstStyle/>
+                  <a:p>
+                    <a:r>
+                      <a:rPr lang="en-US">
+                        <a:noFill/>
+                      </a:rPr>
+                      <a:t> </a:t>
+                    </a:r>
+                  </a:p>
+                </p:txBody>
+              </p:sp>
+            </mc:Fallback>
+          </mc:AlternateContent>
+        </p:grpSp>
       </p:grpSp>
     </p:spTree>
     <p:extLst>
@@ -29187,7 +29715,7 @@
               <a:prstGeom prst="straightConnector1">
                 <a:avLst/>
               </a:prstGeom>
-              <a:ln w="38100">
+              <a:ln w="57150">
                 <a:solidFill>
                   <a:srgbClr val="FF0000"/>
                 </a:solidFill>

</xml_diff>

<commit_message>
All of the final changes
Thats's a wrap, folks!
</commit_message>
<xml_diff>
--- a/tex/figures/ChargesFields/Figures.pptx
+++ b/tex/figures/ChargesFields/Figures.pptx
@@ -5,7 +5,7 @@
     <p:sldMasterId id="2147483648" r:id="rId1"/>
   </p:sldMasterIdLst>
   <p:notesMasterIdLst>
-    <p:notesMasterId r:id="rId12"/>
+    <p:notesMasterId r:id="rId13"/>
   </p:notesMasterIdLst>
   <p:sldIdLst>
     <p:sldId id="271" r:id="rId2"/>
@@ -18,6 +18,7 @@
     <p:sldId id="278" r:id="rId9"/>
     <p:sldId id="279" r:id="rId10"/>
     <p:sldId id="280" r:id="rId11"/>
+    <p:sldId id="281" r:id="rId12"/>
   </p:sldIdLst>
   <p:sldSz cx="12192000" cy="6858000"/>
   <p:notesSz cx="6858000" cy="9144000"/>
@@ -139,13 +140,61 @@
 <file path=ppt/revisionInfo.xml><?xml version="1.0" encoding="utf-8"?>
 <p1510:revInfo xmlns:a="http://schemas.openxmlformats.org/drawingml/2006/main" xmlns:r="http://schemas.openxmlformats.org/officeDocument/2006/relationships" xmlns:p1510="http://schemas.microsoft.com/office/powerpoint/2015/10/main">
   <p1510:revLst>
-    <p1510:client id="{B1EA9506-D332-4B63-AD1B-F03AA899AA18}" v="327" dt="2019-07-10T15:22:24.585"/>
+    <p1510:client id="{DAF5B6D8-91BD-400B-A4D5-187E1A57CCF2}" v="19" dt="2019-08-21T20:37:08.372"/>
   </p1510:revLst>
 </p1510:revInfo>
 </file>
 
 <file path=ppt/changesInfos/changesInfo1.xml><?xml version="1.0" encoding="utf-8"?>
 <pc:chgInfo xmlns:a="http://schemas.openxmlformats.org/drawingml/2006/main" xmlns:r="http://schemas.openxmlformats.org/officeDocument/2006/relationships" xmlns:ac="http://schemas.microsoft.com/office/drawing/2013/main/command" xmlns:pc="http://schemas.microsoft.com/office/powerpoint/2013/main/command">
+  <pc:docChgLst>
+    <pc:chgData name="Joshua Rinaldo" userId="eeaa994f99e4e508" providerId="LiveId" clId="{DAF5B6D8-91BD-400B-A4D5-187E1A57CCF2}"/>
+    <pc:docChg chg="custSel addSld modSld">
+      <pc:chgData name="Joshua Rinaldo" userId="eeaa994f99e4e508" providerId="LiveId" clId="{DAF5B6D8-91BD-400B-A4D5-187E1A57CCF2}" dt="2019-08-21T20:37:16.397" v="28" actId="1076"/>
+      <pc:docMkLst>
+        <pc:docMk/>
+      </pc:docMkLst>
+      <pc:sldChg chg="addSp delSp modSp add">
+        <pc:chgData name="Joshua Rinaldo" userId="eeaa994f99e4e508" providerId="LiveId" clId="{DAF5B6D8-91BD-400B-A4D5-187E1A57CCF2}" dt="2019-08-21T20:37:16.397" v="28" actId="1076"/>
+        <pc:sldMkLst>
+          <pc:docMk/>
+          <pc:sldMk cId="2294809351" sldId="281"/>
+        </pc:sldMkLst>
+        <pc:spChg chg="del">
+          <ac:chgData name="Joshua Rinaldo" userId="eeaa994f99e4e508" providerId="LiveId" clId="{DAF5B6D8-91BD-400B-A4D5-187E1A57CCF2}" dt="2019-08-21T20:36:26.007" v="1" actId="478"/>
+          <ac:spMkLst>
+            <pc:docMk/>
+            <pc:sldMk cId="2294809351" sldId="281"/>
+            <ac:spMk id="2" creationId="{1A39243C-CBB8-4B81-965A-0F4C2218B672}"/>
+          </ac:spMkLst>
+        </pc:spChg>
+        <pc:spChg chg="del">
+          <ac:chgData name="Joshua Rinaldo" userId="eeaa994f99e4e508" providerId="LiveId" clId="{DAF5B6D8-91BD-400B-A4D5-187E1A57CCF2}" dt="2019-08-21T20:36:27.539" v="2" actId="478"/>
+          <ac:spMkLst>
+            <pc:docMk/>
+            <pc:sldMk cId="2294809351" sldId="281"/>
+            <ac:spMk id="3" creationId="{60AD6C14-DB72-4D90-B8F7-55D12FEDA8AE}"/>
+          </ac:spMkLst>
+        </pc:spChg>
+        <pc:spChg chg="add mod">
+          <ac:chgData name="Joshua Rinaldo" userId="eeaa994f99e4e508" providerId="LiveId" clId="{DAF5B6D8-91BD-400B-A4D5-187E1A57CCF2}" dt="2019-08-21T20:37:16.397" v="28" actId="1076"/>
+          <ac:spMkLst>
+            <pc:docMk/>
+            <pc:sldMk cId="2294809351" sldId="281"/>
+            <ac:spMk id="6" creationId="{FFF79954-1D8D-4070-8D6E-0CF242104214}"/>
+          </ac:spMkLst>
+        </pc:spChg>
+        <pc:picChg chg="add mod">
+          <ac:chgData name="Joshua Rinaldo" userId="eeaa994f99e4e508" providerId="LiveId" clId="{DAF5B6D8-91BD-400B-A4D5-187E1A57CCF2}" dt="2019-08-21T20:36:39.902" v="9" actId="1076"/>
+          <ac:picMkLst>
+            <pc:docMk/>
+            <pc:sldMk cId="2294809351" sldId="281"/>
+            <ac:picMk id="5" creationId="{E76313F2-1DB6-4383-A748-7E9B1667D523}"/>
+          </ac:picMkLst>
+        </pc:picChg>
+      </pc:sldChg>
+    </pc:docChg>
+  </pc:docChgLst>
   <pc:docChgLst>
     <pc:chgData name="Joshua Rinaldo" userId="eeaa994f99e4e508" providerId="LiveId" clId="{B1EA9506-D332-4B63-AD1B-F03AA899AA18}"/>
     <pc:docChg chg="undo custSel addSld modSld">
@@ -4743,7 +4792,7 @@
           <a:p>
             <a:fld id="{FA15A6B2-55AC-CD4B-A1E6-BB01091FE9DC}" type="datetimeFigureOut">
               <a:rPr lang="en-US" smtClean="0"/>
-              <a:t>8/14/2019</a:t>
+              <a:t>8/21/2019</a:t>
             </a:fld>
             <a:endParaRPr lang="en-US"/>
           </a:p>
@@ -5225,7 +5274,7 @@
           <a:p>
             <a:fld id="{F7249F8D-641B-4CAF-BAE5-10524742F6F1}" type="datetimeFigureOut">
               <a:rPr lang="en-CA" smtClean="0"/>
-              <a:t>2019-08-14</a:t>
+              <a:t>2019-08-21</a:t>
             </a:fld>
             <a:endParaRPr lang="en-CA"/>
           </a:p>
@@ -5395,7 +5444,7 @@
           <a:p>
             <a:fld id="{F7249F8D-641B-4CAF-BAE5-10524742F6F1}" type="datetimeFigureOut">
               <a:rPr lang="en-CA" smtClean="0"/>
-              <a:t>2019-08-14</a:t>
+              <a:t>2019-08-21</a:t>
             </a:fld>
             <a:endParaRPr lang="en-CA"/>
           </a:p>
@@ -5575,7 +5624,7 @@
           <a:p>
             <a:fld id="{F7249F8D-641B-4CAF-BAE5-10524742F6F1}" type="datetimeFigureOut">
               <a:rPr lang="en-CA" smtClean="0"/>
-              <a:t>2019-08-14</a:t>
+              <a:t>2019-08-21</a:t>
             </a:fld>
             <a:endParaRPr lang="en-CA"/>
           </a:p>
@@ -5745,7 +5794,7 @@
           <a:p>
             <a:fld id="{F7249F8D-641B-4CAF-BAE5-10524742F6F1}" type="datetimeFigureOut">
               <a:rPr lang="en-CA" smtClean="0"/>
-              <a:t>2019-08-14</a:t>
+              <a:t>2019-08-21</a:t>
             </a:fld>
             <a:endParaRPr lang="en-CA"/>
           </a:p>
@@ -5991,7 +6040,7 @@
           <a:p>
             <a:fld id="{F7249F8D-641B-4CAF-BAE5-10524742F6F1}" type="datetimeFigureOut">
               <a:rPr lang="en-CA" smtClean="0"/>
-              <a:t>2019-08-14</a:t>
+              <a:t>2019-08-21</a:t>
             </a:fld>
             <a:endParaRPr lang="en-CA"/>
           </a:p>
@@ -6223,7 +6272,7 @@
           <a:p>
             <a:fld id="{F7249F8D-641B-4CAF-BAE5-10524742F6F1}" type="datetimeFigureOut">
               <a:rPr lang="en-CA" smtClean="0"/>
-              <a:t>2019-08-14</a:t>
+              <a:t>2019-08-21</a:t>
             </a:fld>
             <a:endParaRPr lang="en-CA"/>
           </a:p>
@@ -6590,7 +6639,7 @@
           <a:p>
             <a:fld id="{F7249F8D-641B-4CAF-BAE5-10524742F6F1}" type="datetimeFigureOut">
               <a:rPr lang="en-CA" smtClean="0"/>
-              <a:t>2019-08-14</a:t>
+              <a:t>2019-08-21</a:t>
             </a:fld>
             <a:endParaRPr lang="en-CA"/>
           </a:p>
@@ -6708,7 +6757,7 @@
           <a:p>
             <a:fld id="{F7249F8D-641B-4CAF-BAE5-10524742F6F1}" type="datetimeFigureOut">
               <a:rPr lang="en-CA" smtClean="0"/>
-              <a:t>2019-08-14</a:t>
+              <a:t>2019-08-21</a:t>
             </a:fld>
             <a:endParaRPr lang="en-CA"/>
           </a:p>
@@ -6803,7 +6852,7 @@
           <a:p>
             <a:fld id="{F7249F8D-641B-4CAF-BAE5-10524742F6F1}" type="datetimeFigureOut">
               <a:rPr lang="en-CA" smtClean="0"/>
-              <a:t>2019-08-14</a:t>
+              <a:t>2019-08-21</a:t>
             </a:fld>
             <a:endParaRPr lang="en-CA"/>
           </a:p>
@@ -7080,7 +7129,7 @@
           <a:p>
             <a:fld id="{F7249F8D-641B-4CAF-BAE5-10524742F6F1}" type="datetimeFigureOut">
               <a:rPr lang="en-CA" smtClean="0"/>
-              <a:t>2019-08-14</a:t>
+              <a:t>2019-08-21</a:t>
             </a:fld>
             <a:endParaRPr lang="en-CA"/>
           </a:p>
@@ -7333,7 +7382,7 @@
           <a:p>
             <a:fld id="{F7249F8D-641B-4CAF-BAE5-10524742F6F1}" type="datetimeFigureOut">
               <a:rPr lang="en-CA" smtClean="0"/>
-              <a:t>2019-08-14</a:t>
+              <a:t>2019-08-21</a:t>
             </a:fld>
             <a:endParaRPr lang="en-CA"/>
           </a:p>
@@ -7546,7 +7595,7 @@
           <a:p>
             <a:fld id="{F7249F8D-641B-4CAF-BAE5-10524742F6F1}" type="datetimeFigureOut">
               <a:rPr lang="en-CA" smtClean="0"/>
-              <a:t>2019-08-14</a:t>
+              <a:t>2019-08-21</a:t>
             </a:fld>
             <a:endParaRPr lang="en-CA"/>
           </a:p>
@@ -12837,6 +12886,184 @@
     <p:extLst>
       <p:ext uri="{BB962C8B-B14F-4D97-AF65-F5344CB8AC3E}">
         <p14:creationId xmlns:p14="http://schemas.microsoft.com/office/powerpoint/2010/main" val="2047872917"/>
+      </p:ext>
+    </p:extLst>
+  </p:cSld>
+  <p:clrMapOvr>
+    <a:masterClrMapping/>
+  </p:clrMapOvr>
+</p:sld>
+</file>
+
+<file path=ppt/slides/slide11.xml><?xml version="1.0" encoding="utf-8"?>
+<p:sld xmlns:a="http://schemas.openxmlformats.org/drawingml/2006/main" xmlns:r="http://schemas.openxmlformats.org/officeDocument/2006/relationships" xmlns:p="http://schemas.openxmlformats.org/presentationml/2006/main">
+  <p:cSld>
+    <p:spTree>
+      <p:nvGrpSpPr>
+        <p:cNvPr id="1" name=""/>
+        <p:cNvGrpSpPr/>
+        <p:nvPr/>
+      </p:nvGrpSpPr>
+      <p:grpSpPr>
+        <a:xfrm>
+          <a:off x="0" y="0"/>
+          <a:ext cx="0" cy="0"/>
+          <a:chOff x="0" y="0"/>
+          <a:chExt cx="0" cy="0"/>
+        </a:xfrm>
+      </p:grpSpPr>
+      <p:pic>
+        <p:nvPicPr>
+          <p:cNvPr id="5" name="Picture 4" descr="A picture containing object, watch&#10;&#10;Description automatically generated">
+            <a:extLst>
+              <a:ext uri="{FF2B5EF4-FFF2-40B4-BE49-F238E27FC236}">
+                <a16:creationId xmlns:a16="http://schemas.microsoft.com/office/drawing/2014/main" id="{E76313F2-1DB6-4383-A748-7E9B1667D523}"/>
+              </a:ext>
+            </a:extLst>
+          </p:cNvPr>
+          <p:cNvPicPr>
+            <a:picLocks noChangeAspect="1"/>
+          </p:cNvPicPr>
+          <p:nvPr/>
+        </p:nvPicPr>
+        <p:blipFill>
+          <a:blip r:embed="rId2">
+            <a:extLst>
+              <a:ext uri="{28A0092B-C50C-407E-A947-70E740481C1C}">
+                <a14:useLocalDpi xmlns:a14="http://schemas.microsoft.com/office/drawing/2010/main" val="0"/>
+              </a:ext>
+            </a:extLst>
+          </a:blip>
+          <a:stretch>
+            <a:fillRect/>
+          </a:stretch>
+        </p:blipFill>
+        <p:spPr>
+          <a:xfrm>
+            <a:off x="1692497" y="-255868"/>
+            <a:ext cx="7560206" cy="7369736"/>
+          </a:xfrm>
+          <a:prstGeom prst="rect">
+            <a:avLst/>
+          </a:prstGeom>
+        </p:spPr>
+      </p:pic>
+      <mc:AlternateContent xmlns:mc="http://schemas.openxmlformats.org/markup-compatibility/2006">
+        <mc:Choice xmlns:a14="http://schemas.microsoft.com/office/drawing/2010/main" Requires="a14">
+          <p:sp>
+            <p:nvSpPr>
+              <p:cNvPr id="6" name="TextBox 5">
+                <a:extLst>
+                  <a:ext uri="{FF2B5EF4-FFF2-40B4-BE49-F238E27FC236}">
+                    <a16:creationId xmlns:a16="http://schemas.microsoft.com/office/drawing/2014/main" id="{FFF79954-1D8D-4070-8D6E-0CF242104214}"/>
+                  </a:ext>
+                </a:extLst>
+              </p:cNvPr>
+              <p:cNvSpPr txBox="1"/>
+              <p:nvPr/>
+            </p:nvSpPr>
+            <p:spPr>
+              <a:xfrm>
+                <a:off x="4533609" y="1443789"/>
+                <a:ext cx="615873" cy="713657"/>
+              </a:xfrm>
+              <a:prstGeom prst="rect">
+                <a:avLst/>
+              </a:prstGeom>
+              <a:noFill/>
+            </p:spPr>
+            <p:txBody>
+              <a:bodyPr wrap="none" rtlCol="0">
+                <a:spAutoFit/>
+              </a:bodyPr>
+              <a:lstStyle/>
+              <a:p>
+                <a14:m>
+                  <m:oMathPara xmlns:m="http://schemas.openxmlformats.org/officeDocument/2006/math">
+                    <m:oMathParaPr>
+                      <m:jc m:val="centerGroup"/>
+                    </m:oMathParaPr>
+                    <m:oMath xmlns:m="http://schemas.openxmlformats.org/officeDocument/2006/math">
+                      <m:acc>
+                        <m:accPr>
+                          <m:chr m:val="⃗"/>
+                          <m:ctrlPr>
+                            <a:rPr lang="en-CA" sz="3600" b="1" i="1" smtClean="0">
+                              <a:latin typeface="Cambria Math" panose="02040503050406030204" pitchFamily="18" charset="0"/>
+                              <a:cs typeface="Arial" panose="020B0604020202020204" pitchFamily="34" charset="0"/>
+                            </a:rPr>
+                          </m:ctrlPr>
+                        </m:accPr>
+                        <m:e>
+                          <m:r>
+                            <a:rPr lang="en-CA" sz="3600" b="1" i="1" smtClean="0">
+                              <a:latin typeface="Cambria Math" panose="02040503050406030204" pitchFamily="18" charset="0"/>
+                              <a:cs typeface="Arial" panose="020B0604020202020204" pitchFamily="34" charset="0"/>
+                            </a:rPr>
+                            <m:t>𝑬</m:t>
+                          </m:r>
+                        </m:e>
+                      </m:acc>
+                    </m:oMath>
+                  </m:oMathPara>
+                </a14:m>
+                <a:endParaRPr lang="en-CA" sz="3600" b="1" dirty="0">
+                  <a:latin typeface="Arial" panose="020B0604020202020204" pitchFamily="34" charset="0"/>
+                  <a:cs typeface="Arial" panose="020B0604020202020204" pitchFamily="34" charset="0"/>
+                </a:endParaRPr>
+              </a:p>
+            </p:txBody>
+          </p:sp>
+        </mc:Choice>
+        <mc:Fallback>
+          <p:sp>
+            <p:nvSpPr>
+              <p:cNvPr id="6" name="TextBox 5">
+                <a:extLst>
+                  <a:ext uri="{FF2B5EF4-FFF2-40B4-BE49-F238E27FC236}">
+                    <a16:creationId xmlns:a16="http://schemas.microsoft.com/office/drawing/2014/main" id="{FFF79954-1D8D-4070-8D6E-0CF242104214}"/>
+                  </a:ext>
+                </a:extLst>
+              </p:cNvPr>
+              <p:cNvSpPr txBox="1">
+                <a:spLocks noRot="1" noChangeAspect="1" noMove="1" noResize="1" noEditPoints="1" noAdjustHandles="1" noChangeArrowheads="1" noChangeShapeType="1" noTextEdit="1"/>
+              </p:cNvSpPr>
+              <p:nvPr/>
+            </p:nvSpPr>
+            <p:spPr>
+              <a:xfrm>
+                <a:off x="4533609" y="1443789"/>
+                <a:ext cx="615873" cy="713657"/>
+              </a:xfrm>
+              <a:prstGeom prst="rect">
+                <a:avLst/>
+              </a:prstGeom>
+              <a:blipFill>
+                <a:blip r:embed="rId3"/>
+                <a:stretch>
+                  <a:fillRect/>
+                </a:stretch>
+              </a:blipFill>
+            </p:spPr>
+            <p:txBody>
+              <a:bodyPr/>
+              <a:lstStyle/>
+              <a:p>
+                <a:r>
+                  <a:rPr lang="en-CA">
+                    <a:noFill/>
+                  </a:rPr>
+                  <a:t> </a:t>
+                </a:r>
+              </a:p>
+            </p:txBody>
+          </p:sp>
+        </mc:Fallback>
+      </mc:AlternateContent>
+    </p:spTree>
+    <p:extLst>
+      <p:ext uri="{BB962C8B-B14F-4D97-AF65-F5344CB8AC3E}">
+        <p14:creationId xmlns:p14="http://schemas.microsoft.com/office/powerpoint/2010/main" val="2294809351"/>
       </p:ext>
     </p:extLst>
   </p:cSld>

</xml_diff>

<commit_message>
Thought box edits #1
ChargesFields, Induction edits
</commit_message>
<xml_diff>
--- a/tex/figures/ChargesFields/Figures.pptx
+++ b/tex/figures/ChargesFields/Figures.pptx
@@ -4792,7 +4792,7 @@
           <a:p>
             <a:fld id="{FA15A6B2-55AC-CD4B-A1E6-BB01091FE9DC}" type="datetimeFigureOut">
               <a:rPr lang="en-US" smtClean="0"/>
-              <a:t>6/20/20</a:t>
+              <a:t>8/17/20</a:t>
             </a:fld>
             <a:endParaRPr lang="en-US"/>
           </a:p>
@@ -5143,6 +5143,90 @@
 </p:notes>
 </file>
 
+<file path=ppt/notesSlides/notesSlide2.xml><?xml version="1.0" encoding="utf-8"?>
+<p:notes xmlns:a="http://schemas.openxmlformats.org/drawingml/2006/main" xmlns:r="http://schemas.openxmlformats.org/officeDocument/2006/relationships" xmlns:p="http://schemas.openxmlformats.org/presentationml/2006/main">
+  <p:cSld>
+    <p:spTree>
+      <p:nvGrpSpPr>
+        <p:cNvPr id="1" name=""/>
+        <p:cNvGrpSpPr/>
+        <p:nvPr/>
+      </p:nvGrpSpPr>
+      <p:grpSpPr>
+        <a:xfrm>
+          <a:off x="0" y="0"/>
+          <a:ext cx="0" cy="0"/>
+          <a:chOff x="0" y="0"/>
+          <a:chExt cx="0" cy="0"/>
+        </a:xfrm>
+      </p:grpSpPr>
+      <p:sp>
+        <p:nvSpPr>
+          <p:cNvPr id="2" name="Slide Image Placeholder 1"/>
+          <p:cNvSpPr>
+            <a:spLocks noGrp="1" noRot="1" noChangeAspect="1"/>
+          </p:cNvSpPr>
+          <p:nvPr>
+            <p:ph type="sldImg"/>
+          </p:nvPr>
+        </p:nvSpPr>
+        <p:spPr/>
+      </p:sp>
+      <p:sp>
+        <p:nvSpPr>
+          <p:cNvPr id="3" name="Notes Placeholder 2"/>
+          <p:cNvSpPr>
+            <a:spLocks noGrp="1"/>
+          </p:cNvSpPr>
+          <p:nvPr>
+            <p:ph type="body" idx="1"/>
+          </p:nvPr>
+        </p:nvSpPr>
+        <p:spPr/>
+        <p:txBody>
+          <a:bodyPr/>
+          <a:lstStyle/>
+          <a:p>
+            <a:endParaRPr lang="en-US" dirty="0"/>
+          </a:p>
+        </p:txBody>
+      </p:sp>
+      <p:sp>
+        <p:nvSpPr>
+          <p:cNvPr id="4" name="Slide Number Placeholder 3"/>
+          <p:cNvSpPr>
+            <a:spLocks noGrp="1"/>
+          </p:cNvSpPr>
+          <p:nvPr>
+            <p:ph type="sldNum" sz="quarter" idx="5"/>
+          </p:nvPr>
+        </p:nvSpPr>
+        <p:spPr/>
+        <p:txBody>
+          <a:bodyPr/>
+          <a:lstStyle/>
+          <a:p>
+            <a:fld id="{2837E6EB-45E0-614E-8893-FF8AD648B34C}" type="slidenum">
+              <a:rPr lang="en-US" smtClean="0"/>
+              <a:t>4</a:t>
+            </a:fld>
+            <a:endParaRPr lang="en-US"/>
+          </a:p>
+        </p:txBody>
+      </p:sp>
+    </p:spTree>
+    <p:extLst>
+      <p:ext uri="{BB962C8B-B14F-4D97-AF65-F5344CB8AC3E}">
+        <p14:creationId xmlns:p14="http://schemas.microsoft.com/office/powerpoint/2010/main" val="3294649117"/>
+      </p:ext>
+    </p:extLst>
+  </p:cSld>
+  <p:clrMapOvr>
+    <a:masterClrMapping/>
+  </p:clrMapOvr>
+</p:notes>
+</file>
+
 <file path=ppt/slideLayouts/slideLayout1.xml><?xml version="1.0" encoding="utf-8"?>
 <p:sldLayout xmlns:a="http://schemas.openxmlformats.org/drawingml/2006/main" xmlns:r="http://schemas.openxmlformats.org/officeDocument/2006/relationships" xmlns:p="http://schemas.openxmlformats.org/presentationml/2006/main" type="title" preserve="1">
   <p:cSld name="Title Slide">
@@ -5274,7 +5358,7 @@
           <a:p>
             <a:fld id="{F7249F8D-641B-4CAF-BAE5-10524742F6F1}" type="datetimeFigureOut">
               <a:rPr lang="en-CA" smtClean="0"/>
-              <a:t>2020-06-20</a:t>
+              <a:t>2020-08-17</a:t>
             </a:fld>
             <a:endParaRPr lang="en-CA"/>
           </a:p>
@@ -5444,7 +5528,7 @@
           <a:p>
             <a:fld id="{F7249F8D-641B-4CAF-BAE5-10524742F6F1}" type="datetimeFigureOut">
               <a:rPr lang="en-CA" smtClean="0"/>
-              <a:t>2020-06-20</a:t>
+              <a:t>2020-08-17</a:t>
             </a:fld>
             <a:endParaRPr lang="en-CA"/>
           </a:p>
@@ -5624,7 +5708,7 @@
           <a:p>
             <a:fld id="{F7249F8D-641B-4CAF-BAE5-10524742F6F1}" type="datetimeFigureOut">
               <a:rPr lang="en-CA" smtClean="0"/>
-              <a:t>2020-06-20</a:t>
+              <a:t>2020-08-17</a:t>
             </a:fld>
             <a:endParaRPr lang="en-CA"/>
           </a:p>
@@ -5794,7 +5878,7 @@
           <a:p>
             <a:fld id="{F7249F8D-641B-4CAF-BAE5-10524742F6F1}" type="datetimeFigureOut">
               <a:rPr lang="en-CA" smtClean="0"/>
-              <a:t>2020-06-20</a:t>
+              <a:t>2020-08-17</a:t>
             </a:fld>
             <a:endParaRPr lang="en-CA"/>
           </a:p>
@@ -6040,7 +6124,7 @@
           <a:p>
             <a:fld id="{F7249F8D-641B-4CAF-BAE5-10524742F6F1}" type="datetimeFigureOut">
               <a:rPr lang="en-CA" smtClean="0"/>
-              <a:t>2020-06-20</a:t>
+              <a:t>2020-08-17</a:t>
             </a:fld>
             <a:endParaRPr lang="en-CA"/>
           </a:p>
@@ -6272,7 +6356,7 @@
           <a:p>
             <a:fld id="{F7249F8D-641B-4CAF-BAE5-10524742F6F1}" type="datetimeFigureOut">
               <a:rPr lang="en-CA" smtClean="0"/>
-              <a:t>2020-06-20</a:t>
+              <a:t>2020-08-17</a:t>
             </a:fld>
             <a:endParaRPr lang="en-CA"/>
           </a:p>
@@ -6639,7 +6723,7 @@
           <a:p>
             <a:fld id="{F7249F8D-641B-4CAF-BAE5-10524742F6F1}" type="datetimeFigureOut">
               <a:rPr lang="en-CA" smtClean="0"/>
-              <a:t>2020-06-20</a:t>
+              <a:t>2020-08-17</a:t>
             </a:fld>
             <a:endParaRPr lang="en-CA"/>
           </a:p>
@@ -6757,7 +6841,7 @@
           <a:p>
             <a:fld id="{F7249F8D-641B-4CAF-BAE5-10524742F6F1}" type="datetimeFigureOut">
               <a:rPr lang="en-CA" smtClean="0"/>
-              <a:t>2020-06-20</a:t>
+              <a:t>2020-08-17</a:t>
             </a:fld>
             <a:endParaRPr lang="en-CA"/>
           </a:p>
@@ -6852,7 +6936,7 @@
           <a:p>
             <a:fld id="{F7249F8D-641B-4CAF-BAE5-10524742F6F1}" type="datetimeFigureOut">
               <a:rPr lang="en-CA" smtClean="0"/>
-              <a:t>2020-06-20</a:t>
+              <a:t>2020-08-17</a:t>
             </a:fld>
             <a:endParaRPr lang="en-CA"/>
           </a:p>
@@ -7129,7 +7213,7 @@
           <a:p>
             <a:fld id="{F7249F8D-641B-4CAF-BAE5-10524742F6F1}" type="datetimeFigureOut">
               <a:rPr lang="en-CA" smtClean="0"/>
-              <a:t>2020-06-20</a:t>
+              <a:t>2020-08-17</a:t>
             </a:fld>
             <a:endParaRPr lang="en-CA"/>
           </a:p>
@@ -7382,7 +7466,7 @@
           <a:p>
             <a:fld id="{F7249F8D-641B-4CAF-BAE5-10524742F6F1}" type="datetimeFigureOut">
               <a:rPr lang="en-CA" smtClean="0"/>
-              <a:t>2020-06-20</a:t>
+              <a:t>2020-08-17</a:t>
             </a:fld>
             <a:endParaRPr lang="en-CA"/>
           </a:p>
@@ -7595,7 +7679,7 @@
           <a:p>
             <a:fld id="{F7249F8D-641B-4CAF-BAE5-10524742F6F1}" type="datetimeFigureOut">
               <a:rPr lang="en-CA" smtClean="0"/>
-              <a:t>2020-06-20</a:t>
+              <a:t>2020-08-17</a:t>
             </a:fld>
             <a:endParaRPr lang="en-CA"/>
           </a:p>
@@ -23104,7 +23188,7 @@
                     <a:avLst/>
                   </a:prstGeom>
                   <a:blipFill>
-                    <a:blip r:embed="rId2"/>
+                    <a:blip r:embed="rId3"/>
                     <a:stretch>
                       <a:fillRect b="-4762"/>
                     </a:stretch>
@@ -23223,7 +23307,7 @@
                     <a:avLst/>
                   </a:prstGeom>
                   <a:blipFill>
-                    <a:blip r:embed="rId3"/>
+                    <a:blip r:embed="rId4"/>
                     <a:stretch>
                       <a:fillRect b="-6349"/>
                     </a:stretch>
@@ -23440,7 +23524,7 @@
                     <a:avLst/>
                   </a:prstGeom>
                   <a:blipFill>
-                    <a:blip r:embed="rId4"/>
+                    <a:blip r:embed="rId5"/>
                     <a:stretch>
                       <a:fillRect l="-2353" r="-4118" b="-5660"/>
                     </a:stretch>
@@ -28461,10 +28545,10 @@
       </p:grpSp>
       <p:grpSp>
         <p:nvGrpSpPr>
-          <p:cNvPr id="261" name="Group 260">
+          <p:cNvPr id="23" name="Group 22">
             <a:extLst>
               <a:ext uri="{FF2B5EF4-FFF2-40B4-BE49-F238E27FC236}">
-                <a16:creationId xmlns:a16="http://schemas.microsoft.com/office/drawing/2014/main" id="{C7588C17-5364-EC46-80F5-2C500825A251}"/>
+                <a16:creationId xmlns:a16="http://schemas.microsoft.com/office/drawing/2014/main" id="{A346010E-BAA9-5D40-B741-1AA9DB4C56E9}"/>
               </a:ext>
             </a:extLst>
           </p:cNvPr>
@@ -28479,12 +28563,56 @@
             <a:chExt cx="4818136" cy="2680375"/>
           </a:xfrm>
         </p:grpSpPr>
+        <p:cxnSp>
+          <p:nvCxnSpPr>
+            <p:cNvPr id="155" name="Straight Connector 154">
+              <a:extLst>
+                <a:ext uri="{FF2B5EF4-FFF2-40B4-BE49-F238E27FC236}">
+                  <a16:creationId xmlns:a16="http://schemas.microsoft.com/office/drawing/2014/main" id="{D21B7F1D-C767-4A4C-A78D-7A43AF7F479F}"/>
+                </a:ext>
+              </a:extLst>
+            </p:cNvPr>
+            <p:cNvCxnSpPr>
+              <a:cxnSpLocks/>
+            </p:cNvCxnSpPr>
+            <p:nvPr/>
+          </p:nvCxnSpPr>
+          <p:spPr>
+            <a:xfrm>
+              <a:off x="10340654" y="4663664"/>
+              <a:ext cx="1040832" cy="0"/>
+            </a:xfrm>
+            <a:prstGeom prst="line">
+              <a:avLst/>
+            </a:prstGeom>
+            <a:ln w="28575">
+              <a:solidFill>
+                <a:schemeClr val="tx1"/>
+              </a:solidFill>
+              <a:prstDash val="sysDot"/>
+            </a:ln>
+          </p:spPr>
+          <p:style>
+            <a:lnRef idx="1">
+              <a:schemeClr val="accent1"/>
+            </a:lnRef>
+            <a:fillRef idx="0">
+              <a:schemeClr val="accent1"/>
+            </a:fillRef>
+            <a:effectRef idx="0">
+              <a:schemeClr val="accent1"/>
+            </a:effectRef>
+            <a:fontRef idx="minor">
+              <a:schemeClr val="tx1"/>
+            </a:fontRef>
+          </p:style>
+        </p:cxnSp>
         <p:grpSp>
           <p:nvGrpSpPr>
-            <p:cNvPr id="195" name="Group 194">
+            <p:cNvPr id="22" name="Group 21">
               <a:extLst>
                 <a:ext uri="{FF2B5EF4-FFF2-40B4-BE49-F238E27FC236}">
-                  <a16:creationId xmlns:a16="http://schemas.microsoft.com/office/drawing/2014/main" id="{2BFC2339-6213-144B-AB3E-554A5650AF77}"/>
+                  <a16:creationId xmlns:a16="http://schemas.microsoft.com/office/drawing/2014/main" id="{938FFF33-26E0-9946-9556-E74F5E07F8E2}"/>
                 </a:ext>
               </a:extLst>
             </p:cNvPr>
@@ -28494,17 +28622,17 @@
           <p:grpSpPr>
             <a:xfrm>
               <a:off x="7388126" y="3233156"/>
-              <a:ext cx="2441515" cy="2680375"/>
-              <a:chOff x="9303300" y="3291840"/>
-              <a:chExt cx="2441515" cy="2680375"/>
+              <a:ext cx="4818136" cy="2680375"/>
+              <a:chOff x="7388126" y="3233156"/>
+              <a:chExt cx="4818136" cy="2680375"/>
             </a:xfrm>
           </p:grpSpPr>
           <p:grpSp>
             <p:nvGrpSpPr>
-              <p:cNvPr id="100" name="Group 99">
+              <p:cNvPr id="261" name="Group 260">
                 <a:extLst>
                   <a:ext uri="{FF2B5EF4-FFF2-40B4-BE49-F238E27FC236}">
-                    <a16:creationId xmlns:a16="http://schemas.microsoft.com/office/drawing/2014/main" id="{9989A1DC-5FE4-464D-B291-9E9684221C92}"/>
+                    <a16:creationId xmlns:a16="http://schemas.microsoft.com/office/drawing/2014/main" id="{C7588C17-5364-EC46-80F5-2C500825A251}"/>
                   </a:ext>
                 </a:extLst>
               </p:cNvPr>
@@ -28513,39 +28641,2332 @@
             </p:nvGrpSpPr>
             <p:grpSpPr>
               <a:xfrm>
-                <a:off x="9671086" y="3369473"/>
-                <a:ext cx="2073729" cy="2344246"/>
-                <a:chOff x="5412920" y="1786883"/>
-                <a:chExt cx="2073729" cy="2344246"/>
+                <a:off x="7388126" y="3233156"/>
+                <a:ext cx="4818136" cy="2680375"/>
+                <a:chOff x="7388126" y="3233156"/>
+                <a:chExt cx="4818136" cy="2680375"/>
               </a:xfrm>
             </p:grpSpPr>
-            <p:sp>
-              <p:nvSpPr>
-                <p:cNvPr id="110" name="Arc 109">
+            <p:grpSp>
+              <p:nvGrpSpPr>
+                <p:cNvPr id="195" name="Group 194">
                   <a:extLst>
                     <a:ext uri="{FF2B5EF4-FFF2-40B4-BE49-F238E27FC236}">
-                      <a16:creationId xmlns:a16="http://schemas.microsoft.com/office/drawing/2014/main" id="{4FA81BAA-6036-8E44-977B-310DAB02C7C4}"/>
+                      <a16:creationId xmlns:a16="http://schemas.microsoft.com/office/drawing/2014/main" id="{2BFC2339-6213-144B-AB3E-554A5650AF77}"/>
                     </a:ext>
                   </a:extLst>
                 </p:cNvPr>
-                <p:cNvSpPr/>
+                <p:cNvGrpSpPr/>
                 <p:nvPr/>
-              </p:nvSpPr>
+              </p:nvGrpSpPr>
+              <p:grpSpPr>
+                <a:xfrm>
+                  <a:off x="7388126" y="3233156"/>
+                  <a:ext cx="2441515" cy="2680375"/>
+                  <a:chOff x="9303300" y="3291840"/>
+                  <a:chExt cx="2441515" cy="2680375"/>
+                </a:xfrm>
+              </p:grpSpPr>
+              <p:grpSp>
+                <p:nvGrpSpPr>
+                  <p:cNvPr id="100" name="Group 99">
+                    <a:extLst>
+                      <a:ext uri="{FF2B5EF4-FFF2-40B4-BE49-F238E27FC236}">
+                        <a16:creationId xmlns:a16="http://schemas.microsoft.com/office/drawing/2014/main" id="{9989A1DC-5FE4-464D-B291-9E9684221C92}"/>
+                      </a:ext>
+                    </a:extLst>
+                  </p:cNvPr>
+                  <p:cNvGrpSpPr/>
+                  <p:nvPr/>
+                </p:nvGrpSpPr>
+                <p:grpSpPr>
+                  <a:xfrm>
+                    <a:off x="9671086" y="3369473"/>
+                    <a:ext cx="2073729" cy="2344246"/>
+                    <a:chOff x="5412920" y="1786883"/>
+                    <a:chExt cx="2073729" cy="2344246"/>
+                  </a:xfrm>
+                </p:grpSpPr>
+                <p:sp>
+                  <p:nvSpPr>
+                    <p:cNvPr id="110" name="Arc 109">
+                      <a:extLst>
+                        <a:ext uri="{FF2B5EF4-FFF2-40B4-BE49-F238E27FC236}">
+                          <a16:creationId xmlns:a16="http://schemas.microsoft.com/office/drawing/2014/main" id="{4FA81BAA-6036-8E44-977B-310DAB02C7C4}"/>
+                        </a:ext>
+                      </a:extLst>
+                    </p:cNvPr>
+                    <p:cNvSpPr/>
+                    <p:nvPr/>
+                  </p:nvSpPr>
+                  <p:spPr>
+                    <a:xfrm rot="10800000">
+                      <a:off x="5412920" y="2049236"/>
+                      <a:ext cx="2073729" cy="2081893"/>
+                    </a:xfrm>
+                    <a:prstGeom prst="arc">
+                      <a:avLst>
+                        <a:gd name="adj1" fmla="val 16220217"/>
+                        <a:gd name="adj2" fmla="val 5373956"/>
+                      </a:avLst>
+                    </a:prstGeom>
+                    <a:ln w="76200">
+                      <a:solidFill>
+                        <a:schemeClr val="tx1"/>
+                      </a:solidFill>
+                    </a:ln>
+                  </p:spPr>
+                  <p:style>
+                    <a:lnRef idx="1">
+                      <a:schemeClr val="accent1"/>
+                    </a:lnRef>
+                    <a:fillRef idx="0">
+                      <a:schemeClr val="accent1"/>
+                    </a:fillRef>
+                    <a:effectRef idx="0">
+                      <a:schemeClr val="accent1"/>
+                    </a:effectRef>
+                    <a:fontRef idx="minor">
+                      <a:schemeClr val="tx1"/>
+                    </a:fontRef>
+                  </p:style>
+                  <p:txBody>
+                    <a:bodyPr rtlCol="0" anchor="ctr"/>
+                    <a:lstStyle/>
+                    <a:p>
+                      <a:pPr algn="ctr"/>
+                      <a:endParaRPr lang="en-US"/>
+                    </a:p>
+                  </p:txBody>
+                </p:sp>
+                <p:sp>
+                  <p:nvSpPr>
+                    <p:cNvPr id="114" name="Rectangle 113">
+                      <a:extLst>
+                        <a:ext uri="{FF2B5EF4-FFF2-40B4-BE49-F238E27FC236}">
+                          <a16:creationId xmlns:a16="http://schemas.microsoft.com/office/drawing/2014/main" id="{C68678B2-BC24-824E-82EB-7A71150C64D5}"/>
+                        </a:ext>
+                      </a:extLst>
+                    </p:cNvPr>
+                    <p:cNvSpPr/>
+                    <p:nvPr/>
+                  </p:nvSpPr>
+                  <p:spPr>
+                    <a:xfrm>
+                      <a:off x="6066191" y="2083894"/>
+                      <a:ext cx="184731" cy="369332"/>
+                    </a:xfrm>
+                    <a:prstGeom prst="rect">
+                      <a:avLst/>
+                    </a:prstGeom>
+                  </p:spPr>
+                  <p:txBody>
+                    <a:bodyPr wrap="none">
+                      <a:spAutoFit/>
+                    </a:bodyPr>
+                    <a:lstStyle/>
+                    <a:p>
+                      <a:endParaRPr lang="en-CA" dirty="0"/>
+                    </a:p>
+                  </p:txBody>
+                </p:sp>
+                <mc:AlternateContent xmlns:mc="http://schemas.openxmlformats.org/markup-compatibility/2006" xmlns:a14="http://schemas.microsoft.com/office/drawing/2010/main">
+                  <mc:Choice Requires="a14">
+                    <p:sp>
+                      <p:nvSpPr>
+                        <p:cNvPr id="112" name="Rectangle 111">
+                          <a:extLst>
+                            <a:ext uri="{FF2B5EF4-FFF2-40B4-BE49-F238E27FC236}">
+                              <a16:creationId xmlns:a16="http://schemas.microsoft.com/office/drawing/2014/main" id="{C9D92205-3C73-9F48-BDA4-39790085C891}"/>
+                            </a:ext>
+                          </a:extLst>
+                        </p:cNvPr>
+                        <p:cNvSpPr/>
+                        <p:nvPr/>
+                      </p:nvSpPr>
+                      <p:spPr>
+                        <a:xfrm>
+                          <a:off x="6412290" y="1786883"/>
+                          <a:ext cx="572914" cy="369332"/>
+                        </a:xfrm>
+                        <a:prstGeom prst="rect">
+                          <a:avLst/>
+                        </a:prstGeom>
+                      </p:spPr>
+                      <p:txBody>
+                        <a:bodyPr wrap="none">
+                          <a:spAutoFit/>
+                        </a:bodyPr>
+                        <a:lstStyle/>
+                        <a:p>
+                          <a:pPr/>
+                          <a14:m>
+                            <m:oMathPara xmlns:m="http://schemas.openxmlformats.org/officeDocument/2006/math">
+                              <m:oMathParaPr>
+                                <m:jc m:val="centerGroup"/>
+                              </m:oMathParaPr>
+                              <m:oMath xmlns:m="http://schemas.openxmlformats.org/officeDocument/2006/math">
+                                <m:r>
+                                  <a:rPr lang="en-US" b="0" i="1" smtClean="0">
+                                    <a:latin typeface="Cambria Math" panose="02040503050406030204" pitchFamily="18" charset="0"/>
+                                    <a:cs typeface="Arial" panose="020B0604020202020204" pitchFamily="34" charset="0"/>
+                                  </a:rPr>
+                                  <m:t>+</m:t>
+                                </m:r>
+                                <m:r>
+                                  <a:rPr lang="en-CA" b="0" i="1" smtClean="0">
+                                    <a:latin typeface="Cambria Math" panose="02040503050406030204" pitchFamily="18" charset="0"/>
+                                    <a:cs typeface="Arial" panose="020B0604020202020204" pitchFamily="34" charset="0"/>
+                                  </a:rPr>
+                                  <m:t>𝑄</m:t>
+                                </m:r>
+                              </m:oMath>
+                            </m:oMathPara>
+                          </a14:m>
+                          <a:endParaRPr lang="en-CA" dirty="0"/>
+                        </a:p>
+                      </p:txBody>
+                    </p:sp>
+                  </mc:Choice>
+                  <mc:Fallback xmlns="">
+                    <p:sp>
+                      <p:nvSpPr>
+                        <p:cNvPr id="112" name="Rectangle 111">
+                          <a:extLst>
+                            <a:ext uri="{FF2B5EF4-FFF2-40B4-BE49-F238E27FC236}">
+                              <a16:creationId xmlns:a16="http://schemas.microsoft.com/office/drawing/2014/main" id="{C9D92205-3C73-9F48-BDA4-39790085C891}"/>
+                            </a:ext>
+                          </a:extLst>
+                        </p:cNvPr>
+                        <p:cNvSpPr>
+                          <a:spLocks noRot="1" noChangeAspect="1" noMove="1" noResize="1" noEditPoints="1" noAdjustHandles="1" noChangeArrowheads="1" noChangeShapeType="1" noTextEdit="1"/>
+                        </p:cNvSpPr>
+                        <p:nvPr/>
+                      </p:nvSpPr>
+                      <p:spPr>
+                        <a:xfrm>
+                          <a:off x="6412290" y="1786883"/>
+                          <a:ext cx="572914" cy="369332"/>
+                        </a:xfrm>
+                        <a:prstGeom prst="rect">
+                          <a:avLst/>
+                        </a:prstGeom>
+                        <a:blipFill>
+                          <a:blip r:embed="rId51"/>
+                          <a:stretch>
+                            <a:fillRect b="-3333"/>
+                          </a:stretch>
+                        </a:blipFill>
+                      </p:spPr>
+                      <p:txBody>
+                        <a:bodyPr/>
+                        <a:lstStyle/>
+                        <a:p>
+                          <a:r>
+                            <a:rPr lang="en-US">
+                              <a:noFill/>
+                            </a:rPr>
+                            <a:t> </a:t>
+                          </a:r>
+                        </a:p>
+                      </p:txBody>
+                    </p:sp>
+                  </mc:Fallback>
+                </mc:AlternateContent>
+              </p:grpSp>
+              <p:cxnSp>
+                <p:nvCxnSpPr>
+                  <p:cNvPr id="169" name="Straight Connector 168">
+                    <a:extLst>
+                      <a:ext uri="{FF2B5EF4-FFF2-40B4-BE49-F238E27FC236}">
+                        <a16:creationId xmlns:a16="http://schemas.microsoft.com/office/drawing/2014/main" id="{4F91F26D-DD79-724B-B6A6-8292EEE09A2C}"/>
+                      </a:ext>
+                    </a:extLst>
+                  </p:cNvPr>
+                  <p:cNvCxnSpPr>
+                    <a:cxnSpLocks/>
+                  </p:cNvCxnSpPr>
+                  <p:nvPr/>
+                </p:nvCxnSpPr>
+                <p:spPr>
+                  <a:xfrm>
+                    <a:off x="9333767" y="4649730"/>
+                    <a:ext cx="564783" cy="11286"/>
+                  </a:xfrm>
+                  <a:prstGeom prst="line">
+                    <a:avLst/>
+                  </a:prstGeom>
+                  <a:ln w="28575">
+                    <a:solidFill>
+                      <a:schemeClr val="tx1"/>
+                    </a:solidFill>
+                    <a:prstDash val="sysDot"/>
+                  </a:ln>
+                </p:spPr>
+                <p:style>
+                  <a:lnRef idx="1">
+                    <a:schemeClr val="accent1"/>
+                  </a:lnRef>
+                  <a:fillRef idx="0">
+                    <a:schemeClr val="accent1"/>
+                  </a:fillRef>
+                  <a:effectRef idx="0">
+                    <a:schemeClr val="accent1"/>
+                  </a:effectRef>
+                  <a:fontRef idx="minor">
+                    <a:schemeClr val="tx1"/>
+                  </a:fontRef>
+                </p:style>
+              </p:cxnSp>
+              <p:cxnSp>
+                <p:nvCxnSpPr>
+                  <p:cNvPr id="177" name="Straight Connector 176">
+                    <a:extLst>
+                      <a:ext uri="{FF2B5EF4-FFF2-40B4-BE49-F238E27FC236}">
+                        <a16:creationId xmlns:a16="http://schemas.microsoft.com/office/drawing/2014/main" id="{38A32CF3-31D2-E246-B870-CED9E6FDEF4F}"/>
+                      </a:ext>
+                    </a:extLst>
+                  </p:cNvPr>
+                  <p:cNvCxnSpPr>
+                    <a:cxnSpLocks/>
+                  </p:cNvCxnSpPr>
+                  <p:nvPr/>
+                </p:nvCxnSpPr>
+                <p:spPr>
+                  <a:xfrm flipH="1" flipV="1">
+                    <a:off x="10698028" y="3291840"/>
+                    <a:ext cx="16401" cy="604126"/>
+                  </a:xfrm>
+                  <a:prstGeom prst="line">
+                    <a:avLst/>
+                  </a:prstGeom>
+                  <a:ln w="28575">
+                    <a:solidFill>
+                      <a:schemeClr val="tx1"/>
+                    </a:solidFill>
+                    <a:prstDash val="sysDot"/>
+                  </a:ln>
+                </p:spPr>
+                <p:style>
+                  <a:lnRef idx="1">
+                    <a:schemeClr val="accent1"/>
+                  </a:lnRef>
+                  <a:fillRef idx="0">
+                    <a:schemeClr val="accent1"/>
+                  </a:fillRef>
+                  <a:effectRef idx="0">
+                    <a:schemeClr val="accent1"/>
+                  </a:effectRef>
+                  <a:fontRef idx="minor">
+                    <a:schemeClr val="tx1"/>
+                  </a:fontRef>
+                </p:style>
+              </p:cxnSp>
+              <p:cxnSp>
+                <p:nvCxnSpPr>
+                  <p:cNvPr id="178" name="Straight Connector 177">
+                    <a:extLst>
+                      <a:ext uri="{FF2B5EF4-FFF2-40B4-BE49-F238E27FC236}">
+                        <a16:creationId xmlns:a16="http://schemas.microsoft.com/office/drawing/2014/main" id="{B68FBA41-29DF-024E-A40D-2BAEE27C8309}"/>
+                      </a:ext>
+                    </a:extLst>
+                  </p:cNvPr>
+                  <p:cNvCxnSpPr>
+                    <a:cxnSpLocks/>
+                  </p:cNvCxnSpPr>
+                  <p:nvPr/>
+                </p:nvCxnSpPr>
+                <p:spPr>
+                  <a:xfrm flipH="1" flipV="1">
+                    <a:off x="9680441" y="3652483"/>
+                    <a:ext cx="420689" cy="383333"/>
+                  </a:xfrm>
+                  <a:prstGeom prst="line">
+                    <a:avLst/>
+                  </a:prstGeom>
+                  <a:ln w="28575">
+                    <a:solidFill>
+                      <a:schemeClr val="tx1"/>
+                    </a:solidFill>
+                    <a:prstDash val="sysDot"/>
+                  </a:ln>
+                </p:spPr>
+                <p:style>
+                  <a:lnRef idx="1">
+                    <a:schemeClr val="accent1"/>
+                  </a:lnRef>
+                  <a:fillRef idx="0">
+                    <a:schemeClr val="accent1"/>
+                  </a:fillRef>
+                  <a:effectRef idx="0">
+                    <a:schemeClr val="accent1"/>
+                  </a:effectRef>
+                  <a:fontRef idx="minor">
+                    <a:schemeClr val="tx1"/>
+                  </a:fontRef>
+                </p:style>
+              </p:cxnSp>
+              <p:cxnSp>
+                <p:nvCxnSpPr>
+                  <p:cNvPr id="179" name="Straight Connector 178">
+                    <a:extLst>
+                      <a:ext uri="{FF2B5EF4-FFF2-40B4-BE49-F238E27FC236}">
+                        <a16:creationId xmlns:a16="http://schemas.microsoft.com/office/drawing/2014/main" id="{367518AD-B731-A34E-A14D-C737C4AEECD5}"/>
+                      </a:ext>
+                    </a:extLst>
+                  </p:cNvPr>
+                  <p:cNvCxnSpPr>
+                    <a:cxnSpLocks/>
+                  </p:cNvCxnSpPr>
+                  <p:nvPr/>
+                </p:nvCxnSpPr>
+                <p:spPr>
+                  <a:xfrm flipH="1">
+                    <a:off x="9722620" y="5241594"/>
+                    <a:ext cx="378511" cy="320554"/>
+                  </a:xfrm>
+                  <a:prstGeom prst="line">
+                    <a:avLst/>
+                  </a:prstGeom>
+                  <a:ln w="28575">
+                    <a:solidFill>
+                      <a:schemeClr val="tx1"/>
+                    </a:solidFill>
+                    <a:prstDash val="sysDot"/>
+                  </a:ln>
+                </p:spPr>
+                <p:style>
+                  <a:lnRef idx="1">
+                    <a:schemeClr val="accent1"/>
+                  </a:lnRef>
+                  <a:fillRef idx="0">
+                    <a:schemeClr val="accent1"/>
+                  </a:fillRef>
+                  <a:effectRef idx="0">
+                    <a:schemeClr val="accent1"/>
+                  </a:effectRef>
+                  <a:fontRef idx="minor">
+                    <a:schemeClr val="tx1"/>
+                  </a:fontRef>
+                </p:style>
+              </p:cxnSp>
+              <p:cxnSp>
+                <p:nvCxnSpPr>
+                  <p:cNvPr id="180" name="Straight Connector 179">
+                    <a:extLst>
+                      <a:ext uri="{FF2B5EF4-FFF2-40B4-BE49-F238E27FC236}">
+                        <a16:creationId xmlns:a16="http://schemas.microsoft.com/office/drawing/2014/main" id="{6BBF3D50-8580-4C45-A454-9F86428E84BA}"/>
+                      </a:ext>
+                    </a:extLst>
+                  </p:cNvPr>
+                  <p:cNvCxnSpPr>
+                    <a:cxnSpLocks/>
+                  </p:cNvCxnSpPr>
+                  <p:nvPr/>
+                </p:nvCxnSpPr>
+                <p:spPr>
+                  <a:xfrm flipH="1">
+                    <a:off x="10204441" y="5415271"/>
+                    <a:ext cx="184951" cy="465049"/>
+                  </a:xfrm>
+                  <a:prstGeom prst="line">
+                    <a:avLst/>
+                  </a:prstGeom>
+                  <a:ln w="28575">
+                    <a:solidFill>
+                      <a:schemeClr val="tx1"/>
+                    </a:solidFill>
+                    <a:prstDash val="sysDot"/>
+                  </a:ln>
+                </p:spPr>
+                <p:style>
+                  <a:lnRef idx="1">
+                    <a:schemeClr val="accent1"/>
+                  </a:lnRef>
+                  <a:fillRef idx="0">
+                    <a:schemeClr val="accent1"/>
+                  </a:fillRef>
+                  <a:effectRef idx="0">
+                    <a:schemeClr val="accent1"/>
+                  </a:effectRef>
+                  <a:fontRef idx="minor">
+                    <a:schemeClr val="tx1"/>
+                  </a:fontRef>
+                </p:style>
+              </p:cxnSp>
+              <p:cxnSp>
+                <p:nvCxnSpPr>
+                  <p:cNvPr id="181" name="Straight Connector 180">
+                    <a:extLst>
+                      <a:ext uri="{FF2B5EF4-FFF2-40B4-BE49-F238E27FC236}">
+                        <a16:creationId xmlns:a16="http://schemas.microsoft.com/office/drawing/2014/main" id="{9CF11E88-30FA-CC4F-A2C4-B688EF3D45CD}"/>
+                      </a:ext>
+                    </a:extLst>
+                  </p:cNvPr>
+                  <p:cNvCxnSpPr>
+                    <a:cxnSpLocks/>
+                  </p:cNvCxnSpPr>
+                  <p:nvPr/>
+                </p:nvCxnSpPr>
+                <p:spPr>
+                  <a:xfrm flipH="1">
+                    <a:off x="9465745" y="4922421"/>
+                    <a:ext cx="514644" cy="209131"/>
+                  </a:xfrm>
+                  <a:prstGeom prst="line">
+                    <a:avLst/>
+                  </a:prstGeom>
+                  <a:ln w="28575">
+                    <a:solidFill>
+                      <a:schemeClr val="tx1"/>
+                    </a:solidFill>
+                    <a:prstDash val="sysDot"/>
+                  </a:ln>
+                </p:spPr>
+                <p:style>
+                  <a:lnRef idx="1">
+                    <a:schemeClr val="accent1"/>
+                  </a:lnRef>
+                  <a:fillRef idx="0">
+                    <a:schemeClr val="accent1"/>
+                  </a:fillRef>
+                  <a:effectRef idx="0">
+                    <a:schemeClr val="accent1"/>
+                  </a:effectRef>
+                  <a:fontRef idx="minor">
+                    <a:schemeClr val="tx1"/>
+                  </a:fontRef>
+                </p:style>
+              </p:cxnSp>
+              <p:cxnSp>
+                <p:nvCxnSpPr>
+                  <p:cNvPr id="182" name="Straight Connector 181">
+                    <a:extLst>
+                      <a:ext uri="{FF2B5EF4-FFF2-40B4-BE49-F238E27FC236}">
+                        <a16:creationId xmlns:a16="http://schemas.microsoft.com/office/drawing/2014/main" id="{7830F97C-1424-1141-AA1D-98C0BA070257}"/>
+                      </a:ext>
+                    </a:extLst>
+                  </p:cNvPr>
+                  <p:cNvCxnSpPr>
+                    <a:cxnSpLocks/>
+                  </p:cNvCxnSpPr>
+                  <p:nvPr/>
+                </p:nvCxnSpPr>
+                <p:spPr>
+                  <a:xfrm flipH="1" flipV="1">
+                    <a:off x="9427818" y="4137988"/>
+                    <a:ext cx="522748" cy="196566"/>
+                  </a:xfrm>
+                  <a:prstGeom prst="line">
+                    <a:avLst/>
+                  </a:prstGeom>
+                  <a:ln w="28575">
+                    <a:solidFill>
+                      <a:schemeClr val="tx1"/>
+                    </a:solidFill>
+                    <a:prstDash val="sysDot"/>
+                  </a:ln>
+                </p:spPr>
+                <p:style>
+                  <a:lnRef idx="1">
+                    <a:schemeClr val="accent1"/>
+                  </a:lnRef>
+                  <a:fillRef idx="0">
+                    <a:schemeClr val="accent1"/>
+                  </a:fillRef>
+                  <a:effectRef idx="0">
+                    <a:schemeClr val="accent1"/>
+                  </a:effectRef>
+                  <a:fontRef idx="minor">
+                    <a:schemeClr val="tx1"/>
+                  </a:fontRef>
+                </p:style>
+              </p:cxnSp>
+              <p:cxnSp>
+                <p:nvCxnSpPr>
+                  <p:cNvPr id="183" name="Straight Connector 182">
+                    <a:extLst>
+                      <a:ext uri="{FF2B5EF4-FFF2-40B4-BE49-F238E27FC236}">
+                        <a16:creationId xmlns:a16="http://schemas.microsoft.com/office/drawing/2014/main" id="{FF5448FB-B531-4B43-BE2E-22D3F577A347}"/>
+                      </a:ext>
+                    </a:extLst>
+                  </p:cNvPr>
+                  <p:cNvCxnSpPr>
+                    <a:cxnSpLocks/>
+                  </p:cNvCxnSpPr>
+                  <p:nvPr/>
+                </p:nvCxnSpPr>
+                <p:spPr>
+                  <a:xfrm flipH="1" flipV="1">
+                    <a:off x="10205403" y="3412146"/>
+                    <a:ext cx="211319" cy="502177"/>
+                  </a:xfrm>
+                  <a:prstGeom prst="line">
+                    <a:avLst/>
+                  </a:prstGeom>
+                  <a:ln w="28575">
+                    <a:solidFill>
+                      <a:schemeClr val="tx1"/>
+                    </a:solidFill>
+                    <a:prstDash val="sysDot"/>
+                  </a:ln>
+                </p:spPr>
+                <p:style>
+                  <a:lnRef idx="1">
+                    <a:schemeClr val="accent1"/>
+                  </a:lnRef>
+                  <a:fillRef idx="0">
+                    <a:schemeClr val="accent1"/>
+                  </a:fillRef>
+                  <a:effectRef idx="0">
+                    <a:schemeClr val="accent1"/>
+                  </a:effectRef>
+                  <a:fontRef idx="minor">
+                    <a:schemeClr val="tx1"/>
+                  </a:fontRef>
+                </p:style>
+              </p:cxnSp>
+              <p:cxnSp>
+                <p:nvCxnSpPr>
+                  <p:cNvPr id="184" name="Straight Connector 183">
+                    <a:extLst>
+                      <a:ext uri="{FF2B5EF4-FFF2-40B4-BE49-F238E27FC236}">
+                        <a16:creationId xmlns:a16="http://schemas.microsoft.com/office/drawing/2014/main" id="{984CDA77-CA1A-3549-89CC-649B80C62C98}"/>
+                      </a:ext>
+                    </a:extLst>
+                  </p:cNvPr>
+                  <p:cNvCxnSpPr>
+                    <a:cxnSpLocks/>
+                  </p:cNvCxnSpPr>
+                  <p:nvPr/>
+                </p:nvCxnSpPr>
+                <p:spPr>
+                  <a:xfrm flipH="1" flipV="1">
+                    <a:off x="10698028" y="5512194"/>
+                    <a:ext cx="12172" cy="460021"/>
+                  </a:xfrm>
+                  <a:prstGeom prst="line">
+                    <a:avLst/>
+                  </a:prstGeom>
+                  <a:ln w="28575">
+                    <a:solidFill>
+                      <a:schemeClr val="tx1"/>
+                    </a:solidFill>
+                    <a:prstDash val="sysDot"/>
+                  </a:ln>
+                </p:spPr>
+                <p:style>
+                  <a:lnRef idx="1">
+                    <a:schemeClr val="accent1"/>
+                  </a:lnRef>
+                  <a:fillRef idx="0">
+                    <a:schemeClr val="accent1"/>
+                  </a:fillRef>
+                  <a:effectRef idx="0">
+                    <a:schemeClr val="accent1"/>
+                  </a:effectRef>
+                  <a:fontRef idx="minor">
+                    <a:schemeClr val="tx1"/>
+                  </a:fontRef>
+                </p:style>
+              </p:cxnSp>
+              <p:sp>
+                <p:nvSpPr>
+                  <p:cNvPr id="185" name="Arc 184">
+                    <a:extLst>
+                      <a:ext uri="{FF2B5EF4-FFF2-40B4-BE49-F238E27FC236}">
+                        <a16:creationId xmlns:a16="http://schemas.microsoft.com/office/drawing/2014/main" id="{18857C18-3A7B-DA45-8275-EF03C1854BB4}"/>
+                      </a:ext>
+                    </a:extLst>
+                  </p:cNvPr>
+                  <p:cNvSpPr/>
+                  <p:nvPr/>
+                </p:nvSpPr>
+                <p:spPr>
+                  <a:xfrm rot="10800000">
+                    <a:off x="9670841" y="3636211"/>
+                    <a:ext cx="2073729" cy="2081893"/>
+                  </a:xfrm>
+                  <a:prstGeom prst="arc">
+                    <a:avLst>
+                      <a:gd name="adj1" fmla="val 1497270"/>
+                      <a:gd name="adj2" fmla="val 2683173"/>
+                    </a:avLst>
+                  </a:prstGeom>
+                  <a:ln w="76200">
+                    <a:solidFill>
+                      <a:srgbClr val="FF0000"/>
+                    </a:solidFill>
+                  </a:ln>
+                </p:spPr>
+                <p:style>
+                  <a:lnRef idx="1">
+                    <a:schemeClr val="accent1"/>
+                  </a:lnRef>
+                  <a:fillRef idx="0">
+                    <a:schemeClr val="accent1"/>
+                  </a:fillRef>
+                  <a:effectRef idx="0">
+                    <a:schemeClr val="accent1"/>
+                  </a:effectRef>
+                  <a:fontRef idx="minor">
+                    <a:schemeClr val="tx1"/>
+                  </a:fontRef>
+                </p:style>
+                <p:txBody>
+                  <a:bodyPr rtlCol="0" anchor="ctr"/>
+                  <a:lstStyle/>
+                  <a:p>
+                    <a:pPr algn="ctr"/>
+                    <a:endParaRPr lang="en-US"/>
+                  </a:p>
+                </p:txBody>
+              </p:sp>
+              <mc:AlternateContent xmlns:mc="http://schemas.openxmlformats.org/markup-compatibility/2006" xmlns:a14="http://schemas.microsoft.com/office/drawing/2010/main">
+                <mc:Choice Requires="a14">
+                  <p:sp>
+                    <p:nvSpPr>
+                      <p:cNvPr id="186" name="Rectangle 185">
+                        <a:extLst>
+                          <a:ext uri="{FF2B5EF4-FFF2-40B4-BE49-F238E27FC236}">
+                            <a16:creationId xmlns:a16="http://schemas.microsoft.com/office/drawing/2014/main" id="{E6FC3F51-5FD8-274B-ACC6-0C34C41003A3}"/>
+                          </a:ext>
+                        </a:extLst>
+                      </p:cNvPr>
+                      <p:cNvSpPr/>
+                      <p:nvPr/>
+                    </p:nvSpPr>
+                    <p:spPr>
+                      <a:xfrm>
+                        <a:off x="9859166" y="4024690"/>
+                        <a:ext cx="502638" cy="369332"/>
+                      </a:xfrm>
+                      <a:prstGeom prst="rect">
+                        <a:avLst/>
+                      </a:prstGeom>
+                    </p:spPr>
+                    <p:txBody>
+                      <a:bodyPr wrap="none">
+                        <a:spAutoFit/>
+                      </a:bodyPr>
+                      <a:lstStyle/>
+                      <a:p>
+                        <a:pPr/>
+                        <a14:m>
+                          <m:oMathPara xmlns:m="http://schemas.openxmlformats.org/officeDocument/2006/math">
+                            <m:oMathParaPr>
+                              <m:jc m:val="centerGroup"/>
+                            </m:oMathParaPr>
+                            <m:oMath xmlns:m="http://schemas.openxmlformats.org/officeDocument/2006/math">
+                              <m:r>
+                                <a:rPr lang="en-US" b="0" i="1" smtClean="0">
+                                  <a:solidFill>
+                                    <a:srgbClr val="FF0000"/>
+                                  </a:solidFill>
+                                  <a:latin typeface="Cambria Math" panose="02040503050406030204" pitchFamily="18" charset="0"/>
+                                  <a:cs typeface="Arial" panose="020B0604020202020204" pitchFamily="34" charset="0"/>
+                                </a:rPr>
+                                <m:t>𝑑𝑞</m:t>
+                              </m:r>
+                            </m:oMath>
+                          </m:oMathPara>
+                        </a14:m>
+                        <a:endParaRPr lang="en-CA" dirty="0">
+                          <a:solidFill>
+                            <a:srgbClr val="FF0000"/>
+                          </a:solidFill>
+                        </a:endParaRPr>
+                      </a:p>
+                    </p:txBody>
+                  </p:sp>
+                </mc:Choice>
+                <mc:Fallback xmlns="">
+                  <p:sp>
+                    <p:nvSpPr>
+                      <p:cNvPr id="186" name="Rectangle 185">
+                        <a:extLst>
+                          <a:ext uri="{FF2B5EF4-FFF2-40B4-BE49-F238E27FC236}">
+                            <a16:creationId xmlns:a16="http://schemas.microsoft.com/office/drawing/2014/main" id="{E6FC3F51-5FD8-274B-ACC6-0C34C41003A3}"/>
+                          </a:ext>
+                        </a:extLst>
+                      </p:cNvPr>
+                      <p:cNvSpPr>
+                        <a:spLocks noRot="1" noChangeAspect="1" noMove="1" noResize="1" noEditPoints="1" noAdjustHandles="1" noChangeArrowheads="1" noChangeShapeType="1" noTextEdit="1"/>
+                      </p:cNvSpPr>
+                      <p:nvPr/>
+                    </p:nvSpPr>
+                    <p:spPr>
+                      <a:xfrm>
+                        <a:off x="9859166" y="4024690"/>
+                        <a:ext cx="502638" cy="369332"/>
+                      </a:xfrm>
+                      <a:prstGeom prst="rect">
+                        <a:avLst/>
+                      </a:prstGeom>
+                      <a:blipFill>
+                        <a:blip r:embed="rId52"/>
+                        <a:stretch>
+                          <a:fillRect b="-13793"/>
+                        </a:stretch>
+                      </a:blipFill>
+                    </p:spPr>
+                    <p:txBody>
+                      <a:bodyPr/>
+                      <a:lstStyle/>
+                      <a:p>
+                        <a:r>
+                          <a:rPr lang="en-US">
+                            <a:noFill/>
+                          </a:rPr>
+                          <a:t> </a:t>
+                        </a:r>
+                      </a:p>
+                    </p:txBody>
+                  </p:sp>
+                </mc:Fallback>
+              </mc:AlternateContent>
+              <mc:AlternateContent xmlns:mc="http://schemas.openxmlformats.org/markup-compatibility/2006" xmlns:a14="http://schemas.microsoft.com/office/drawing/2010/main">
+                <mc:Choice Requires="a14">
+                  <p:sp>
+                    <p:nvSpPr>
+                      <p:cNvPr id="191" name="Rectangle 190">
+                        <a:extLst>
+                          <a:ext uri="{FF2B5EF4-FFF2-40B4-BE49-F238E27FC236}">
+                            <a16:creationId xmlns:a16="http://schemas.microsoft.com/office/drawing/2014/main" id="{014CCFBB-6722-6A4F-8A77-22D7DA29FC49}"/>
+                          </a:ext>
+                        </a:extLst>
+                      </p:cNvPr>
+                      <p:cNvSpPr/>
+                      <p:nvPr/>
+                    </p:nvSpPr>
+                    <p:spPr>
+                      <a:xfrm>
+                        <a:off x="9303300" y="3691245"/>
+                        <a:ext cx="481157" cy="369332"/>
+                      </a:xfrm>
+                      <a:prstGeom prst="rect">
+                        <a:avLst/>
+                      </a:prstGeom>
+                    </p:spPr>
+                    <p:txBody>
+                      <a:bodyPr wrap="none">
+                        <a:spAutoFit/>
+                      </a:bodyPr>
+                      <a:lstStyle/>
+                      <a:p>
+                        <a:pPr/>
+                        <a14:m>
+                          <m:oMathPara xmlns:m="http://schemas.openxmlformats.org/officeDocument/2006/math">
+                            <m:oMathParaPr>
+                              <m:jc m:val="centerGroup"/>
+                            </m:oMathParaPr>
+                            <m:oMath xmlns:m="http://schemas.openxmlformats.org/officeDocument/2006/math">
+                              <m:r>
+                                <a:rPr lang="en-US" b="0" i="1" smtClean="0">
+                                  <a:solidFill>
+                                    <a:sysClr val="windowText" lastClr="000000"/>
+                                  </a:solidFill>
+                                  <a:latin typeface="Cambria Math" panose="02040503050406030204" pitchFamily="18" charset="0"/>
+                                  <a:cs typeface="Arial" panose="020B0604020202020204" pitchFamily="34" charset="0"/>
+                                </a:rPr>
+                                <m:t>𝑑</m:t>
+                              </m:r>
+                              <m:r>
+                                <a:rPr lang="en-CA" b="0" i="1" smtClean="0">
+                                  <a:solidFill>
+                                    <a:sysClr val="windowText" lastClr="000000"/>
+                                  </a:solidFill>
+                                  <a:latin typeface="Cambria Math" panose="02040503050406030204" pitchFamily="18" charset="0"/>
+                                  <a:cs typeface="Arial" panose="020B0604020202020204" pitchFamily="34" charset="0"/>
+                                </a:rPr>
+                                <m:t>𝑠</m:t>
+                              </m:r>
+                            </m:oMath>
+                          </m:oMathPara>
+                        </a14:m>
+                        <a:endParaRPr lang="en-CA" dirty="0">
+                          <a:solidFill>
+                            <a:sysClr val="windowText" lastClr="000000"/>
+                          </a:solidFill>
+                        </a:endParaRPr>
+                      </a:p>
+                    </p:txBody>
+                  </p:sp>
+                </mc:Choice>
+                <mc:Fallback xmlns="">
+                  <p:sp>
+                    <p:nvSpPr>
+                      <p:cNvPr id="191" name="Rectangle 190">
+                        <a:extLst>
+                          <a:ext uri="{FF2B5EF4-FFF2-40B4-BE49-F238E27FC236}">
+                            <a16:creationId xmlns:a16="http://schemas.microsoft.com/office/drawing/2014/main" id="{014CCFBB-6722-6A4F-8A77-22D7DA29FC49}"/>
+                          </a:ext>
+                        </a:extLst>
+                      </p:cNvPr>
+                      <p:cNvSpPr>
+                        <a:spLocks noRot="1" noChangeAspect="1" noMove="1" noResize="1" noEditPoints="1" noAdjustHandles="1" noChangeArrowheads="1" noChangeShapeType="1" noTextEdit="1"/>
+                      </p:cNvSpPr>
+                      <p:nvPr/>
+                    </p:nvSpPr>
+                    <p:spPr>
+                      <a:xfrm>
+                        <a:off x="9303300" y="3691245"/>
+                        <a:ext cx="481157" cy="369332"/>
+                      </a:xfrm>
+                      <a:prstGeom prst="rect">
+                        <a:avLst/>
+                      </a:prstGeom>
+                      <a:blipFill>
+                        <a:blip r:embed="rId53"/>
+                        <a:stretch>
+                          <a:fillRect/>
+                        </a:stretch>
+                      </a:blipFill>
+                    </p:spPr>
+                    <p:txBody>
+                      <a:bodyPr/>
+                      <a:lstStyle/>
+                      <a:p>
+                        <a:r>
+                          <a:rPr lang="en-US">
+                            <a:noFill/>
+                          </a:rPr>
+                          <a:t> </a:t>
+                        </a:r>
+                      </a:p>
+                    </p:txBody>
+                  </p:sp>
+                </mc:Fallback>
+              </mc:AlternateContent>
+              <p:sp>
+                <p:nvSpPr>
+                  <p:cNvPr id="192" name="Arc 191">
+                    <a:extLst>
+                      <a:ext uri="{FF2B5EF4-FFF2-40B4-BE49-F238E27FC236}">
+                        <a16:creationId xmlns:a16="http://schemas.microsoft.com/office/drawing/2014/main" id="{B266F71F-8768-354D-B310-40B194CC3E44}"/>
+                      </a:ext>
+                    </a:extLst>
+                  </p:cNvPr>
+                  <p:cNvSpPr/>
+                  <p:nvPr/>
+                </p:nvSpPr>
+                <p:spPr>
+                  <a:xfrm rot="10800000">
+                    <a:off x="9548728" y="3500043"/>
+                    <a:ext cx="2073729" cy="2081893"/>
+                  </a:xfrm>
+                  <a:prstGeom prst="arc">
+                    <a:avLst>
+                      <a:gd name="adj1" fmla="val 1126946"/>
+                      <a:gd name="adj2" fmla="val 2683173"/>
+                    </a:avLst>
+                  </a:prstGeom>
+                  <a:ln>
+                    <a:headEnd type="triangle" w="med" len="med"/>
+                    <a:tailEnd type="triangle" w="med" len="med"/>
+                  </a:ln>
+                </p:spPr>
+                <p:style>
+                  <a:lnRef idx="1">
+                    <a:schemeClr val="dk1"/>
+                  </a:lnRef>
+                  <a:fillRef idx="0">
+                    <a:schemeClr val="dk1"/>
+                  </a:fillRef>
+                  <a:effectRef idx="0">
+                    <a:schemeClr val="dk1"/>
+                  </a:effectRef>
+                  <a:fontRef idx="minor">
+                    <a:schemeClr val="tx1"/>
+                  </a:fontRef>
+                </p:style>
+                <p:txBody>
+                  <a:bodyPr rtlCol="0" anchor="ctr"/>
+                  <a:lstStyle/>
+                  <a:p>
+                    <a:pPr algn="ctr"/>
+                    <a:endParaRPr lang="en-US" dirty="0"/>
+                  </a:p>
+                </p:txBody>
+              </p:sp>
+            </p:grpSp>
+            <p:grpSp>
+              <p:nvGrpSpPr>
+                <p:cNvPr id="258" name="Group 257">
+                  <a:extLst>
+                    <a:ext uri="{FF2B5EF4-FFF2-40B4-BE49-F238E27FC236}">
+                      <a16:creationId xmlns:a16="http://schemas.microsoft.com/office/drawing/2014/main" id="{E3B36A3F-17B4-914E-A5AF-CC25A7D64F2D}"/>
+                    </a:ext>
+                  </a:extLst>
+                </p:cNvPr>
+                <p:cNvGrpSpPr/>
+                <p:nvPr/>
+              </p:nvGrpSpPr>
+              <p:grpSpPr>
+                <a:xfrm>
+                  <a:off x="10160654" y="3520782"/>
+                  <a:ext cx="2045608" cy="2317972"/>
+                  <a:chOff x="10136902" y="3520782"/>
+                  <a:chExt cx="2045608" cy="2317972"/>
+                </a:xfrm>
+              </p:grpSpPr>
+              <p:grpSp>
+                <p:nvGrpSpPr>
+                  <p:cNvPr id="222" name="Group 221">
+                    <a:extLst>
+                      <a:ext uri="{FF2B5EF4-FFF2-40B4-BE49-F238E27FC236}">
+                        <a16:creationId xmlns:a16="http://schemas.microsoft.com/office/drawing/2014/main" id="{E5638698-39A1-B341-BC3C-08A670FCB314}"/>
+                      </a:ext>
+                    </a:extLst>
+                  </p:cNvPr>
+                  <p:cNvGrpSpPr/>
+                  <p:nvPr/>
+                </p:nvGrpSpPr>
+                <p:grpSpPr>
+                  <a:xfrm>
+                    <a:off x="10136902" y="3520782"/>
+                    <a:ext cx="1164217" cy="2317972"/>
+                    <a:chOff x="10448191" y="3397305"/>
+                    <a:chExt cx="1164217" cy="2317972"/>
+                  </a:xfrm>
+                </p:grpSpPr>
+                <p:sp>
+                  <p:nvSpPr>
+                    <p:cNvPr id="214" name="Oval 213">
+                      <a:extLst>
+                        <a:ext uri="{FF2B5EF4-FFF2-40B4-BE49-F238E27FC236}">
+                          <a16:creationId xmlns:a16="http://schemas.microsoft.com/office/drawing/2014/main" id="{D4B62D77-C78B-6645-B5D5-10C3ACBDDA9E}"/>
+                        </a:ext>
+                      </a:extLst>
+                    </p:cNvPr>
+                    <p:cNvSpPr/>
+                    <p:nvPr/>
+                  </p:nvSpPr>
+                  <p:spPr>
+                    <a:xfrm>
+                      <a:off x="11252408" y="3397305"/>
+                      <a:ext cx="360000" cy="360000"/>
+                    </a:xfrm>
+                    <a:prstGeom prst="ellipse">
+                      <a:avLst/>
+                    </a:prstGeom>
+                    <a:solidFill>
+                      <a:schemeClr val="bg2">
+                        <a:lumMod val="90000"/>
+                      </a:schemeClr>
+                    </a:solidFill>
+                    <a:ln w="38100">
+                      <a:solidFill>
+                        <a:schemeClr val="tx1"/>
+                      </a:solidFill>
+                    </a:ln>
+                  </p:spPr>
+                  <p:style>
+                    <a:lnRef idx="2">
+                      <a:schemeClr val="accent1">
+                        <a:shade val="50000"/>
+                      </a:schemeClr>
+                    </a:lnRef>
+                    <a:fillRef idx="1">
+                      <a:schemeClr val="accent1"/>
+                    </a:fillRef>
+                    <a:effectRef idx="0">
+                      <a:schemeClr val="accent1"/>
+                    </a:effectRef>
+                    <a:fontRef idx="minor">
+                      <a:schemeClr val="lt1"/>
+                    </a:fontRef>
+                  </p:style>
+                  <p:txBody>
+                    <a:bodyPr rtlCol="0" anchor="ctr"/>
+                    <a:lstStyle/>
+                    <a:p>
+                      <a:pPr algn="ctr"/>
+                      <a:endParaRPr lang="en-US"/>
+                    </a:p>
+                  </p:txBody>
+                </p:sp>
+                <p:sp>
+                  <p:nvSpPr>
+                    <p:cNvPr id="215" name="Oval 214">
+                      <a:extLst>
+                        <a:ext uri="{FF2B5EF4-FFF2-40B4-BE49-F238E27FC236}">
+                          <a16:creationId xmlns:a16="http://schemas.microsoft.com/office/drawing/2014/main" id="{12D7DD06-328A-0047-9F91-805568295E5B}"/>
+                        </a:ext>
+                      </a:extLst>
+                    </p:cNvPr>
+                    <p:cNvSpPr/>
+                    <p:nvPr/>
+                  </p:nvSpPr>
+                  <p:spPr>
+                    <a:xfrm>
+                      <a:off x="10882877" y="3533266"/>
+                      <a:ext cx="360000" cy="360000"/>
+                    </a:xfrm>
+                    <a:prstGeom prst="ellipse">
+                      <a:avLst/>
+                    </a:prstGeom>
+                    <a:solidFill>
+                      <a:schemeClr val="bg2">
+                        <a:lumMod val="90000"/>
+                      </a:schemeClr>
+                    </a:solidFill>
+                    <a:ln w="38100">
+                      <a:solidFill>
+                        <a:schemeClr val="tx1"/>
+                      </a:solidFill>
+                    </a:ln>
+                  </p:spPr>
+                  <p:style>
+                    <a:lnRef idx="2">
+                      <a:schemeClr val="accent1">
+                        <a:shade val="50000"/>
+                      </a:schemeClr>
+                    </a:lnRef>
+                    <a:fillRef idx="1">
+                      <a:schemeClr val="accent1"/>
+                    </a:fillRef>
+                    <a:effectRef idx="0">
+                      <a:schemeClr val="accent1"/>
+                    </a:effectRef>
+                    <a:fontRef idx="minor">
+                      <a:schemeClr val="lt1"/>
+                    </a:fontRef>
+                  </p:style>
+                  <p:txBody>
+                    <a:bodyPr rtlCol="0" anchor="ctr"/>
+                    <a:lstStyle/>
+                    <a:p>
+                      <a:pPr algn="ctr"/>
+                      <a:endParaRPr lang="en-US"/>
+                    </a:p>
+                  </p:txBody>
+                </p:sp>
+                <p:sp>
+                  <p:nvSpPr>
+                    <p:cNvPr id="216" name="Oval 215">
+                      <a:extLst>
+                        <a:ext uri="{FF2B5EF4-FFF2-40B4-BE49-F238E27FC236}">
+                          <a16:creationId xmlns:a16="http://schemas.microsoft.com/office/drawing/2014/main" id="{26931EDA-2391-3C49-9683-83690145B980}"/>
+                        </a:ext>
+                      </a:extLst>
+                    </p:cNvPr>
+                    <p:cNvSpPr/>
+                    <p:nvPr/>
+                  </p:nvSpPr>
+                  <p:spPr>
+                    <a:xfrm>
+                      <a:off x="10610837" y="3812696"/>
+                      <a:ext cx="360000" cy="360000"/>
+                    </a:xfrm>
+                    <a:prstGeom prst="ellipse">
+                      <a:avLst/>
+                    </a:prstGeom>
+                    <a:solidFill>
+                      <a:srgbClr val="FF0000"/>
+                    </a:solidFill>
+                    <a:ln w="38100">
+                      <a:solidFill>
+                        <a:schemeClr val="tx1"/>
+                      </a:solidFill>
+                    </a:ln>
+                  </p:spPr>
+                  <p:style>
+                    <a:lnRef idx="2">
+                      <a:schemeClr val="accent1">
+                        <a:shade val="50000"/>
+                      </a:schemeClr>
+                    </a:lnRef>
+                    <a:fillRef idx="1">
+                      <a:schemeClr val="accent1"/>
+                    </a:fillRef>
+                    <a:effectRef idx="0">
+                      <a:schemeClr val="accent1"/>
+                    </a:effectRef>
+                    <a:fontRef idx="minor">
+                      <a:schemeClr val="lt1"/>
+                    </a:fontRef>
+                  </p:style>
+                  <p:txBody>
+                    <a:bodyPr rtlCol="0" anchor="ctr"/>
+                    <a:lstStyle/>
+                    <a:p>
+                      <a:pPr algn="ctr"/>
+                      <a:endParaRPr lang="en-US"/>
+                    </a:p>
+                  </p:txBody>
+                </p:sp>
+                <p:sp>
+                  <p:nvSpPr>
+                    <p:cNvPr id="217" name="Oval 216">
+                      <a:extLst>
+                        <a:ext uri="{FF2B5EF4-FFF2-40B4-BE49-F238E27FC236}">
+                          <a16:creationId xmlns:a16="http://schemas.microsoft.com/office/drawing/2014/main" id="{911151A9-26C2-474E-9558-00FAA16798E3}"/>
+                        </a:ext>
+                      </a:extLst>
+                    </p:cNvPr>
+                    <p:cNvSpPr/>
+                    <p:nvPr/>
+                  </p:nvSpPr>
+                  <p:spPr>
+                    <a:xfrm>
+                      <a:off x="10448529" y="4166758"/>
+                      <a:ext cx="360000" cy="360000"/>
+                    </a:xfrm>
+                    <a:prstGeom prst="ellipse">
+                      <a:avLst/>
+                    </a:prstGeom>
+                    <a:solidFill>
+                      <a:schemeClr val="bg2">
+                        <a:lumMod val="90000"/>
+                      </a:schemeClr>
+                    </a:solidFill>
+                    <a:ln w="38100">
+                      <a:solidFill>
+                        <a:schemeClr val="tx1"/>
+                      </a:solidFill>
+                    </a:ln>
+                  </p:spPr>
+                  <p:style>
+                    <a:lnRef idx="2">
+                      <a:schemeClr val="accent1">
+                        <a:shade val="50000"/>
+                      </a:schemeClr>
+                    </a:lnRef>
+                    <a:fillRef idx="1">
+                      <a:schemeClr val="accent1"/>
+                    </a:fillRef>
+                    <a:effectRef idx="0">
+                      <a:schemeClr val="accent1"/>
+                    </a:effectRef>
+                    <a:fontRef idx="minor">
+                      <a:schemeClr val="lt1"/>
+                    </a:fontRef>
+                  </p:style>
+                  <p:txBody>
+                    <a:bodyPr rtlCol="0" anchor="ctr"/>
+                    <a:lstStyle/>
+                    <a:p>
+                      <a:pPr algn="ctr"/>
+                      <a:endParaRPr lang="en-US"/>
+                    </a:p>
+                  </p:txBody>
+                </p:sp>
+                <p:sp>
+                  <p:nvSpPr>
+                    <p:cNvPr id="218" name="Oval 217">
+                      <a:extLst>
+                        <a:ext uri="{FF2B5EF4-FFF2-40B4-BE49-F238E27FC236}">
+                          <a16:creationId xmlns:a16="http://schemas.microsoft.com/office/drawing/2014/main" id="{A6260E0C-B4B0-0B47-9486-B825E09782C3}"/>
+                        </a:ext>
+                      </a:extLst>
+                    </p:cNvPr>
+                    <p:cNvSpPr/>
+                    <p:nvPr/>
+                  </p:nvSpPr>
+                  <p:spPr>
+                    <a:xfrm>
+                      <a:off x="10448191" y="4549331"/>
+                      <a:ext cx="360000" cy="360000"/>
+                    </a:xfrm>
+                    <a:prstGeom prst="ellipse">
+                      <a:avLst/>
+                    </a:prstGeom>
+                    <a:solidFill>
+                      <a:schemeClr val="bg2">
+                        <a:lumMod val="90000"/>
+                      </a:schemeClr>
+                    </a:solidFill>
+                    <a:ln w="38100">
+                      <a:solidFill>
+                        <a:schemeClr val="tx1"/>
+                      </a:solidFill>
+                    </a:ln>
+                  </p:spPr>
+                  <p:style>
+                    <a:lnRef idx="2">
+                      <a:schemeClr val="accent1">
+                        <a:shade val="50000"/>
+                      </a:schemeClr>
+                    </a:lnRef>
+                    <a:fillRef idx="1">
+                      <a:schemeClr val="accent1"/>
+                    </a:fillRef>
+                    <a:effectRef idx="0">
+                      <a:schemeClr val="accent1"/>
+                    </a:effectRef>
+                    <a:fontRef idx="minor">
+                      <a:schemeClr val="lt1"/>
+                    </a:fontRef>
+                  </p:style>
+                  <p:txBody>
+                    <a:bodyPr rtlCol="0" anchor="ctr"/>
+                    <a:lstStyle/>
+                    <a:p>
+                      <a:pPr algn="ctr"/>
+                      <a:endParaRPr lang="en-US"/>
+                    </a:p>
+                  </p:txBody>
+                </p:sp>
+                <p:sp>
+                  <p:nvSpPr>
+                    <p:cNvPr id="219" name="Oval 218">
+                      <a:extLst>
+                        <a:ext uri="{FF2B5EF4-FFF2-40B4-BE49-F238E27FC236}">
+                          <a16:creationId xmlns:a16="http://schemas.microsoft.com/office/drawing/2014/main" id="{0AB75E57-D9A6-9047-B797-6E8D60F1E171}"/>
+                        </a:ext>
+                      </a:extLst>
+                    </p:cNvPr>
+                    <p:cNvSpPr/>
+                    <p:nvPr/>
+                  </p:nvSpPr>
+                  <p:spPr>
+                    <a:xfrm>
+                      <a:off x="11207249" y="5355277"/>
+                      <a:ext cx="360000" cy="360000"/>
+                    </a:xfrm>
+                    <a:prstGeom prst="ellipse">
+                      <a:avLst/>
+                    </a:prstGeom>
+                    <a:solidFill>
+                      <a:schemeClr val="bg2">
+                        <a:lumMod val="90000"/>
+                      </a:schemeClr>
+                    </a:solidFill>
+                    <a:ln w="38100">
+                      <a:solidFill>
+                        <a:schemeClr val="tx1"/>
+                      </a:solidFill>
+                    </a:ln>
+                  </p:spPr>
+                  <p:style>
+                    <a:lnRef idx="2">
+                      <a:schemeClr val="accent1">
+                        <a:shade val="50000"/>
+                      </a:schemeClr>
+                    </a:lnRef>
+                    <a:fillRef idx="1">
+                      <a:schemeClr val="accent1"/>
+                    </a:fillRef>
+                    <a:effectRef idx="0">
+                      <a:schemeClr val="accent1"/>
+                    </a:effectRef>
+                    <a:fontRef idx="minor">
+                      <a:schemeClr val="lt1"/>
+                    </a:fontRef>
+                  </p:style>
+                  <p:txBody>
+                    <a:bodyPr rtlCol="0" anchor="ctr"/>
+                    <a:lstStyle/>
+                    <a:p>
+                      <a:pPr algn="ctr"/>
+                      <a:endParaRPr lang="en-US"/>
+                    </a:p>
+                  </p:txBody>
+                </p:sp>
+                <p:sp>
+                  <p:nvSpPr>
+                    <p:cNvPr id="220" name="Oval 219">
+                      <a:extLst>
+                        <a:ext uri="{FF2B5EF4-FFF2-40B4-BE49-F238E27FC236}">
+                          <a16:creationId xmlns:a16="http://schemas.microsoft.com/office/drawing/2014/main" id="{21E09330-09F5-8E4C-80CC-B2F15A3E774B}"/>
+                        </a:ext>
+                      </a:extLst>
+                    </p:cNvPr>
+                    <p:cNvSpPr/>
+                    <p:nvPr/>
+                  </p:nvSpPr>
+                  <p:spPr>
+                    <a:xfrm>
+                      <a:off x="10581652" y="4916004"/>
+                      <a:ext cx="360000" cy="360000"/>
+                    </a:xfrm>
+                    <a:prstGeom prst="ellipse">
+                      <a:avLst/>
+                    </a:prstGeom>
+                    <a:solidFill>
+                      <a:schemeClr val="bg2">
+                        <a:lumMod val="90000"/>
+                      </a:schemeClr>
+                    </a:solidFill>
+                    <a:ln w="38100">
+                      <a:solidFill>
+                        <a:schemeClr val="tx1"/>
+                      </a:solidFill>
+                    </a:ln>
+                  </p:spPr>
+                  <p:style>
+                    <a:lnRef idx="2">
+                      <a:schemeClr val="accent1">
+                        <a:shade val="50000"/>
+                      </a:schemeClr>
+                    </a:lnRef>
+                    <a:fillRef idx="1">
+                      <a:schemeClr val="accent1"/>
+                    </a:fillRef>
+                    <a:effectRef idx="0">
+                      <a:schemeClr val="accent1"/>
+                    </a:effectRef>
+                    <a:fontRef idx="minor">
+                      <a:schemeClr val="lt1"/>
+                    </a:fontRef>
+                  </p:style>
+                  <p:txBody>
+                    <a:bodyPr rtlCol="0" anchor="ctr"/>
+                    <a:lstStyle/>
+                    <a:p>
+                      <a:pPr algn="ctr"/>
+                      <a:endParaRPr lang="en-US"/>
+                    </a:p>
+                  </p:txBody>
+                </p:sp>
+                <p:sp>
+                  <p:nvSpPr>
+                    <p:cNvPr id="221" name="Oval 220">
+                      <a:extLst>
+                        <a:ext uri="{FF2B5EF4-FFF2-40B4-BE49-F238E27FC236}">
+                          <a16:creationId xmlns:a16="http://schemas.microsoft.com/office/drawing/2014/main" id="{FCB1BEB8-3C03-CE43-841E-6A22D5F3011B}"/>
+                        </a:ext>
+                      </a:extLst>
+                    </p:cNvPr>
+                    <p:cNvSpPr/>
+                    <p:nvPr/>
+                  </p:nvSpPr>
+                  <p:spPr>
+                    <a:xfrm>
+                      <a:off x="10852377" y="5192159"/>
+                      <a:ext cx="360000" cy="360000"/>
+                    </a:xfrm>
+                    <a:prstGeom prst="ellipse">
+                      <a:avLst/>
+                    </a:prstGeom>
+                    <a:solidFill>
+                      <a:schemeClr val="bg2">
+                        <a:lumMod val="90000"/>
+                      </a:schemeClr>
+                    </a:solidFill>
+                    <a:ln w="38100">
+                      <a:solidFill>
+                        <a:schemeClr val="tx1"/>
+                      </a:solidFill>
+                    </a:ln>
+                  </p:spPr>
+                  <p:style>
+                    <a:lnRef idx="2">
+                      <a:schemeClr val="accent1">
+                        <a:shade val="50000"/>
+                      </a:schemeClr>
+                    </a:lnRef>
+                    <a:fillRef idx="1">
+                      <a:schemeClr val="accent1"/>
+                    </a:fillRef>
+                    <a:effectRef idx="0">
+                      <a:schemeClr val="accent1"/>
+                    </a:effectRef>
+                    <a:fontRef idx="minor">
+                      <a:schemeClr val="lt1"/>
+                    </a:fontRef>
+                  </p:style>
+                  <p:txBody>
+                    <a:bodyPr rtlCol="0" anchor="ctr"/>
+                    <a:lstStyle/>
+                    <a:p>
+                      <a:pPr algn="ctr"/>
+                      <a:endParaRPr lang="en-US"/>
+                    </a:p>
+                  </p:txBody>
+                </p:sp>
+              </p:grpSp>
+              <mc:AlternateContent xmlns:mc="http://schemas.openxmlformats.org/markup-compatibility/2006">
+                <mc:Choice xmlns:a14="http://schemas.microsoft.com/office/drawing/2010/main" Requires="a14">
+                  <p:sp>
+                    <p:nvSpPr>
+                      <p:cNvPr id="223" name="Rectangle 222">
+                        <a:extLst>
+                          <a:ext uri="{FF2B5EF4-FFF2-40B4-BE49-F238E27FC236}">
+                            <a16:creationId xmlns:a16="http://schemas.microsoft.com/office/drawing/2014/main" id="{03060D8D-8F00-6046-AB36-F0B285C1E2AB}"/>
+                          </a:ext>
+                        </a:extLst>
+                      </p:cNvPr>
+                      <p:cNvSpPr/>
+                      <p:nvPr/>
+                    </p:nvSpPr>
+                    <p:spPr>
+                      <a:xfrm>
+                        <a:off x="10227081" y="3912386"/>
+                        <a:ext cx="502638" cy="369332"/>
+                      </a:xfrm>
+                      <a:prstGeom prst="rect">
+                        <a:avLst/>
+                      </a:prstGeom>
+                    </p:spPr>
+                    <p:txBody>
+                      <a:bodyPr wrap="none">
+                        <a:spAutoFit/>
+                      </a:bodyPr>
+                      <a:lstStyle/>
+                      <a:p>
+                        <a:pPr/>
+                        <a14:m>
+                          <m:oMathPara xmlns:m="http://schemas.openxmlformats.org/officeDocument/2006/math">
+                            <m:oMathParaPr>
+                              <m:jc m:val="centerGroup"/>
+                            </m:oMathParaPr>
+                            <m:oMath xmlns:m="http://schemas.openxmlformats.org/officeDocument/2006/math">
+                              <m:r>
+                                <a:rPr lang="en-US" b="0" i="1" smtClean="0">
+                                  <a:solidFill>
+                                    <a:schemeClr val="tx1"/>
+                                  </a:solidFill>
+                                  <a:latin typeface="Cambria Math" panose="02040503050406030204" pitchFamily="18" charset="0"/>
+                                  <a:cs typeface="Arial" panose="020B0604020202020204" pitchFamily="34" charset="0"/>
+                                </a:rPr>
+                                <m:t>𝑑𝑞</m:t>
+                              </m:r>
+                            </m:oMath>
+                          </m:oMathPara>
+                        </a14:m>
+                        <a:endParaRPr lang="en-CA" dirty="0">
+                          <a:solidFill>
+                            <a:sysClr val="windowText" lastClr="000000"/>
+                          </a:solidFill>
+                        </a:endParaRPr>
+                      </a:p>
+                    </p:txBody>
+                  </p:sp>
+                </mc:Choice>
+                <mc:Fallback>
+                  <p:sp>
+                    <p:nvSpPr>
+                      <p:cNvPr id="223" name="Rectangle 222">
+                        <a:extLst>
+                          <a:ext uri="{FF2B5EF4-FFF2-40B4-BE49-F238E27FC236}">
+                            <a16:creationId xmlns:a16="http://schemas.microsoft.com/office/drawing/2014/main" id="{03060D8D-8F00-6046-AB36-F0B285C1E2AB}"/>
+                          </a:ext>
+                        </a:extLst>
+                      </p:cNvPr>
+                      <p:cNvSpPr>
+                        <a:spLocks noRot="1" noChangeAspect="1" noMove="1" noResize="1" noEditPoints="1" noAdjustHandles="1" noChangeArrowheads="1" noChangeShapeType="1" noTextEdit="1"/>
+                      </p:cNvSpPr>
+                      <p:nvPr/>
+                    </p:nvSpPr>
+                    <p:spPr>
+                      <a:xfrm>
+                        <a:off x="10227081" y="3912386"/>
+                        <a:ext cx="502638" cy="369332"/>
+                      </a:xfrm>
+                      <a:prstGeom prst="rect">
+                        <a:avLst/>
+                      </a:prstGeom>
+                      <a:blipFill>
+                        <a:blip r:embed="rId54"/>
+                        <a:stretch>
+                          <a:fillRect b="-13333"/>
+                        </a:stretch>
+                      </a:blipFill>
+                    </p:spPr>
+                    <p:txBody>
+                      <a:bodyPr/>
+                      <a:lstStyle/>
+                      <a:p>
+                        <a:r>
+                          <a:rPr lang="en-US">
+                            <a:noFill/>
+                          </a:rPr>
+                          <a:t> </a:t>
+                        </a:r>
+                      </a:p>
+                    </p:txBody>
+                  </p:sp>
+                </mc:Fallback>
+              </mc:AlternateContent>
+              <p:grpSp>
+                <p:nvGrpSpPr>
+                  <p:cNvPr id="224" name="Group 223">
+                    <a:extLst>
+                      <a:ext uri="{FF2B5EF4-FFF2-40B4-BE49-F238E27FC236}">
+                        <a16:creationId xmlns:a16="http://schemas.microsoft.com/office/drawing/2014/main" id="{BCBB2C23-A70D-7E4B-AFEF-43A8F726762E}"/>
+                      </a:ext>
+                    </a:extLst>
+                  </p:cNvPr>
+                  <p:cNvGrpSpPr/>
+                  <p:nvPr/>
+                </p:nvGrpSpPr>
+                <p:grpSpPr>
+                  <a:xfrm>
+                    <a:off x="10594337" y="3718185"/>
+                    <a:ext cx="1588173" cy="1246577"/>
+                    <a:chOff x="6859080" y="925653"/>
+                    <a:chExt cx="1588173" cy="1246577"/>
+                  </a:xfrm>
+                </p:grpSpPr>
+                <p:grpSp>
+                  <p:nvGrpSpPr>
+                    <p:cNvPr id="229" name="Group 228">
+                      <a:extLst>
+                        <a:ext uri="{FF2B5EF4-FFF2-40B4-BE49-F238E27FC236}">
+                          <a16:creationId xmlns:a16="http://schemas.microsoft.com/office/drawing/2014/main" id="{C31410D3-4DF3-1F45-9FA1-2D4CDEFCBF84}"/>
+                        </a:ext>
+                      </a:extLst>
+                    </p:cNvPr>
+                    <p:cNvGrpSpPr/>
+                    <p:nvPr/>
+                  </p:nvGrpSpPr>
+                  <p:grpSpPr>
+                    <a:xfrm>
+                      <a:off x="6944871" y="925653"/>
+                      <a:ext cx="1502382" cy="1246577"/>
+                      <a:chOff x="804916" y="1614682"/>
+                      <a:chExt cx="1502382" cy="1246577"/>
+                    </a:xfrm>
+                  </p:grpSpPr>
+                  <p:grpSp>
+                    <p:nvGrpSpPr>
+                      <p:cNvPr id="231" name="Group 230">
+                        <a:extLst>
+                          <a:ext uri="{FF2B5EF4-FFF2-40B4-BE49-F238E27FC236}">
+                            <a16:creationId xmlns:a16="http://schemas.microsoft.com/office/drawing/2014/main" id="{3841CE85-BB99-A043-9C43-6A8F322FE869}"/>
+                          </a:ext>
+                        </a:extLst>
+                      </p:cNvPr>
+                      <p:cNvGrpSpPr/>
+                      <p:nvPr/>
+                    </p:nvGrpSpPr>
+                    <p:grpSpPr>
+                      <a:xfrm>
+                        <a:off x="804916" y="1912196"/>
+                        <a:ext cx="1502382" cy="949063"/>
+                        <a:chOff x="832211" y="1884900"/>
+                        <a:chExt cx="1502382" cy="949063"/>
+                      </a:xfrm>
+                    </p:grpSpPr>
+                    <p:cxnSp>
+                      <p:nvCxnSpPr>
+                        <p:cNvPr id="233" name="Straight Arrow Connector 232">
+                          <a:extLst>
+                            <a:ext uri="{FF2B5EF4-FFF2-40B4-BE49-F238E27FC236}">
+                              <a16:creationId xmlns:a16="http://schemas.microsoft.com/office/drawing/2014/main" id="{19909298-340F-5447-B7A2-DF67481FB267}"/>
+                            </a:ext>
+                          </a:extLst>
+                        </p:cNvPr>
+                        <p:cNvCxnSpPr/>
+                        <p:nvPr/>
+                      </p:nvCxnSpPr>
+                      <p:spPr>
+                        <a:xfrm flipV="1">
+                          <a:off x="1516583" y="1884900"/>
+                          <a:ext cx="7346" cy="655380"/>
+                        </a:xfrm>
+                        <a:prstGeom prst="straightConnector1">
+                          <a:avLst/>
+                        </a:prstGeom>
+                        <a:ln w="38100">
+                          <a:solidFill>
+                            <a:schemeClr val="tx1"/>
+                          </a:solidFill>
+                          <a:tailEnd type="triangle"/>
+                        </a:ln>
+                      </p:spPr>
+                      <p:style>
+                        <a:lnRef idx="1">
+                          <a:schemeClr val="accent1"/>
+                        </a:lnRef>
+                        <a:fillRef idx="0">
+                          <a:schemeClr val="accent1"/>
+                        </a:fillRef>
+                        <a:effectRef idx="0">
+                          <a:schemeClr val="accent1"/>
+                        </a:effectRef>
+                        <a:fontRef idx="minor">
+                          <a:schemeClr val="tx1"/>
+                        </a:fontRef>
+                      </p:style>
+                    </p:cxnSp>
+                    <p:cxnSp>
+                      <p:nvCxnSpPr>
+                        <p:cNvPr id="234" name="Straight Arrow Connector 233">
+                          <a:extLst>
+                            <a:ext uri="{FF2B5EF4-FFF2-40B4-BE49-F238E27FC236}">
+                              <a16:creationId xmlns:a16="http://schemas.microsoft.com/office/drawing/2014/main" id="{530203B1-6371-814C-BB13-24D171C5799A}"/>
+                            </a:ext>
+                          </a:extLst>
+                        </p:cNvPr>
+                        <p:cNvCxnSpPr/>
+                        <p:nvPr/>
+                      </p:nvCxnSpPr>
+                      <p:spPr>
+                        <a:xfrm>
+                          <a:off x="1509817" y="2538065"/>
+                          <a:ext cx="712531" cy="2215"/>
+                        </a:xfrm>
+                        <a:prstGeom prst="straightConnector1">
+                          <a:avLst/>
+                        </a:prstGeom>
+                        <a:ln w="38100">
+                          <a:solidFill>
+                            <a:schemeClr val="tx1"/>
+                          </a:solidFill>
+                          <a:tailEnd type="triangle"/>
+                        </a:ln>
+                      </p:spPr>
+                      <p:style>
+                        <a:lnRef idx="1">
+                          <a:schemeClr val="accent1"/>
+                        </a:lnRef>
+                        <a:fillRef idx="0">
+                          <a:schemeClr val="accent1"/>
+                        </a:fillRef>
+                        <a:effectRef idx="0">
+                          <a:schemeClr val="accent1"/>
+                        </a:effectRef>
+                        <a:fontRef idx="minor">
+                          <a:schemeClr val="tx1"/>
+                        </a:fontRef>
+                      </p:style>
+                    </p:cxnSp>
+                    <mc:AlternateContent xmlns:mc="http://schemas.openxmlformats.org/markup-compatibility/2006" xmlns:a14="http://schemas.microsoft.com/office/drawing/2010/main">
+                      <mc:Choice Requires="a14">
+                        <p:sp>
+                          <p:nvSpPr>
+                            <p:cNvPr id="235" name="Rectangle 234">
+                              <a:extLst>
+                                <a:ext uri="{FF2B5EF4-FFF2-40B4-BE49-F238E27FC236}">
+                                  <a16:creationId xmlns:a16="http://schemas.microsoft.com/office/drawing/2014/main" id="{0AE86D2A-A7B9-854A-B4CD-EA009C808A9B}"/>
+                                </a:ext>
+                              </a:extLst>
+                            </p:cNvPr>
+                            <p:cNvSpPr/>
+                            <p:nvPr/>
+                          </p:nvSpPr>
+                          <p:spPr>
+                            <a:xfrm>
+                              <a:off x="1966608" y="2464631"/>
+                              <a:ext cx="367985" cy="369332"/>
+                            </a:xfrm>
+                            <a:prstGeom prst="rect">
+                              <a:avLst/>
+                            </a:prstGeom>
+                          </p:spPr>
+                          <p:txBody>
+                            <a:bodyPr wrap="none">
+                              <a:spAutoFit/>
+                            </a:bodyPr>
+                            <a:lstStyle/>
+                            <a:p>
+                              <a:pPr/>
+                              <a14:m>
+                                <m:oMathPara xmlns:m="http://schemas.openxmlformats.org/officeDocument/2006/math">
+                                  <m:oMathParaPr>
+                                    <m:jc m:val="centerGroup"/>
+                                  </m:oMathParaPr>
+                                  <m:oMath xmlns:m="http://schemas.openxmlformats.org/officeDocument/2006/math">
+                                    <m:r>
+                                      <a:rPr lang="en-US" i="1">
+                                        <a:latin typeface="Cambria Math" panose="02040503050406030204" pitchFamily="18" charset="0"/>
+                                        <a:cs typeface="Arial" panose="020B0604020202020204" pitchFamily="34" charset="0"/>
+                                      </a:rPr>
+                                      <m:t>𝑥</m:t>
+                                    </m:r>
+                                  </m:oMath>
+                                </m:oMathPara>
+                              </a14:m>
+                              <a:endParaRPr lang="en-CA" dirty="0"/>
+                            </a:p>
+                          </p:txBody>
+                        </p:sp>
+                      </mc:Choice>
+                      <mc:Fallback xmlns="">
+                        <p:sp>
+                          <p:nvSpPr>
+                            <p:cNvPr id="18" name="Rectangle 17"/>
+                            <p:cNvSpPr>
+                              <a:spLocks noRot="1" noChangeAspect="1" noMove="1" noResize="1" noEditPoints="1" noAdjustHandles="1" noChangeArrowheads="1" noChangeShapeType="1" noTextEdit="1"/>
+                            </p:cNvSpPr>
+                            <p:nvPr/>
+                          </p:nvSpPr>
+                          <p:spPr>
+                            <a:xfrm>
+                              <a:off x="1966608" y="2464631"/>
+                              <a:ext cx="367985" cy="369332"/>
+                            </a:xfrm>
+                            <a:prstGeom prst="rect">
+                              <a:avLst/>
+                            </a:prstGeom>
+                            <a:blipFill rotWithShape="0">
+                              <a:blip r:embed="rId36"/>
+                              <a:stretch>
+                                <a:fillRect/>
+                              </a:stretch>
+                            </a:blipFill>
+                          </p:spPr>
+                          <p:txBody>
+                            <a:bodyPr/>
+                            <a:lstStyle/>
+                            <a:p>
+                              <a:r>
+                                <a:rPr lang="en-CA">
+                                  <a:noFill/>
+                                </a:rPr>
+                                <a:t> </a:t>
+                              </a:r>
+                            </a:p>
+                          </p:txBody>
+                        </p:sp>
+                      </mc:Fallback>
+                    </mc:AlternateContent>
+                    <mc:AlternateContent xmlns:mc="http://schemas.openxmlformats.org/markup-compatibility/2006" xmlns:a14="http://schemas.microsoft.com/office/drawing/2010/main">
+                      <mc:Choice Requires="a14">
+                        <p:sp>
+                          <p:nvSpPr>
+                            <p:cNvPr id="236" name="Rectangle 235">
+                              <a:extLst>
+                                <a:ext uri="{FF2B5EF4-FFF2-40B4-BE49-F238E27FC236}">
+                                  <a16:creationId xmlns:a16="http://schemas.microsoft.com/office/drawing/2014/main" id="{69AEE039-DC37-0C42-90B1-177CB1623A1B}"/>
+                                </a:ext>
+                              </a:extLst>
+                            </p:cNvPr>
+                            <p:cNvSpPr/>
+                            <p:nvPr/>
+                          </p:nvSpPr>
+                          <p:spPr>
+                            <a:xfrm>
+                              <a:off x="1164196" y="1973145"/>
+                              <a:ext cx="371384" cy="369332"/>
+                            </a:xfrm>
+                            <a:prstGeom prst="rect">
+                              <a:avLst/>
+                            </a:prstGeom>
+                          </p:spPr>
+                          <p:txBody>
+                            <a:bodyPr wrap="none">
+                              <a:spAutoFit/>
+                            </a:bodyPr>
+                            <a:lstStyle/>
+                            <a:p>
+                              <a:pPr/>
+                              <a14:m>
+                                <m:oMathPara xmlns:m="http://schemas.openxmlformats.org/officeDocument/2006/math">
+                                  <m:oMathParaPr>
+                                    <m:jc m:val="centerGroup"/>
+                                  </m:oMathParaPr>
+                                  <m:oMath xmlns:m="http://schemas.openxmlformats.org/officeDocument/2006/math">
+                                    <m:r>
+                                      <a:rPr lang="en-US" b="0" i="1" smtClean="0">
+                                        <a:latin typeface="Cambria Math" panose="02040503050406030204" pitchFamily="18" charset="0"/>
+                                      </a:rPr>
+                                      <m:t>𝑦</m:t>
+                                    </m:r>
+                                  </m:oMath>
+                                </m:oMathPara>
+                              </a14:m>
+                              <a:endParaRPr lang="en-CA" dirty="0"/>
+                            </a:p>
+                          </p:txBody>
+                        </p:sp>
+                      </mc:Choice>
+                      <mc:Fallback xmlns="">
+                        <p:sp>
+                          <p:nvSpPr>
+                            <p:cNvPr id="64" name="Rectangle 63"/>
+                            <p:cNvSpPr>
+                              <a:spLocks noRot="1" noChangeAspect="1" noMove="1" noResize="1" noEditPoints="1" noAdjustHandles="1" noChangeArrowheads="1" noChangeShapeType="1" noTextEdit="1"/>
+                            </p:cNvSpPr>
+                            <p:nvPr/>
+                          </p:nvSpPr>
+                          <p:spPr>
+                            <a:xfrm>
+                              <a:off x="1164196" y="1973145"/>
+                              <a:ext cx="371384" cy="369332"/>
+                            </a:xfrm>
+                            <a:prstGeom prst="rect">
+                              <a:avLst/>
+                            </a:prstGeom>
+                            <a:blipFill rotWithShape="0">
+                              <a:blip r:embed="rId10"/>
+                              <a:stretch>
+                                <a:fillRect b="-6667"/>
+                              </a:stretch>
+                            </a:blipFill>
+                          </p:spPr>
+                          <p:txBody>
+                            <a:bodyPr/>
+                            <a:lstStyle/>
+                            <a:p>
+                              <a:r>
+                                <a:rPr lang="en-CA">
+                                  <a:noFill/>
+                                </a:rPr>
+                                <a:t> </a:t>
+                              </a:r>
+                            </a:p>
+                          </p:txBody>
+                        </p:sp>
+                      </mc:Fallback>
+                    </mc:AlternateContent>
+                    <mc:AlternateContent xmlns:mc="http://schemas.openxmlformats.org/markup-compatibility/2006">
+                      <mc:Choice xmlns:a14="http://schemas.microsoft.com/office/drawing/2010/main" Requires="a14">
+                        <p:sp>
+                          <p:nvSpPr>
+                            <p:cNvPr id="237" name="Rectangle 236">
+                              <a:extLst>
+                                <a:ext uri="{FF2B5EF4-FFF2-40B4-BE49-F238E27FC236}">
+                                  <a16:creationId xmlns:a16="http://schemas.microsoft.com/office/drawing/2014/main" id="{16E0F214-4B17-9F42-88E1-617004BCC4A7}"/>
+                                </a:ext>
+                              </a:extLst>
+                            </p:cNvPr>
+                            <p:cNvSpPr/>
+                            <p:nvPr/>
+                          </p:nvSpPr>
+                          <p:spPr>
+                            <a:xfrm>
+                              <a:off x="832211" y="2229596"/>
+                              <a:ext cx="374141" cy="369332"/>
+                            </a:xfrm>
+                            <a:prstGeom prst="rect">
+                              <a:avLst/>
+                            </a:prstGeom>
+                          </p:spPr>
+                          <p:txBody>
+                            <a:bodyPr wrap="none">
+                              <a:spAutoFit/>
+                            </a:bodyPr>
+                            <a:lstStyle/>
+                            <a:p>
+                              <a:pPr/>
+                              <a14:m>
+                                <m:oMathPara xmlns:m="http://schemas.openxmlformats.org/officeDocument/2006/math">
+                                  <m:oMathParaPr>
+                                    <m:jc m:val="centerGroup"/>
+                                  </m:oMathParaPr>
+                                  <m:oMath xmlns:m="http://schemas.openxmlformats.org/officeDocument/2006/math">
+                                    <m:r>
+                                      <a:rPr lang="en-CA" b="0" i="1" smtClean="0">
+                                        <a:latin typeface="Cambria Math" panose="02040503050406030204" pitchFamily="18" charset="0"/>
+                                      </a:rPr>
+                                      <m:t>𝜃</m:t>
+                                    </m:r>
+                                  </m:oMath>
+                                </m:oMathPara>
+                              </a14:m>
+                              <a:endParaRPr lang="en-CA" dirty="0"/>
+                            </a:p>
+                          </p:txBody>
+                        </p:sp>
+                      </mc:Choice>
+                      <mc:Fallback>
+                        <p:sp>
+                          <p:nvSpPr>
+                            <p:cNvPr id="237" name="Rectangle 236">
+                              <a:extLst>
+                                <a:ext uri="{FF2B5EF4-FFF2-40B4-BE49-F238E27FC236}">
+                                  <a16:creationId xmlns:a16="http://schemas.microsoft.com/office/drawing/2014/main" id="{16E0F214-4B17-9F42-88E1-617004BCC4A7}"/>
+                                </a:ext>
+                              </a:extLst>
+                            </p:cNvPr>
+                            <p:cNvSpPr>
+                              <a:spLocks noRot="1" noChangeAspect="1" noMove="1" noResize="1" noEditPoints="1" noAdjustHandles="1" noChangeArrowheads="1" noChangeShapeType="1" noTextEdit="1"/>
+                            </p:cNvSpPr>
+                            <p:nvPr/>
+                          </p:nvSpPr>
+                          <p:spPr>
+                            <a:xfrm>
+                              <a:off x="832211" y="2229596"/>
+                              <a:ext cx="374141" cy="369332"/>
+                            </a:xfrm>
+                            <a:prstGeom prst="rect">
+                              <a:avLst/>
+                            </a:prstGeom>
+                            <a:blipFill>
+                              <a:blip r:embed="rId55"/>
+                              <a:stretch>
+                                <a:fillRect/>
+                              </a:stretch>
+                            </a:blipFill>
+                          </p:spPr>
+                          <p:txBody>
+                            <a:bodyPr/>
+                            <a:lstStyle/>
+                            <a:p>
+                              <a:r>
+                                <a:rPr lang="en-US">
+                                  <a:noFill/>
+                                </a:rPr>
+                                <a:t> </a:t>
+                              </a:r>
+                            </a:p>
+                          </p:txBody>
+                        </p:sp>
+                      </mc:Fallback>
+                    </mc:AlternateContent>
+                  </p:grpSp>
+                  <p:sp>
+                    <p:nvSpPr>
+                      <p:cNvPr id="232" name="Rectangle 231">
+                        <a:extLst>
+                          <a:ext uri="{FF2B5EF4-FFF2-40B4-BE49-F238E27FC236}">
+                            <a16:creationId xmlns:a16="http://schemas.microsoft.com/office/drawing/2014/main" id="{EC9F338D-D7BA-5741-969A-1FCC35E0B9E9}"/>
+                          </a:ext>
+                        </a:extLst>
+                      </p:cNvPr>
+                      <p:cNvSpPr/>
+                      <p:nvPr/>
+                    </p:nvSpPr>
+                    <p:spPr>
+                      <a:xfrm>
+                        <a:off x="1129904" y="1614682"/>
+                        <a:ext cx="184731" cy="369332"/>
+                      </a:xfrm>
+                      <a:prstGeom prst="rect">
+                        <a:avLst/>
+                      </a:prstGeom>
+                    </p:spPr>
+                    <p:txBody>
+                      <a:bodyPr wrap="none">
+                        <a:spAutoFit/>
+                      </a:bodyPr>
+                      <a:lstStyle/>
+                      <a:p>
+                        <a:endParaRPr lang="en-CA" dirty="0"/>
+                      </a:p>
+                    </p:txBody>
+                  </p:sp>
+                </p:grpSp>
+                <p:cxnSp>
+                  <p:nvCxnSpPr>
+                    <p:cNvPr id="226" name="Straight Connector 225">
+                      <a:extLst>
+                        <a:ext uri="{FF2B5EF4-FFF2-40B4-BE49-F238E27FC236}">
+                          <a16:creationId xmlns:a16="http://schemas.microsoft.com/office/drawing/2014/main" id="{30737523-4292-AF45-9DF4-9DACB8F73E2F}"/>
+                        </a:ext>
+                      </a:extLst>
+                    </p:cNvPr>
+                    <p:cNvCxnSpPr>
+                      <a:cxnSpLocks/>
+                      <a:stCxn id="216" idx="5"/>
+                    </p:cNvCxnSpPr>
+                    <p:nvPr/>
+                  </p:nvCxnSpPr>
+                  <p:spPr>
+                    <a:xfrm>
+                      <a:off x="6871570" y="1450920"/>
+                      <a:ext cx="776670" cy="441967"/>
+                    </a:xfrm>
+                    <a:prstGeom prst="line">
+                      <a:avLst/>
+                    </a:prstGeom>
+                    <a:ln w="28575">
+                      <a:solidFill>
+                        <a:schemeClr val="tx1"/>
+                      </a:solidFill>
+                      <a:prstDash val="sysDot"/>
+                    </a:ln>
+                  </p:spPr>
+                  <p:style>
+                    <a:lnRef idx="1">
+                      <a:schemeClr val="accent1"/>
+                    </a:lnRef>
+                    <a:fillRef idx="0">
+                      <a:schemeClr val="accent1"/>
+                    </a:fillRef>
+                    <a:effectRef idx="0">
+                      <a:schemeClr val="accent1"/>
+                    </a:effectRef>
+                    <a:fontRef idx="minor">
+                      <a:schemeClr val="tx1"/>
+                    </a:fontRef>
+                  </p:style>
+                </p:cxnSp>
+                <mc:AlternateContent xmlns:mc="http://schemas.openxmlformats.org/markup-compatibility/2006" xmlns:a14="http://schemas.microsoft.com/office/drawing/2010/main">
+                  <mc:Choice Requires="a14">
+                    <p:sp>
+                      <p:nvSpPr>
+                        <p:cNvPr id="227" name="Rectangle 226">
+                          <a:extLst>
+                            <a:ext uri="{FF2B5EF4-FFF2-40B4-BE49-F238E27FC236}">
+                              <a16:creationId xmlns:a16="http://schemas.microsoft.com/office/drawing/2014/main" id="{4CF91009-60D7-BD47-8E0F-E5AE92E2625F}"/>
+                            </a:ext>
+                          </a:extLst>
+                        </p:cNvPr>
+                        <p:cNvSpPr/>
+                        <p:nvPr/>
+                      </p:nvSpPr>
+                      <p:spPr>
+                        <a:xfrm>
+                          <a:off x="6859080" y="1207863"/>
+                          <a:ext cx="391774" cy="369332"/>
+                        </a:xfrm>
+                        <a:prstGeom prst="rect">
+                          <a:avLst/>
+                        </a:prstGeom>
+                      </p:spPr>
+                      <p:txBody>
+                        <a:bodyPr wrap="none">
+                          <a:spAutoFit/>
+                        </a:bodyPr>
+                        <a:lstStyle/>
+                        <a:p>
+                          <a:pPr/>
+                          <a14:m>
+                            <m:oMathPara xmlns:m="http://schemas.openxmlformats.org/officeDocument/2006/math">
+                              <m:oMathParaPr>
+                                <m:jc m:val="centerGroup"/>
+                              </m:oMathParaPr>
+                              <m:oMath xmlns:m="http://schemas.openxmlformats.org/officeDocument/2006/math">
+                                <m:r>
+                                  <a:rPr lang="en-US" b="0" i="1" smtClean="0">
+                                    <a:solidFill>
+                                      <a:schemeClr val="tx1"/>
+                                    </a:solidFill>
+                                    <a:latin typeface="Cambria Math" panose="02040503050406030204" pitchFamily="18" charset="0"/>
+                                    <a:cs typeface="Arial" panose="020B0604020202020204" pitchFamily="34" charset="0"/>
+                                  </a:rPr>
+                                  <m:t>𝑅</m:t>
+                                </m:r>
+                              </m:oMath>
+                            </m:oMathPara>
+                          </a14:m>
+                          <a:endParaRPr lang="en-CA" dirty="0">
+                            <a:solidFill>
+                              <a:schemeClr val="tx1"/>
+                            </a:solidFill>
+                          </a:endParaRPr>
+                        </a:p>
+                      </p:txBody>
+                    </p:sp>
+                  </mc:Choice>
+                  <mc:Fallback xmlns="">
+                    <p:sp>
+                      <p:nvSpPr>
+                        <p:cNvPr id="154" name="Rectangle 153"/>
+                        <p:cNvSpPr>
+                          <a:spLocks noRot="1" noChangeAspect="1" noMove="1" noResize="1" noEditPoints="1" noAdjustHandles="1" noChangeArrowheads="1" noChangeShapeType="1" noTextEdit="1"/>
+                        </p:cNvSpPr>
+                        <p:nvPr/>
+                      </p:nvSpPr>
+                      <p:spPr>
+                        <a:xfrm>
+                          <a:off x="6859080" y="1207863"/>
+                          <a:ext cx="391774" cy="369332"/>
+                        </a:xfrm>
+                        <a:prstGeom prst="rect">
+                          <a:avLst/>
+                        </a:prstGeom>
+                        <a:blipFill>
+                          <a:blip r:embed="rId38"/>
+                          <a:stretch>
+                            <a:fillRect/>
+                          </a:stretch>
+                        </a:blipFill>
+                      </p:spPr>
+                      <p:txBody>
+                        <a:bodyPr/>
+                        <a:lstStyle/>
+                        <a:p>
+                          <a:r>
+                            <a:rPr lang="en-US">
+                              <a:noFill/>
+                            </a:rPr>
+                            <a:t> </a:t>
+                          </a:r>
+                        </a:p>
+                      </p:txBody>
+                    </p:sp>
+                  </mc:Fallback>
+                </mc:AlternateContent>
+              </p:grpSp>
+              <p:cxnSp>
+                <p:nvCxnSpPr>
+                  <p:cNvPr id="253" name="Straight Arrow Connector 252">
+                    <a:extLst>
+                      <a:ext uri="{FF2B5EF4-FFF2-40B4-BE49-F238E27FC236}">
+                        <a16:creationId xmlns:a16="http://schemas.microsoft.com/office/drawing/2014/main" id="{A84A374D-CF84-BA4D-A245-5924A3143468}"/>
+                      </a:ext>
+                    </a:extLst>
+                  </p:cNvPr>
+                  <p:cNvCxnSpPr/>
+                  <p:nvPr/>
+                </p:nvCxnSpPr>
+                <p:spPr>
+                  <a:xfrm>
+                    <a:off x="11376121" y="4665657"/>
+                    <a:ext cx="628234" cy="396159"/>
+                  </a:xfrm>
+                  <a:prstGeom prst="straightConnector1">
+                    <a:avLst/>
+                  </a:prstGeom>
+                  <a:ln w="57150">
+                    <a:solidFill>
+                      <a:srgbClr val="FF0000"/>
+                    </a:solidFill>
+                    <a:tailEnd type="triangle"/>
+                  </a:ln>
+                </p:spPr>
+                <p:style>
+                  <a:lnRef idx="1">
+                    <a:schemeClr val="accent1"/>
+                  </a:lnRef>
+                  <a:fillRef idx="0">
+                    <a:schemeClr val="accent1"/>
+                  </a:fillRef>
+                  <a:effectRef idx="0">
+                    <a:schemeClr val="accent1"/>
+                  </a:effectRef>
+                  <a:fontRef idx="minor">
+                    <a:schemeClr val="tx1"/>
+                  </a:fontRef>
+                </p:style>
+              </p:cxnSp>
+              <mc:AlternateContent xmlns:mc="http://schemas.openxmlformats.org/markup-compatibility/2006" xmlns:a14="http://schemas.microsoft.com/office/drawing/2010/main">
+                <mc:Choice Requires="a14">
+                  <p:sp>
+                    <p:nvSpPr>
+                      <p:cNvPr id="255" name="Rectangle 254">
+                        <a:extLst>
+                          <a:ext uri="{FF2B5EF4-FFF2-40B4-BE49-F238E27FC236}">
+                            <a16:creationId xmlns:a16="http://schemas.microsoft.com/office/drawing/2014/main" id="{2D374B11-BF89-3F48-A96E-E643CE3312AC}"/>
+                          </a:ext>
+                        </a:extLst>
+                      </p:cNvPr>
+                      <p:cNvSpPr/>
+                      <p:nvPr/>
+                    </p:nvSpPr>
+                    <p:spPr>
+                      <a:xfrm>
+                        <a:off x="11264353" y="4807643"/>
+                        <a:ext cx="531235" cy="402931"/>
+                      </a:xfrm>
+                      <a:prstGeom prst="rect">
+                        <a:avLst/>
+                      </a:prstGeom>
+                    </p:spPr>
+                    <p:txBody>
+                      <a:bodyPr wrap="none">
+                        <a:spAutoFit/>
+                      </a:bodyPr>
+                      <a:lstStyle/>
+                      <a:p>
+                        <a:pPr/>
+                        <a14:m>
+                          <m:oMathPara xmlns:m="http://schemas.openxmlformats.org/officeDocument/2006/math">
+                            <m:oMathParaPr>
+                              <m:jc m:val="centerGroup"/>
+                            </m:oMathParaPr>
+                            <m:oMath xmlns:m="http://schemas.openxmlformats.org/officeDocument/2006/math">
+                              <m:r>
+                                <a:rPr lang="en-US" i="1" smtClean="0">
+                                  <a:solidFill>
+                                    <a:srgbClr val="FF0000"/>
+                                  </a:solidFill>
+                                  <a:latin typeface="Cambria Math" panose="02040503050406030204" pitchFamily="18" charset="0"/>
+                                  <a:cs typeface="Arial" panose="020B0604020202020204" pitchFamily="34" charset="0"/>
+                                </a:rPr>
+                                <m:t>𝑑</m:t>
+                              </m:r>
+                              <m:acc>
+                                <m:accPr>
+                                  <m:chr m:val="⃗"/>
+                                  <m:ctrlPr>
+                                    <a:rPr lang="en-US" b="0" i="1" smtClean="0">
+                                      <a:solidFill>
+                                        <a:srgbClr val="FF0000"/>
+                                      </a:solidFill>
+                                      <a:latin typeface="Cambria Math" panose="02040503050406030204" pitchFamily="18" charset="0"/>
+                                      <a:cs typeface="Arial" panose="020B0604020202020204" pitchFamily="34" charset="0"/>
+                                    </a:rPr>
+                                  </m:ctrlPr>
+                                </m:accPr>
+                                <m:e>
+                                  <m:r>
+                                    <a:rPr lang="en-US" i="1" smtClean="0">
+                                      <a:solidFill>
+                                        <a:srgbClr val="FF0000"/>
+                                      </a:solidFill>
+                                      <a:latin typeface="Cambria Math" panose="02040503050406030204" pitchFamily="18" charset="0"/>
+                                      <a:cs typeface="Arial" panose="020B0604020202020204" pitchFamily="34" charset="0"/>
+                                    </a:rPr>
+                                    <m:t>𝐸</m:t>
+                                  </m:r>
+                                </m:e>
+                              </m:acc>
+                            </m:oMath>
+                          </m:oMathPara>
+                        </a14:m>
+                        <a:endParaRPr lang="en-CA" dirty="0"/>
+                      </a:p>
+                    </p:txBody>
+                  </p:sp>
+                </mc:Choice>
+                <mc:Fallback xmlns="">
+                  <p:sp>
+                    <p:nvSpPr>
+                      <p:cNvPr id="255" name="Rectangle 254">
+                        <a:extLst>
+                          <a:ext uri="{FF2B5EF4-FFF2-40B4-BE49-F238E27FC236}">
+                            <a16:creationId xmlns:a16="http://schemas.microsoft.com/office/drawing/2014/main" id="{2D374B11-BF89-3F48-A96E-E643CE3312AC}"/>
+                          </a:ext>
+                        </a:extLst>
+                      </p:cNvPr>
+                      <p:cNvSpPr>
+                        <a:spLocks noRot="1" noChangeAspect="1" noMove="1" noResize="1" noEditPoints="1" noAdjustHandles="1" noChangeArrowheads="1" noChangeShapeType="1" noTextEdit="1"/>
+                      </p:cNvSpPr>
+                      <p:nvPr/>
+                    </p:nvSpPr>
+                    <p:spPr>
+                      <a:xfrm>
+                        <a:off x="11264353" y="4807643"/>
+                        <a:ext cx="531235" cy="402931"/>
+                      </a:xfrm>
+                      <a:prstGeom prst="rect">
+                        <a:avLst/>
+                      </a:prstGeom>
+                      <a:blipFill>
+                        <a:blip r:embed="rId56"/>
+                        <a:stretch>
+                          <a:fillRect/>
+                        </a:stretch>
+                      </a:blipFill>
+                    </p:spPr>
+                    <p:txBody>
+                      <a:bodyPr/>
+                      <a:lstStyle/>
+                      <a:p>
+                        <a:r>
+                          <a:rPr lang="en-US">
+                            <a:noFill/>
+                          </a:rPr>
+                          <a:t> </a:t>
+                        </a:r>
+                      </a:p>
+                    </p:txBody>
+                  </p:sp>
+                </mc:Fallback>
+              </mc:AlternateContent>
+            </p:grpSp>
+            <p:cxnSp>
+              <p:nvCxnSpPr>
+                <p:cNvPr id="260" name="Straight Arrow Connector 259">
+                  <a:extLst>
+                    <a:ext uri="{FF2B5EF4-FFF2-40B4-BE49-F238E27FC236}">
+                      <a16:creationId xmlns:a16="http://schemas.microsoft.com/office/drawing/2014/main" id="{B6FEB149-9261-414B-8471-56DD9F1B18B2}"/>
+                    </a:ext>
+                  </a:extLst>
+                </p:cNvPr>
+                <p:cNvCxnSpPr/>
+                <p:nvPr/>
+              </p:nvCxnSpPr>
               <p:spPr>
-                <a:xfrm rot="10800000">
-                  <a:off x="5412920" y="2049236"/>
-                  <a:ext cx="2073729" cy="2081893"/>
+                <a:xfrm>
+                  <a:off x="9235556" y="4602332"/>
+                  <a:ext cx="717417" cy="0"/>
                 </a:xfrm>
-                <a:prstGeom prst="arc">
-                  <a:avLst>
-                    <a:gd name="adj1" fmla="val 16220217"/>
-                    <a:gd name="adj2" fmla="val 5373956"/>
-                  </a:avLst>
+                <a:prstGeom prst="straightConnector1">
+                  <a:avLst/>
                 </a:prstGeom>
                 <a:ln w="76200">
                   <a:solidFill>
                     <a:schemeClr val="tx1"/>
                   </a:solidFill>
+                  <a:tailEnd type="triangle"/>
                 </a:ln>
               </p:spPr>
               <p:style>
@@ -28562,552 +30983,14 @@
                   <a:schemeClr val="tx1"/>
                 </a:fontRef>
               </p:style>
-              <p:txBody>
-                <a:bodyPr rtlCol="0" anchor="ctr"/>
-                <a:lstStyle/>
-                <a:p>
-                  <a:pPr algn="ctr"/>
-                  <a:endParaRPr lang="en-US"/>
-                </a:p>
-              </p:txBody>
-            </p:sp>
-            <p:sp>
-              <p:nvSpPr>
-                <p:cNvPr id="114" name="Rectangle 113">
-                  <a:extLst>
-                    <a:ext uri="{FF2B5EF4-FFF2-40B4-BE49-F238E27FC236}">
-                      <a16:creationId xmlns:a16="http://schemas.microsoft.com/office/drawing/2014/main" id="{C68678B2-BC24-824E-82EB-7A71150C64D5}"/>
-                    </a:ext>
-                  </a:extLst>
-                </p:cNvPr>
-                <p:cNvSpPr/>
-                <p:nvPr/>
-              </p:nvSpPr>
-              <p:spPr>
-                <a:xfrm>
-                  <a:off x="6066191" y="2083894"/>
-                  <a:ext cx="184731" cy="369332"/>
-                </a:xfrm>
-                <a:prstGeom prst="rect">
-                  <a:avLst/>
-                </a:prstGeom>
-              </p:spPr>
-              <p:txBody>
-                <a:bodyPr wrap="none">
-                  <a:spAutoFit/>
-                </a:bodyPr>
-                <a:lstStyle/>
-                <a:p>
-                  <a:endParaRPr lang="en-CA" dirty="0"/>
-                </a:p>
-              </p:txBody>
-            </p:sp>
-            <mc:AlternateContent xmlns:mc="http://schemas.openxmlformats.org/markup-compatibility/2006">
-              <mc:Choice xmlns:a14="http://schemas.microsoft.com/office/drawing/2010/main" Requires="a14">
-                <p:sp>
-                  <p:nvSpPr>
-                    <p:cNvPr id="112" name="Rectangle 111">
-                      <a:extLst>
-                        <a:ext uri="{FF2B5EF4-FFF2-40B4-BE49-F238E27FC236}">
-                          <a16:creationId xmlns:a16="http://schemas.microsoft.com/office/drawing/2014/main" id="{C9D92205-3C73-9F48-BDA4-39790085C891}"/>
-                        </a:ext>
-                      </a:extLst>
-                    </p:cNvPr>
-                    <p:cNvSpPr/>
-                    <p:nvPr/>
-                  </p:nvSpPr>
-                  <p:spPr>
-                    <a:xfrm>
-                      <a:off x="6412290" y="1786883"/>
-                      <a:ext cx="572914" cy="369332"/>
-                    </a:xfrm>
-                    <a:prstGeom prst="rect">
-                      <a:avLst/>
-                    </a:prstGeom>
-                  </p:spPr>
-                  <p:txBody>
-                    <a:bodyPr wrap="none">
-                      <a:spAutoFit/>
-                    </a:bodyPr>
-                    <a:lstStyle/>
-                    <a:p>
-                      <a:pPr/>
-                      <a14:m>
-                        <m:oMathPara xmlns:m="http://schemas.openxmlformats.org/officeDocument/2006/math">
-                          <m:oMathParaPr>
-                            <m:jc m:val="centerGroup"/>
-                          </m:oMathParaPr>
-                          <m:oMath xmlns:m="http://schemas.openxmlformats.org/officeDocument/2006/math">
-                            <m:r>
-                              <a:rPr lang="en-US" b="0" i="1" smtClean="0">
-                                <a:latin typeface="Cambria Math" panose="02040503050406030204" pitchFamily="18" charset="0"/>
-                                <a:cs typeface="Arial" panose="020B0604020202020204" pitchFamily="34" charset="0"/>
-                              </a:rPr>
-                              <m:t>+</m:t>
-                            </m:r>
-                            <m:r>
-                              <a:rPr lang="en-CA" b="0" i="1" smtClean="0">
-                                <a:latin typeface="Cambria Math" panose="02040503050406030204" pitchFamily="18" charset="0"/>
-                                <a:cs typeface="Arial" panose="020B0604020202020204" pitchFamily="34" charset="0"/>
-                              </a:rPr>
-                              <m:t>𝑄</m:t>
-                            </m:r>
-                          </m:oMath>
-                        </m:oMathPara>
-                      </a14:m>
-                      <a:endParaRPr lang="en-CA" dirty="0"/>
-                    </a:p>
-                  </p:txBody>
-                </p:sp>
-              </mc:Choice>
-              <mc:Fallback>
-                <p:sp>
-                  <p:nvSpPr>
-                    <p:cNvPr id="112" name="Rectangle 111">
-                      <a:extLst>
-                        <a:ext uri="{FF2B5EF4-FFF2-40B4-BE49-F238E27FC236}">
-                          <a16:creationId xmlns:a16="http://schemas.microsoft.com/office/drawing/2014/main" id="{C9D92205-3C73-9F48-BDA4-39790085C891}"/>
-                        </a:ext>
-                      </a:extLst>
-                    </p:cNvPr>
-                    <p:cNvSpPr>
-                      <a:spLocks noRot="1" noChangeAspect="1" noMove="1" noResize="1" noEditPoints="1" noAdjustHandles="1" noChangeArrowheads="1" noChangeShapeType="1" noTextEdit="1"/>
-                    </p:cNvSpPr>
-                    <p:nvPr/>
-                  </p:nvSpPr>
-                  <p:spPr>
-                    <a:xfrm>
-                      <a:off x="6412290" y="1786883"/>
-                      <a:ext cx="572914" cy="369332"/>
-                    </a:xfrm>
-                    <a:prstGeom prst="rect">
-                      <a:avLst/>
-                    </a:prstGeom>
-                    <a:blipFill>
-                      <a:blip r:embed="rId51"/>
-                      <a:stretch>
-                        <a:fillRect b="-3333"/>
-                      </a:stretch>
-                    </a:blipFill>
-                  </p:spPr>
-                  <p:txBody>
-                    <a:bodyPr/>
-                    <a:lstStyle/>
-                    <a:p>
-                      <a:r>
-                        <a:rPr lang="en-US">
-                          <a:noFill/>
-                        </a:rPr>
-                        <a:t> </a:t>
-                      </a:r>
-                    </a:p>
-                  </p:txBody>
-                </p:sp>
-              </mc:Fallback>
-            </mc:AlternateContent>
+            </p:cxnSp>
           </p:grpSp>
-          <p:cxnSp>
-            <p:nvCxnSpPr>
-              <p:cNvPr id="169" name="Straight Connector 168">
+          <p:sp>
+            <p:nvSpPr>
+              <p:cNvPr id="156" name="Arc 155">
                 <a:extLst>
                   <a:ext uri="{FF2B5EF4-FFF2-40B4-BE49-F238E27FC236}">
-                    <a16:creationId xmlns:a16="http://schemas.microsoft.com/office/drawing/2014/main" id="{4F91F26D-DD79-724B-B6A6-8292EEE09A2C}"/>
-                  </a:ext>
-                </a:extLst>
-              </p:cNvPr>
-              <p:cNvCxnSpPr>
-                <a:cxnSpLocks/>
-              </p:cNvCxnSpPr>
-              <p:nvPr/>
-            </p:nvCxnSpPr>
-            <p:spPr>
-              <a:xfrm>
-                <a:off x="9333767" y="4649730"/>
-                <a:ext cx="564783" cy="11286"/>
-              </a:xfrm>
-              <a:prstGeom prst="line">
-                <a:avLst/>
-              </a:prstGeom>
-              <a:ln w="28575">
-                <a:solidFill>
-                  <a:schemeClr val="tx1"/>
-                </a:solidFill>
-                <a:prstDash val="sysDot"/>
-              </a:ln>
-            </p:spPr>
-            <p:style>
-              <a:lnRef idx="1">
-                <a:schemeClr val="accent1"/>
-              </a:lnRef>
-              <a:fillRef idx="0">
-                <a:schemeClr val="accent1"/>
-              </a:fillRef>
-              <a:effectRef idx="0">
-                <a:schemeClr val="accent1"/>
-              </a:effectRef>
-              <a:fontRef idx="minor">
-                <a:schemeClr val="tx1"/>
-              </a:fontRef>
-            </p:style>
-          </p:cxnSp>
-          <p:cxnSp>
-            <p:nvCxnSpPr>
-              <p:cNvPr id="177" name="Straight Connector 176">
-                <a:extLst>
-                  <a:ext uri="{FF2B5EF4-FFF2-40B4-BE49-F238E27FC236}">
-                    <a16:creationId xmlns:a16="http://schemas.microsoft.com/office/drawing/2014/main" id="{38A32CF3-31D2-E246-B870-CED9E6FDEF4F}"/>
-                  </a:ext>
-                </a:extLst>
-              </p:cNvPr>
-              <p:cNvCxnSpPr>
-                <a:cxnSpLocks/>
-              </p:cNvCxnSpPr>
-              <p:nvPr/>
-            </p:nvCxnSpPr>
-            <p:spPr>
-              <a:xfrm flipH="1" flipV="1">
-                <a:off x="10698028" y="3291840"/>
-                <a:ext cx="16401" cy="604126"/>
-              </a:xfrm>
-              <a:prstGeom prst="line">
-                <a:avLst/>
-              </a:prstGeom>
-              <a:ln w="28575">
-                <a:solidFill>
-                  <a:schemeClr val="tx1"/>
-                </a:solidFill>
-                <a:prstDash val="sysDot"/>
-              </a:ln>
-            </p:spPr>
-            <p:style>
-              <a:lnRef idx="1">
-                <a:schemeClr val="accent1"/>
-              </a:lnRef>
-              <a:fillRef idx="0">
-                <a:schemeClr val="accent1"/>
-              </a:fillRef>
-              <a:effectRef idx="0">
-                <a:schemeClr val="accent1"/>
-              </a:effectRef>
-              <a:fontRef idx="minor">
-                <a:schemeClr val="tx1"/>
-              </a:fontRef>
-            </p:style>
-          </p:cxnSp>
-          <p:cxnSp>
-            <p:nvCxnSpPr>
-              <p:cNvPr id="178" name="Straight Connector 177">
-                <a:extLst>
-                  <a:ext uri="{FF2B5EF4-FFF2-40B4-BE49-F238E27FC236}">
-                    <a16:creationId xmlns:a16="http://schemas.microsoft.com/office/drawing/2014/main" id="{B68FBA41-29DF-024E-A40D-2BAEE27C8309}"/>
-                  </a:ext>
-                </a:extLst>
-              </p:cNvPr>
-              <p:cNvCxnSpPr>
-                <a:cxnSpLocks/>
-              </p:cNvCxnSpPr>
-              <p:nvPr/>
-            </p:nvCxnSpPr>
-            <p:spPr>
-              <a:xfrm flipH="1" flipV="1">
-                <a:off x="9680441" y="3652483"/>
-                <a:ext cx="420689" cy="383333"/>
-              </a:xfrm>
-              <a:prstGeom prst="line">
-                <a:avLst/>
-              </a:prstGeom>
-              <a:ln w="28575">
-                <a:solidFill>
-                  <a:schemeClr val="tx1"/>
-                </a:solidFill>
-                <a:prstDash val="sysDot"/>
-              </a:ln>
-            </p:spPr>
-            <p:style>
-              <a:lnRef idx="1">
-                <a:schemeClr val="accent1"/>
-              </a:lnRef>
-              <a:fillRef idx="0">
-                <a:schemeClr val="accent1"/>
-              </a:fillRef>
-              <a:effectRef idx="0">
-                <a:schemeClr val="accent1"/>
-              </a:effectRef>
-              <a:fontRef idx="minor">
-                <a:schemeClr val="tx1"/>
-              </a:fontRef>
-            </p:style>
-          </p:cxnSp>
-          <p:cxnSp>
-            <p:nvCxnSpPr>
-              <p:cNvPr id="179" name="Straight Connector 178">
-                <a:extLst>
-                  <a:ext uri="{FF2B5EF4-FFF2-40B4-BE49-F238E27FC236}">
-                    <a16:creationId xmlns:a16="http://schemas.microsoft.com/office/drawing/2014/main" id="{367518AD-B731-A34E-A14D-C737C4AEECD5}"/>
-                  </a:ext>
-                </a:extLst>
-              </p:cNvPr>
-              <p:cNvCxnSpPr>
-                <a:cxnSpLocks/>
-              </p:cNvCxnSpPr>
-              <p:nvPr/>
-            </p:nvCxnSpPr>
-            <p:spPr>
-              <a:xfrm flipH="1">
-                <a:off x="9722620" y="5241594"/>
-                <a:ext cx="378511" cy="320554"/>
-              </a:xfrm>
-              <a:prstGeom prst="line">
-                <a:avLst/>
-              </a:prstGeom>
-              <a:ln w="28575">
-                <a:solidFill>
-                  <a:schemeClr val="tx1"/>
-                </a:solidFill>
-                <a:prstDash val="sysDot"/>
-              </a:ln>
-            </p:spPr>
-            <p:style>
-              <a:lnRef idx="1">
-                <a:schemeClr val="accent1"/>
-              </a:lnRef>
-              <a:fillRef idx="0">
-                <a:schemeClr val="accent1"/>
-              </a:fillRef>
-              <a:effectRef idx="0">
-                <a:schemeClr val="accent1"/>
-              </a:effectRef>
-              <a:fontRef idx="minor">
-                <a:schemeClr val="tx1"/>
-              </a:fontRef>
-            </p:style>
-          </p:cxnSp>
-          <p:cxnSp>
-            <p:nvCxnSpPr>
-              <p:cNvPr id="180" name="Straight Connector 179">
-                <a:extLst>
-                  <a:ext uri="{FF2B5EF4-FFF2-40B4-BE49-F238E27FC236}">
-                    <a16:creationId xmlns:a16="http://schemas.microsoft.com/office/drawing/2014/main" id="{6BBF3D50-8580-4C45-A454-9F86428E84BA}"/>
-                  </a:ext>
-                </a:extLst>
-              </p:cNvPr>
-              <p:cNvCxnSpPr>
-                <a:cxnSpLocks/>
-              </p:cNvCxnSpPr>
-              <p:nvPr/>
-            </p:nvCxnSpPr>
-            <p:spPr>
-              <a:xfrm flipH="1">
-                <a:off x="10204441" y="5415271"/>
-                <a:ext cx="184951" cy="465049"/>
-              </a:xfrm>
-              <a:prstGeom prst="line">
-                <a:avLst/>
-              </a:prstGeom>
-              <a:ln w="28575">
-                <a:solidFill>
-                  <a:schemeClr val="tx1"/>
-                </a:solidFill>
-                <a:prstDash val="sysDot"/>
-              </a:ln>
-            </p:spPr>
-            <p:style>
-              <a:lnRef idx="1">
-                <a:schemeClr val="accent1"/>
-              </a:lnRef>
-              <a:fillRef idx="0">
-                <a:schemeClr val="accent1"/>
-              </a:fillRef>
-              <a:effectRef idx="0">
-                <a:schemeClr val="accent1"/>
-              </a:effectRef>
-              <a:fontRef idx="minor">
-                <a:schemeClr val="tx1"/>
-              </a:fontRef>
-            </p:style>
-          </p:cxnSp>
-          <p:cxnSp>
-            <p:nvCxnSpPr>
-              <p:cNvPr id="181" name="Straight Connector 180">
-                <a:extLst>
-                  <a:ext uri="{FF2B5EF4-FFF2-40B4-BE49-F238E27FC236}">
-                    <a16:creationId xmlns:a16="http://schemas.microsoft.com/office/drawing/2014/main" id="{9CF11E88-30FA-CC4F-A2C4-B688EF3D45CD}"/>
-                  </a:ext>
-                </a:extLst>
-              </p:cNvPr>
-              <p:cNvCxnSpPr>
-                <a:cxnSpLocks/>
-              </p:cNvCxnSpPr>
-              <p:nvPr/>
-            </p:nvCxnSpPr>
-            <p:spPr>
-              <a:xfrm flipH="1">
-                <a:off x="9465745" y="4922421"/>
-                <a:ext cx="514644" cy="209131"/>
-              </a:xfrm>
-              <a:prstGeom prst="line">
-                <a:avLst/>
-              </a:prstGeom>
-              <a:ln w="28575">
-                <a:solidFill>
-                  <a:schemeClr val="tx1"/>
-                </a:solidFill>
-                <a:prstDash val="sysDot"/>
-              </a:ln>
-            </p:spPr>
-            <p:style>
-              <a:lnRef idx="1">
-                <a:schemeClr val="accent1"/>
-              </a:lnRef>
-              <a:fillRef idx="0">
-                <a:schemeClr val="accent1"/>
-              </a:fillRef>
-              <a:effectRef idx="0">
-                <a:schemeClr val="accent1"/>
-              </a:effectRef>
-              <a:fontRef idx="minor">
-                <a:schemeClr val="tx1"/>
-              </a:fontRef>
-            </p:style>
-          </p:cxnSp>
-          <p:cxnSp>
-            <p:nvCxnSpPr>
-              <p:cNvPr id="182" name="Straight Connector 181">
-                <a:extLst>
-                  <a:ext uri="{FF2B5EF4-FFF2-40B4-BE49-F238E27FC236}">
-                    <a16:creationId xmlns:a16="http://schemas.microsoft.com/office/drawing/2014/main" id="{7830F97C-1424-1141-AA1D-98C0BA070257}"/>
-                  </a:ext>
-                </a:extLst>
-              </p:cNvPr>
-              <p:cNvCxnSpPr>
-                <a:cxnSpLocks/>
-              </p:cNvCxnSpPr>
-              <p:nvPr/>
-            </p:nvCxnSpPr>
-            <p:spPr>
-              <a:xfrm flipH="1" flipV="1">
-                <a:off x="9427818" y="4137988"/>
-                <a:ext cx="522748" cy="196566"/>
-              </a:xfrm>
-              <a:prstGeom prst="line">
-                <a:avLst/>
-              </a:prstGeom>
-              <a:ln w="28575">
-                <a:solidFill>
-                  <a:schemeClr val="tx1"/>
-                </a:solidFill>
-                <a:prstDash val="sysDot"/>
-              </a:ln>
-            </p:spPr>
-            <p:style>
-              <a:lnRef idx="1">
-                <a:schemeClr val="accent1"/>
-              </a:lnRef>
-              <a:fillRef idx="0">
-                <a:schemeClr val="accent1"/>
-              </a:fillRef>
-              <a:effectRef idx="0">
-                <a:schemeClr val="accent1"/>
-              </a:effectRef>
-              <a:fontRef idx="minor">
-                <a:schemeClr val="tx1"/>
-              </a:fontRef>
-            </p:style>
-          </p:cxnSp>
-          <p:cxnSp>
-            <p:nvCxnSpPr>
-              <p:cNvPr id="183" name="Straight Connector 182">
-                <a:extLst>
-                  <a:ext uri="{FF2B5EF4-FFF2-40B4-BE49-F238E27FC236}">
-                    <a16:creationId xmlns:a16="http://schemas.microsoft.com/office/drawing/2014/main" id="{FF5448FB-B531-4B43-BE2E-22D3F577A347}"/>
-                  </a:ext>
-                </a:extLst>
-              </p:cNvPr>
-              <p:cNvCxnSpPr>
-                <a:cxnSpLocks/>
-              </p:cNvCxnSpPr>
-              <p:nvPr/>
-            </p:nvCxnSpPr>
-            <p:spPr>
-              <a:xfrm flipH="1" flipV="1">
-                <a:off x="10205403" y="3412146"/>
-                <a:ext cx="211319" cy="502177"/>
-              </a:xfrm>
-              <a:prstGeom prst="line">
-                <a:avLst/>
-              </a:prstGeom>
-              <a:ln w="28575">
-                <a:solidFill>
-                  <a:schemeClr val="tx1"/>
-                </a:solidFill>
-                <a:prstDash val="sysDot"/>
-              </a:ln>
-            </p:spPr>
-            <p:style>
-              <a:lnRef idx="1">
-                <a:schemeClr val="accent1"/>
-              </a:lnRef>
-              <a:fillRef idx="0">
-                <a:schemeClr val="accent1"/>
-              </a:fillRef>
-              <a:effectRef idx="0">
-                <a:schemeClr val="accent1"/>
-              </a:effectRef>
-              <a:fontRef idx="minor">
-                <a:schemeClr val="tx1"/>
-              </a:fontRef>
-            </p:style>
-          </p:cxnSp>
-          <p:cxnSp>
-            <p:nvCxnSpPr>
-              <p:cNvPr id="184" name="Straight Connector 183">
-                <a:extLst>
-                  <a:ext uri="{FF2B5EF4-FFF2-40B4-BE49-F238E27FC236}">
-                    <a16:creationId xmlns:a16="http://schemas.microsoft.com/office/drawing/2014/main" id="{984CDA77-CA1A-3549-89CC-649B80C62C98}"/>
-                  </a:ext>
-                </a:extLst>
-              </p:cNvPr>
-              <p:cNvCxnSpPr>
-                <a:cxnSpLocks/>
-              </p:cNvCxnSpPr>
-              <p:nvPr/>
-            </p:nvCxnSpPr>
-            <p:spPr>
-              <a:xfrm flipH="1" flipV="1">
-                <a:off x="10698028" y="5512194"/>
-                <a:ext cx="12172" cy="460021"/>
-              </a:xfrm>
-              <a:prstGeom prst="line">
-                <a:avLst/>
-              </a:prstGeom>
-              <a:ln w="28575">
-                <a:solidFill>
-                  <a:schemeClr val="tx1"/>
-                </a:solidFill>
-                <a:prstDash val="sysDot"/>
-              </a:ln>
-            </p:spPr>
-            <p:style>
-              <a:lnRef idx="1">
-                <a:schemeClr val="accent1"/>
-              </a:lnRef>
-              <a:fillRef idx="0">
-                <a:schemeClr val="accent1"/>
-              </a:fillRef>
-              <a:effectRef idx="0">
-                <a:schemeClr val="accent1"/>
-              </a:effectRef>
-              <a:fontRef idx="minor">
-                <a:schemeClr val="tx1"/>
-              </a:fontRef>
-            </p:style>
-          </p:cxnSp>
-          <p:sp>
-            <p:nvSpPr>
-              <p:cNvPr id="185" name="Arc 184">
-                <a:extLst>
-                  <a:ext uri="{FF2B5EF4-FFF2-40B4-BE49-F238E27FC236}">
-                    <a16:creationId xmlns:a16="http://schemas.microsoft.com/office/drawing/2014/main" id="{18857C18-3A7B-DA45-8275-EF03C1854BB4}"/>
+                    <a16:creationId xmlns:a16="http://schemas.microsoft.com/office/drawing/2014/main" id="{BE813244-8014-CA4C-AF6E-35D24338417E}"/>
                   </a:ext>
                 </a:extLst>
               </p:cNvPr>
@@ -29116,286 +30999,18 @@
             </p:nvSpPr>
             <p:spPr>
               <a:xfrm rot="10800000">
-                <a:off x="9670841" y="3636211"/>
-                <a:ext cx="2073729" cy="2081893"/>
+                <a:off x="11013899" y="4317802"/>
+                <a:ext cx="720000" cy="720000"/>
               </a:xfrm>
               <a:prstGeom prst="arc">
                 <a:avLst>
-                  <a:gd name="adj1" fmla="val 1497270"/>
-                  <a:gd name="adj2" fmla="val 2683173"/>
-                </a:avLst>
-              </a:prstGeom>
-              <a:ln w="76200">
-                <a:solidFill>
-                  <a:srgbClr val="FF0000"/>
-                </a:solidFill>
-              </a:ln>
-            </p:spPr>
-            <p:style>
-              <a:lnRef idx="1">
-                <a:schemeClr val="accent1"/>
-              </a:lnRef>
-              <a:fillRef idx="0">
-                <a:schemeClr val="accent1"/>
-              </a:fillRef>
-              <a:effectRef idx="0">
-                <a:schemeClr val="accent1"/>
-              </a:effectRef>
-              <a:fontRef idx="minor">
-                <a:schemeClr val="tx1"/>
-              </a:fontRef>
-            </p:style>
-            <p:txBody>
-              <a:bodyPr rtlCol="0" anchor="ctr"/>
-              <a:lstStyle/>
-              <a:p>
-                <a:pPr algn="ctr"/>
-                <a:endParaRPr lang="en-US"/>
-              </a:p>
-            </p:txBody>
-          </p:sp>
-          <mc:AlternateContent xmlns:mc="http://schemas.openxmlformats.org/markup-compatibility/2006">
-            <mc:Choice xmlns:a14="http://schemas.microsoft.com/office/drawing/2010/main" Requires="a14">
-              <p:sp>
-                <p:nvSpPr>
-                  <p:cNvPr id="186" name="Rectangle 185">
-                    <a:extLst>
-                      <a:ext uri="{FF2B5EF4-FFF2-40B4-BE49-F238E27FC236}">
-                        <a16:creationId xmlns:a16="http://schemas.microsoft.com/office/drawing/2014/main" id="{E6FC3F51-5FD8-274B-ACC6-0C34C41003A3}"/>
-                      </a:ext>
-                    </a:extLst>
-                  </p:cNvPr>
-                  <p:cNvSpPr/>
-                  <p:nvPr/>
-                </p:nvSpPr>
-                <p:spPr>
-                  <a:xfrm>
-                    <a:off x="9859166" y="4024690"/>
-                    <a:ext cx="502638" cy="369332"/>
-                  </a:xfrm>
-                  <a:prstGeom prst="rect">
-                    <a:avLst/>
-                  </a:prstGeom>
-                </p:spPr>
-                <p:txBody>
-                  <a:bodyPr wrap="none">
-                    <a:spAutoFit/>
-                  </a:bodyPr>
-                  <a:lstStyle/>
-                  <a:p>
-                    <a:pPr/>
-                    <a14:m>
-                      <m:oMathPara xmlns:m="http://schemas.openxmlformats.org/officeDocument/2006/math">
-                        <m:oMathParaPr>
-                          <m:jc m:val="centerGroup"/>
-                        </m:oMathParaPr>
-                        <m:oMath xmlns:m="http://schemas.openxmlformats.org/officeDocument/2006/math">
-                          <m:r>
-                            <a:rPr lang="en-US" b="0" i="1" smtClean="0">
-                              <a:solidFill>
-                                <a:srgbClr val="FF0000"/>
-                              </a:solidFill>
-                              <a:latin typeface="Cambria Math" panose="02040503050406030204" pitchFamily="18" charset="0"/>
-                              <a:cs typeface="Arial" panose="020B0604020202020204" pitchFamily="34" charset="0"/>
-                            </a:rPr>
-                            <m:t>𝑑𝑞</m:t>
-                          </m:r>
-                        </m:oMath>
-                      </m:oMathPara>
-                    </a14:m>
-                    <a:endParaRPr lang="en-CA" dirty="0">
-                      <a:solidFill>
-                        <a:srgbClr val="FF0000"/>
-                      </a:solidFill>
-                    </a:endParaRPr>
-                  </a:p>
-                </p:txBody>
-              </p:sp>
-            </mc:Choice>
-            <mc:Fallback>
-              <p:sp>
-                <p:nvSpPr>
-                  <p:cNvPr id="186" name="Rectangle 185">
-                    <a:extLst>
-                      <a:ext uri="{FF2B5EF4-FFF2-40B4-BE49-F238E27FC236}">
-                        <a16:creationId xmlns:a16="http://schemas.microsoft.com/office/drawing/2014/main" id="{E6FC3F51-5FD8-274B-ACC6-0C34C41003A3}"/>
-                      </a:ext>
-                    </a:extLst>
-                  </p:cNvPr>
-                  <p:cNvSpPr>
-                    <a:spLocks noRot="1" noChangeAspect="1" noMove="1" noResize="1" noEditPoints="1" noAdjustHandles="1" noChangeArrowheads="1" noChangeShapeType="1" noTextEdit="1"/>
-                  </p:cNvSpPr>
-                  <p:nvPr/>
-                </p:nvSpPr>
-                <p:spPr>
-                  <a:xfrm>
-                    <a:off x="9859166" y="4024690"/>
-                    <a:ext cx="502638" cy="369332"/>
-                  </a:xfrm>
-                  <a:prstGeom prst="rect">
-                    <a:avLst/>
-                  </a:prstGeom>
-                  <a:blipFill>
-                    <a:blip r:embed="rId52"/>
-                    <a:stretch>
-                      <a:fillRect b="-13793"/>
-                    </a:stretch>
-                  </a:blipFill>
-                </p:spPr>
-                <p:txBody>
-                  <a:bodyPr/>
-                  <a:lstStyle/>
-                  <a:p>
-                    <a:r>
-                      <a:rPr lang="en-US">
-                        <a:noFill/>
-                      </a:rPr>
-                      <a:t> </a:t>
-                    </a:r>
-                  </a:p>
-                </p:txBody>
-              </p:sp>
-            </mc:Fallback>
-          </mc:AlternateContent>
-          <mc:AlternateContent xmlns:mc="http://schemas.openxmlformats.org/markup-compatibility/2006">
-            <mc:Choice xmlns:a14="http://schemas.microsoft.com/office/drawing/2010/main" Requires="a14">
-              <p:sp>
-                <p:nvSpPr>
-                  <p:cNvPr id="191" name="Rectangle 190">
-                    <a:extLst>
-                      <a:ext uri="{FF2B5EF4-FFF2-40B4-BE49-F238E27FC236}">
-                        <a16:creationId xmlns:a16="http://schemas.microsoft.com/office/drawing/2014/main" id="{014CCFBB-6722-6A4F-8A77-22D7DA29FC49}"/>
-                      </a:ext>
-                    </a:extLst>
-                  </p:cNvPr>
-                  <p:cNvSpPr/>
-                  <p:nvPr/>
-                </p:nvSpPr>
-                <p:spPr>
-                  <a:xfrm>
-                    <a:off x="9303300" y="3691245"/>
-                    <a:ext cx="481157" cy="369332"/>
-                  </a:xfrm>
-                  <a:prstGeom prst="rect">
-                    <a:avLst/>
-                  </a:prstGeom>
-                </p:spPr>
-                <p:txBody>
-                  <a:bodyPr wrap="none">
-                    <a:spAutoFit/>
-                  </a:bodyPr>
-                  <a:lstStyle/>
-                  <a:p>
-                    <a:pPr/>
-                    <a14:m>
-                      <m:oMathPara xmlns:m="http://schemas.openxmlformats.org/officeDocument/2006/math">
-                        <m:oMathParaPr>
-                          <m:jc m:val="centerGroup"/>
-                        </m:oMathParaPr>
-                        <m:oMath xmlns:m="http://schemas.openxmlformats.org/officeDocument/2006/math">
-                          <m:r>
-                            <a:rPr lang="en-US" b="0" i="1" smtClean="0">
-                              <a:solidFill>
-                                <a:sysClr val="windowText" lastClr="000000"/>
-                              </a:solidFill>
-                              <a:latin typeface="Cambria Math" panose="02040503050406030204" pitchFamily="18" charset="0"/>
-                              <a:cs typeface="Arial" panose="020B0604020202020204" pitchFamily="34" charset="0"/>
-                            </a:rPr>
-                            <m:t>𝑑</m:t>
-                          </m:r>
-                          <m:r>
-                            <a:rPr lang="en-CA" b="0" i="1" smtClean="0">
-                              <a:solidFill>
-                                <a:sysClr val="windowText" lastClr="000000"/>
-                              </a:solidFill>
-                              <a:latin typeface="Cambria Math" panose="02040503050406030204" pitchFamily="18" charset="0"/>
-                              <a:cs typeface="Arial" panose="020B0604020202020204" pitchFamily="34" charset="0"/>
-                            </a:rPr>
-                            <m:t>𝑠</m:t>
-                          </m:r>
-                        </m:oMath>
-                      </m:oMathPara>
-                    </a14:m>
-                    <a:endParaRPr lang="en-CA" dirty="0">
-                      <a:solidFill>
-                        <a:sysClr val="windowText" lastClr="000000"/>
-                      </a:solidFill>
-                    </a:endParaRPr>
-                  </a:p>
-                </p:txBody>
-              </p:sp>
-            </mc:Choice>
-            <mc:Fallback>
-              <p:sp>
-                <p:nvSpPr>
-                  <p:cNvPr id="191" name="Rectangle 190">
-                    <a:extLst>
-                      <a:ext uri="{FF2B5EF4-FFF2-40B4-BE49-F238E27FC236}">
-                        <a16:creationId xmlns:a16="http://schemas.microsoft.com/office/drawing/2014/main" id="{014CCFBB-6722-6A4F-8A77-22D7DA29FC49}"/>
-                      </a:ext>
-                    </a:extLst>
-                  </p:cNvPr>
-                  <p:cNvSpPr>
-                    <a:spLocks noRot="1" noChangeAspect="1" noMove="1" noResize="1" noEditPoints="1" noAdjustHandles="1" noChangeArrowheads="1" noChangeShapeType="1" noTextEdit="1"/>
-                  </p:cNvSpPr>
-                  <p:nvPr/>
-                </p:nvSpPr>
-                <p:spPr>
-                  <a:xfrm>
-                    <a:off x="9303300" y="3691245"/>
-                    <a:ext cx="481157" cy="369332"/>
-                  </a:xfrm>
-                  <a:prstGeom prst="rect">
-                    <a:avLst/>
-                  </a:prstGeom>
-                  <a:blipFill>
-                    <a:blip r:embed="rId53"/>
-                    <a:stretch>
-                      <a:fillRect/>
-                    </a:stretch>
-                  </a:blipFill>
-                </p:spPr>
-                <p:txBody>
-                  <a:bodyPr/>
-                  <a:lstStyle/>
-                  <a:p>
-                    <a:r>
-                      <a:rPr lang="en-US">
-                        <a:noFill/>
-                      </a:rPr>
-                      <a:t> </a:t>
-                    </a:r>
-                  </a:p>
-                </p:txBody>
-              </p:sp>
-            </mc:Fallback>
-          </mc:AlternateContent>
-          <p:sp>
-            <p:nvSpPr>
-              <p:cNvPr id="192" name="Arc 191">
-                <a:extLst>
-                  <a:ext uri="{FF2B5EF4-FFF2-40B4-BE49-F238E27FC236}">
-                    <a16:creationId xmlns:a16="http://schemas.microsoft.com/office/drawing/2014/main" id="{B266F71F-8768-354D-B310-40B194CC3E44}"/>
-                  </a:ext>
-                </a:extLst>
-              </p:cNvPr>
-              <p:cNvSpPr/>
-              <p:nvPr/>
-            </p:nvSpPr>
-            <p:spPr>
-              <a:xfrm rot="10800000">
-                <a:off x="9548728" y="3500043"/>
-                <a:ext cx="2073729" cy="2081893"/>
-              </a:xfrm>
-              <a:prstGeom prst="arc">
-                <a:avLst>
-                  <a:gd name="adj1" fmla="val 1126946"/>
-                  <a:gd name="adj2" fmla="val 2683173"/>
+                  <a:gd name="adj1" fmla="val 21597372"/>
+                  <a:gd name="adj2" fmla="val 2046838"/>
                 </a:avLst>
               </a:prstGeom>
               <a:ln>
-                <a:headEnd type="triangle" w="med" len="med"/>
-                <a:tailEnd type="triangle" w="med" len="med"/>
+                <a:headEnd type="none" w="med" len="med"/>
+                <a:tailEnd type="none" w="med" len="med"/>
               </a:ln>
             </p:spPr>
             <p:style>
@@ -29422,1395 +31037,6 @@
             </p:txBody>
           </p:sp>
         </p:grpSp>
-        <p:grpSp>
-          <p:nvGrpSpPr>
-            <p:cNvPr id="258" name="Group 257">
-              <a:extLst>
-                <a:ext uri="{FF2B5EF4-FFF2-40B4-BE49-F238E27FC236}">
-                  <a16:creationId xmlns:a16="http://schemas.microsoft.com/office/drawing/2014/main" id="{E3B36A3F-17B4-914E-A5AF-CC25A7D64F2D}"/>
-                </a:ext>
-              </a:extLst>
-            </p:cNvPr>
-            <p:cNvGrpSpPr/>
-            <p:nvPr/>
-          </p:nvGrpSpPr>
-          <p:grpSpPr>
-            <a:xfrm>
-              <a:off x="10160654" y="3520782"/>
-              <a:ext cx="2045608" cy="2317972"/>
-              <a:chOff x="10136902" y="3520782"/>
-              <a:chExt cx="2045608" cy="2317972"/>
-            </a:xfrm>
-          </p:grpSpPr>
-          <p:grpSp>
-            <p:nvGrpSpPr>
-              <p:cNvPr id="222" name="Group 221">
-                <a:extLst>
-                  <a:ext uri="{FF2B5EF4-FFF2-40B4-BE49-F238E27FC236}">
-                    <a16:creationId xmlns:a16="http://schemas.microsoft.com/office/drawing/2014/main" id="{E5638698-39A1-B341-BC3C-08A670FCB314}"/>
-                  </a:ext>
-                </a:extLst>
-              </p:cNvPr>
-              <p:cNvGrpSpPr/>
-              <p:nvPr/>
-            </p:nvGrpSpPr>
-            <p:grpSpPr>
-              <a:xfrm>
-                <a:off x="10136902" y="3520782"/>
-                <a:ext cx="1164217" cy="2317972"/>
-                <a:chOff x="10448191" y="3397305"/>
-                <a:chExt cx="1164217" cy="2317972"/>
-              </a:xfrm>
-            </p:grpSpPr>
-            <p:sp>
-              <p:nvSpPr>
-                <p:cNvPr id="214" name="Oval 213">
-                  <a:extLst>
-                    <a:ext uri="{FF2B5EF4-FFF2-40B4-BE49-F238E27FC236}">
-                      <a16:creationId xmlns:a16="http://schemas.microsoft.com/office/drawing/2014/main" id="{D4B62D77-C78B-6645-B5D5-10C3ACBDDA9E}"/>
-                    </a:ext>
-                  </a:extLst>
-                </p:cNvPr>
-                <p:cNvSpPr/>
-                <p:nvPr/>
-              </p:nvSpPr>
-              <p:spPr>
-                <a:xfrm>
-                  <a:off x="11252408" y="3397305"/>
-                  <a:ext cx="360000" cy="360000"/>
-                </a:xfrm>
-                <a:prstGeom prst="ellipse">
-                  <a:avLst/>
-                </a:prstGeom>
-                <a:solidFill>
-                  <a:schemeClr val="bg2">
-                    <a:lumMod val="90000"/>
-                  </a:schemeClr>
-                </a:solidFill>
-                <a:ln w="38100">
-                  <a:solidFill>
-                    <a:schemeClr val="tx1"/>
-                  </a:solidFill>
-                </a:ln>
-              </p:spPr>
-              <p:style>
-                <a:lnRef idx="2">
-                  <a:schemeClr val="accent1">
-                    <a:shade val="50000"/>
-                  </a:schemeClr>
-                </a:lnRef>
-                <a:fillRef idx="1">
-                  <a:schemeClr val="accent1"/>
-                </a:fillRef>
-                <a:effectRef idx="0">
-                  <a:schemeClr val="accent1"/>
-                </a:effectRef>
-                <a:fontRef idx="minor">
-                  <a:schemeClr val="lt1"/>
-                </a:fontRef>
-              </p:style>
-              <p:txBody>
-                <a:bodyPr rtlCol="0" anchor="ctr"/>
-                <a:lstStyle/>
-                <a:p>
-                  <a:pPr algn="ctr"/>
-                  <a:endParaRPr lang="en-US"/>
-                </a:p>
-              </p:txBody>
-            </p:sp>
-            <p:sp>
-              <p:nvSpPr>
-                <p:cNvPr id="215" name="Oval 214">
-                  <a:extLst>
-                    <a:ext uri="{FF2B5EF4-FFF2-40B4-BE49-F238E27FC236}">
-                      <a16:creationId xmlns:a16="http://schemas.microsoft.com/office/drawing/2014/main" id="{12D7DD06-328A-0047-9F91-805568295E5B}"/>
-                    </a:ext>
-                  </a:extLst>
-                </p:cNvPr>
-                <p:cNvSpPr/>
-                <p:nvPr/>
-              </p:nvSpPr>
-              <p:spPr>
-                <a:xfrm>
-                  <a:off x="10882877" y="3533266"/>
-                  <a:ext cx="360000" cy="360000"/>
-                </a:xfrm>
-                <a:prstGeom prst="ellipse">
-                  <a:avLst/>
-                </a:prstGeom>
-                <a:solidFill>
-                  <a:schemeClr val="bg2">
-                    <a:lumMod val="90000"/>
-                  </a:schemeClr>
-                </a:solidFill>
-                <a:ln w="38100">
-                  <a:solidFill>
-                    <a:schemeClr val="tx1"/>
-                  </a:solidFill>
-                </a:ln>
-              </p:spPr>
-              <p:style>
-                <a:lnRef idx="2">
-                  <a:schemeClr val="accent1">
-                    <a:shade val="50000"/>
-                  </a:schemeClr>
-                </a:lnRef>
-                <a:fillRef idx="1">
-                  <a:schemeClr val="accent1"/>
-                </a:fillRef>
-                <a:effectRef idx="0">
-                  <a:schemeClr val="accent1"/>
-                </a:effectRef>
-                <a:fontRef idx="minor">
-                  <a:schemeClr val="lt1"/>
-                </a:fontRef>
-              </p:style>
-              <p:txBody>
-                <a:bodyPr rtlCol="0" anchor="ctr"/>
-                <a:lstStyle/>
-                <a:p>
-                  <a:pPr algn="ctr"/>
-                  <a:endParaRPr lang="en-US"/>
-                </a:p>
-              </p:txBody>
-            </p:sp>
-            <p:sp>
-              <p:nvSpPr>
-                <p:cNvPr id="216" name="Oval 215">
-                  <a:extLst>
-                    <a:ext uri="{FF2B5EF4-FFF2-40B4-BE49-F238E27FC236}">
-                      <a16:creationId xmlns:a16="http://schemas.microsoft.com/office/drawing/2014/main" id="{26931EDA-2391-3C49-9683-83690145B980}"/>
-                    </a:ext>
-                  </a:extLst>
-                </p:cNvPr>
-                <p:cNvSpPr/>
-                <p:nvPr/>
-              </p:nvSpPr>
-              <p:spPr>
-                <a:xfrm>
-                  <a:off x="10610837" y="3812696"/>
-                  <a:ext cx="360000" cy="360000"/>
-                </a:xfrm>
-                <a:prstGeom prst="ellipse">
-                  <a:avLst/>
-                </a:prstGeom>
-                <a:solidFill>
-                  <a:srgbClr val="FF0000"/>
-                </a:solidFill>
-                <a:ln w="38100">
-                  <a:solidFill>
-                    <a:schemeClr val="tx1"/>
-                  </a:solidFill>
-                </a:ln>
-              </p:spPr>
-              <p:style>
-                <a:lnRef idx="2">
-                  <a:schemeClr val="accent1">
-                    <a:shade val="50000"/>
-                  </a:schemeClr>
-                </a:lnRef>
-                <a:fillRef idx="1">
-                  <a:schemeClr val="accent1"/>
-                </a:fillRef>
-                <a:effectRef idx="0">
-                  <a:schemeClr val="accent1"/>
-                </a:effectRef>
-                <a:fontRef idx="minor">
-                  <a:schemeClr val="lt1"/>
-                </a:fontRef>
-              </p:style>
-              <p:txBody>
-                <a:bodyPr rtlCol="0" anchor="ctr"/>
-                <a:lstStyle/>
-                <a:p>
-                  <a:pPr algn="ctr"/>
-                  <a:endParaRPr lang="en-US"/>
-                </a:p>
-              </p:txBody>
-            </p:sp>
-            <p:sp>
-              <p:nvSpPr>
-                <p:cNvPr id="217" name="Oval 216">
-                  <a:extLst>
-                    <a:ext uri="{FF2B5EF4-FFF2-40B4-BE49-F238E27FC236}">
-                      <a16:creationId xmlns:a16="http://schemas.microsoft.com/office/drawing/2014/main" id="{911151A9-26C2-474E-9558-00FAA16798E3}"/>
-                    </a:ext>
-                  </a:extLst>
-                </p:cNvPr>
-                <p:cNvSpPr/>
-                <p:nvPr/>
-              </p:nvSpPr>
-              <p:spPr>
-                <a:xfrm>
-                  <a:off x="10448529" y="4166758"/>
-                  <a:ext cx="360000" cy="360000"/>
-                </a:xfrm>
-                <a:prstGeom prst="ellipse">
-                  <a:avLst/>
-                </a:prstGeom>
-                <a:solidFill>
-                  <a:schemeClr val="bg2">
-                    <a:lumMod val="90000"/>
-                  </a:schemeClr>
-                </a:solidFill>
-                <a:ln w="38100">
-                  <a:solidFill>
-                    <a:schemeClr val="tx1"/>
-                  </a:solidFill>
-                </a:ln>
-              </p:spPr>
-              <p:style>
-                <a:lnRef idx="2">
-                  <a:schemeClr val="accent1">
-                    <a:shade val="50000"/>
-                  </a:schemeClr>
-                </a:lnRef>
-                <a:fillRef idx="1">
-                  <a:schemeClr val="accent1"/>
-                </a:fillRef>
-                <a:effectRef idx="0">
-                  <a:schemeClr val="accent1"/>
-                </a:effectRef>
-                <a:fontRef idx="minor">
-                  <a:schemeClr val="lt1"/>
-                </a:fontRef>
-              </p:style>
-              <p:txBody>
-                <a:bodyPr rtlCol="0" anchor="ctr"/>
-                <a:lstStyle/>
-                <a:p>
-                  <a:pPr algn="ctr"/>
-                  <a:endParaRPr lang="en-US"/>
-                </a:p>
-              </p:txBody>
-            </p:sp>
-            <p:sp>
-              <p:nvSpPr>
-                <p:cNvPr id="218" name="Oval 217">
-                  <a:extLst>
-                    <a:ext uri="{FF2B5EF4-FFF2-40B4-BE49-F238E27FC236}">
-                      <a16:creationId xmlns:a16="http://schemas.microsoft.com/office/drawing/2014/main" id="{A6260E0C-B4B0-0B47-9486-B825E09782C3}"/>
-                    </a:ext>
-                  </a:extLst>
-                </p:cNvPr>
-                <p:cNvSpPr/>
-                <p:nvPr/>
-              </p:nvSpPr>
-              <p:spPr>
-                <a:xfrm>
-                  <a:off x="10448191" y="4549331"/>
-                  <a:ext cx="360000" cy="360000"/>
-                </a:xfrm>
-                <a:prstGeom prst="ellipse">
-                  <a:avLst/>
-                </a:prstGeom>
-                <a:solidFill>
-                  <a:schemeClr val="bg2">
-                    <a:lumMod val="90000"/>
-                  </a:schemeClr>
-                </a:solidFill>
-                <a:ln w="38100">
-                  <a:solidFill>
-                    <a:schemeClr val="tx1"/>
-                  </a:solidFill>
-                </a:ln>
-              </p:spPr>
-              <p:style>
-                <a:lnRef idx="2">
-                  <a:schemeClr val="accent1">
-                    <a:shade val="50000"/>
-                  </a:schemeClr>
-                </a:lnRef>
-                <a:fillRef idx="1">
-                  <a:schemeClr val="accent1"/>
-                </a:fillRef>
-                <a:effectRef idx="0">
-                  <a:schemeClr val="accent1"/>
-                </a:effectRef>
-                <a:fontRef idx="minor">
-                  <a:schemeClr val="lt1"/>
-                </a:fontRef>
-              </p:style>
-              <p:txBody>
-                <a:bodyPr rtlCol="0" anchor="ctr"/>
-                <a:lstStyle/>
-                <a:p>
-                  <a:pPr algn="ctr"/>
-                  <a:endParaRPr lang="en-US"/>
-                </a:p>
-              </p:txBody>
-            </p:sp>
-            <p:sp>
-              <p:nvSpPr>
-                <p:cNvPr id="219" name="Oval 218">
-                  <a:extLst>
-                    <a:ext uri="{FF2B5EF4-FFF2-40B4-BE49-F238E27FC236}">
-                      <a16:creationId xmlns:a16="http://schemas.microsoft.com/office/drawing/2014/main" id="{0AB75E57-D9A6-9047-B797-6E8D60F1E171}"/>
-                    </a:ext>
-                  </a:extLst>
-                </p:cNvPr>
-                <p:cNvSpPr/>
-                <p:nvPr/>
-              </p:nvSpPr>
-              <p:spPr>
-                <a:xfrm>
-                  <a:off x="11207249" y="5355277"/>
-                  <a:ext cx="360000" cy="360000"/>
-                </a:xfrm>
-                <a:prstGeom prst="ellipse">
-                  <a:avLst/>
-                </a:prstGeom>
-                <a:solidFill>
-                  <a:schemeClr val="bg2">
-                    <a:lumMod val="90000"/>
-                  </a:schemeClr>
-                </a:solidFill>
-                <a:ln w="38100">
-                  <a:solidFill>
-                    <a:schemeClr val="tx1"/>
-                  </a:solidFill>
-                </a:ln>
-              </p:spPr>
-              <p:style>
-                <a:lnRef idx="2">
-                  <a:schemeClr val="accent1">
-                    <a:shade val="50000"/>
-                  </a:schemeClr>
-                </a:lnRef>
-                <a:fillRef idx="1">
-                  <a:schemeClr val="accent1"/>
-                </a:fillRef>
-                <a:effectRef idx="0">
-                  <a:schemeClr val="accent1"/>
-                </a:effectRef>
-                <a:fontRef idx="minor">
-                  <a:schemeClr val="lt1"/>
-                </a:fontRef>
-              </p:style>
-              <p:txBody>
-                <a:bodyPr rtlCol="0" anchor="ctr"/>
-                <a:lstStyle/>
-                <a:p>
-                  <a:pPr algn="ctr"/>
-                  <a:endParaRPr lang="en-US"/>
-                </a:p>
-              </p:txBody>
-            </p:sp>
-            <p:sp>
-              <p:nvSpPr>
-                <p:cNvPr id="220" name="Oval 219">
-                  <a:extLst>
-                    <a:ext uri="{FF2B5EF4-FFF2-40B4-BE49-F238E27FC236}">
-                      <a16:creationId xmlns:a16="http://schemas.microsoft.com/office/drawing/2014/main" id="{21E09330-09F5-8E4C-80CC-B2F15A3E774B}"/>
-                    </a:ext>
-                  </a:extLst>
-                </p:cNvPr>
-                <p:cNvSpPr/>
-                <p:nvPr/>
-              </p:nvSpPr>
-              <p:spPr>
-                <a:xfrm>
-                  <a:off x="10581652" y="4916004"/>
-                  <a:ext cx="360000" cy="360000"/>
-                </a:xfrm>
-                <a:prstGeom prst="ellipse">
-                  <a:avLst/>
-                </a:prstGeom>
-                <a:solidFill>
-                  <a:schemeClr val="bg2">
-                    <a:lumMod val="90000"/>
-                  </a:schemeClr>
-                </a:solidFill>
-                <a:ln w="38100">
-                  <a:solidFill>
-                    <a:schemeClr val="tx1"/>
-                  </a:solidFill>
-                </a:ln>
-              </p:spPr>
-              <p:style>
-                <a:lnRef idx="2">
-                  <a:schemeClr val="accent1">
-                    <a:shade val="50000"/>
-                  </a:schemeClr>
-                </a:lnRef>
-                <a:fillRef idx="1">
-                  <a:schemeClr val="accent1"/>
-                </a:fillRef>
-                <a:effectRef idx="0">
-                  <a:schemeClr val="accent1"/>
-                </a:effectRef>
-                <a:fontRef idx="minor">
-                  <a:schemeClr val="lt1"/>
-                </a:fontRef>
-              </p:style>
-              <p:txBody>
-                <a:bodyPr rtlCol="0" anchor="ctr"/>
-                <a:lstStyle/>
-                <a:p>
-                  <a:pPr algn="ctr"/>
-                  <a:endParaRPr lang="en-US"/>
-                </a:p>
-              </p:txBody>
-            </p:sp>
-            <p:sp>
-              <p:nvSpPr>
-                <p:cNvPr id="221" name="Oval 220">
-                  <a:extLst>
-                    <a:ext uri="{FF2B5EF4-FFF2-40B4-BE49-F238E27FC236}">
-                      <a16:creationId xmlns:a16="http://schemas.microsoft.com/office/drawing/2014/main" id="{FCB1BEB8-3C03-CE43-841E-6A22D5F3011B}"/>
-                    </a:ext>
-                  </a:extLst>
-                </p:cNvPr>
-                <p:cNvSpPr/>
-                <p:nvPr/>
-              </p:nvSpPr>
-              <p:spPr>
-                <a:xfrm>
-                  <a:off x="10852377" y="5192159"/>
-                  <a:ext cx="360000" cy="360000"/>
-                </a:xfrm>
-                <a:prstGeom prst="ellipse">
-                  <a:avLst/>
-                </a:prstGeom>
-                <a:solidFill>
-                  <a:schemeClr val="bg2">
-                    <a:lumMod val="90000"/>
-                  </a:schemeClr>
-                </a:solidFill>
-                <a:ln w="38100">
-                  <a:solidFill>
-                    <a:schemeClr val="tx1"/>
-                  </a:solidFill>
-                </a:ln>
-              </p:spPr>
-              <p:style>
-                <a:lnRef idx="2">
-                  <a:schemeClr val="accent1">
-                    <a:shade val="50000"/>
-                  </a:schemeClr>
-                </a:lnRef>
-                <a:fillRef idx="1">
-                  <a:schemeClr val="accent1"/>
-                </a:fillRef>
-                <a:effectRef idx="0">
-                  <a:schemeClr val="accent1"/>
-                </a:effectRef>
-                <a:fontRef idx="minor">
-                  <a:schemeClr val="lt1"/>
-                </a:fontRef>
-              </p:style>
-              <p:txBody>
-                <a:bodyPr rtlCol="0" anchor="ctr"/>
-                <a:lstStyle/>
-                <a:p>
-                  <a:pPr algn="ctr"/>
-                  <a:endParaRPr lang="en-US"/>
-                </a:p>
-              </p:txBody>
-            </p:sp>
-          </p:grpSp>
-          <mc:AlternateContent xmlns:mc="http://schemas.openxmlformats.org/markup-compatibility/2006">
-            <mc:Choice xmlns:a14="http://schemas.microsoft.com/office/drawing/2010/main" Requires="a14">
-              <p:sp>
-                <p:nvSpPr>
-                  <p:cNvPr id="223" name="Rectangle 222">
-                    <a:extLst>
-                      <a:ext uri="{FF2B5EF4-FFF2-40B4-BE49-F238E27FC236}">
-                        <a16:creationId xmlns:a16="http://schemas.microsoft.com/office/drawing/2014/main" id="{03060D8D-8F00-6046-AB36-F0B285C1E2AB}"/>
-                      </a:ext>
-                    </a:extLst>
-                  </p:cNvPr>
-                  <p:cNvSpPr/>
-                  <p:nvPr/>
-                </p:nvSpPr>
-                <p:spPr>
-                  <a:xfrm>
-                    <a:off x="10227081" y="3912386"/>
-                    <a:ext cx="502638" cy="369332"/>
-                  </a:xfrm>
-                  <a:prstGeom prst="rect">
-                    <a:avLst/>
-                  </a:prstGeom>
-                </p:spPr>
-                <p:txBody>
-                  <a:bodyPr wrap="none">
-                    <a:spAutoFit/>
-                  </a:bodyPr>
-                  <a:lstStyle/>
-                  <a:p>
-                    <a:pPr/>
-                    <a14:m>
-                      <m:oMathPara xmlns:m="http://schemas.openxmlformats.org/officeDocument/2006/math">
-                        <m:oMathParaPr>
-                          <m:jc m:val="centerGroup"/>
-                        </m:oMathParaPr>
-                        <m:oMath xmlns:m="http://schemas.openxmlformats.org/officeDocument/2006/math">
-                          <m:r>
-                            <a:rPr lang="en-US" b="0" i="1" smtClean="0">
-                              <a:solidFill>
-                                <a:sysClr val="windowText" lastClr="000000"/>
-                              </a:solidFill>
-                              <a:latin typeface="Cambria Math" panose="02040503050406030204" pitchFamily="18" charset="0"/>
-                              <a:cs typeface="Arial" panose="020B0604020202020204" pitchFamily="34" charset="0"/>
-                            </a:rPr>
-                            <m:t>𝑑𝑞</m:t>
-                          </m:r>
-                        </m:oMath>
-                      </m:oMathPara>
-                    </a14:m>
-                    <a:endParaRPr lang="en-CA" dirty="0">
-                      <a:solidFill>
-                        <a:sysClr val="windowText" lastClr="000000"/>
-                      </a:solidFill>
-                    </a:endParaRPr>
-                  </a:p>
-                </p:txBody>
-              </p:sp>
-            </mc:Choice>
-            <mc:Fallback>
-              <p:sp>
-                <p:nvSpPr>
-                  <p:cNvPr id="223" name="Rectangle 222">
-                    <a:extLst>
-                      <a:ext uri="{FF2B5EF4-FFF2-40B4-BE49-F238E27FC236}">
-                        <a16:creationId xmlns:a16="http://schemas.microsoft.com/office/drawing/2014/main" id="{03060D8D-8F00-6046-AB36-F0B285C1E2AB}"/>
-                      </a:ext>
-                    </a:extLst>
-                  </p:cNvPr>
-                  <p:cNvSpPr>
-                    <a:spLocks noRot="1" noChangeAspect="1" noMove="1" noResize="1" noEditPoints="1" noAdjustHandles="1" noChangeArrowheads="1" noChangeShapeType="1" noTextEdit="1"/>
-                  </p:cNvSpPr>
-                  <p:nvPr/>
-                </p:nvSpPr>
-                <p:spPr>
-                  <a:xfrm>
-                    <a:off x="10227081" y="3912386"/>
-                    <a:ext cx="502638" cy="369332"/>
-                  </a:xfrm>
-                  <a:prstGeom prst="rect">
-                    <a:avLst/>
-                  </a:prstGeom>
-                  <a:blipFill>
-                    <a:blip r:embed="rId54"/>
-                    <a:stretch>
-                      <a:fillRect b="-13333"/>
-                    </a:stretch>
-                  </a:blipFill>
-                </p:spPr>
-                <p:txBody>
-                  <a:bodyPr/>
-                  <a:lstStyle/>
-                  <a:p>
-                    <a:r>
-                      <a:rPr lang="en-US">
-                        <a:noFill/>
-                      </a:rPr>
-                      <a:t> </a:t>
-                    </a:r>
-                  </a:p>
-                </p:txBody>
-              </p:sp>
-            </mc:Fallback>
-          </mc:AlternateContent>
-          <p:grpSp>
-            <p:nvGrpSpPr>
-              <p:cNvPr id="224" name="Group 223">
-                <a:extLst>
-                  <a:ext uri="{FF2B5EF4-FFF2-40B4-BE49-F238E27FC236}">
-                    <a16:creationId xmlns:a16="http://schemas.microsoft.com/office/drawing/2014/main" id="{BCBB2C23-A70D-7E4B-AFEF-43A8F726762E}"/>
-                  </a:ext>
-                </a:extLst>
-              </p:cNvPr>
-              <p:cNvGrpSpPr/>
-              <p:nvPr/>
-            </p:nvGrpSpPr>
-            <p:grpSpPr>
-              <a:xfrm>
-                <a:off x="10594337" y="3718185"/>
-                <a:ext cx="1588173" cy="1246577"/>
-                <a:chOff x="6859080" y="925653"/>
-                <a:chExt cx="1588173" cy="1246577"/>
-              </a:xfrm>
-            </p:grpSpPr>
-            <p:grpSp>
-              <p:nvGrpSpPr>
-                <p:cNvPr id="229" name="Group 228">
-                  <a:extLst>
-                    <a:ext uri="{FF2B5EF4-FFF2-40B4-BE49-F238E27FC236}">
-                      <a16:creationId xmlns:a16="http://schemas.microsoft.com/office/drawing/2014/main" id="{C31410D3-4DF3-1F45-9FA1-2D4CDEFCBF84}"/>
-                    </a:ext>
-                  </a:extLst>
-                </p:cNvPr>
-                <p:cNvGrpSpPr/>
-                <p:nvPr/>
-              </p:nvGrpSpPr>
-              <p:grpSpPr>
-                <a:xfrm>
-                  <a:off x="7269859" y="925653"/>
-                  <a:ext cx="1177394" cy="1246577"/>
-                  <a:chOff x="1129904" y="1614682"/>
-                  <a:chExt cx="1177394" cy="1246577"/>
-                </a:xfrm>
-              </p:grpSpPr>
-              <p:grpSp>
-                <p:nvGrpSpPr>
-                  <p:cNvPr id="231" name="Group 230">
-                    <a:extLst>
-                      <a:ext uri="{FF2B5EF4-FFF2-40B4-BE49-F238E27FC236}">
-                        <a16:creationId xmlns:a16="http://schemas.microsoft.com/office/drawing/2014/main" id="{3841CE85-BB99-A043-9C43-6A8F322FE869}"/>
-                      </a:ext>
-                    </a:extLst>
-                  </p:cNvPr>
-                  <p:cNvGrpSpPr/>
-                  <p:nvPr/>
-                </p:nvGrpSpPr>
-                <p:grpSpPr>
-                  <a:xfrm>
-                    <a:off x="1136901" y="1912196"/>
-                    <a:ext cx="1170397" cy="949063"/>
-                    <a:chOff x="1164196" y="1884900"/>
-                    <a:chExt cx="1170397" cy="949063"/>
-                  </a:xfrm>
-                </p:grpSpPr>
-                <p:cxnSp>
-                  <p:nvCxnSpPr>
-                    <p:cNvPr id="233" name="Straight Arrow Connector 232">
-                      <a:extLst>
-                        <a:ext uri="{FF2B5EF4-FFF2-40B4-BE49-F238E27FC236}">
-                          <a16:creationId xmlns:a16="http://schemas.microsoft.com/office/drawing/2014/main" id="{19909298-340F-5447-B7A2-DF67481FB267}"/>
-                        </a:ext>
-                      </a:extLst>
-                    </p:cNvPr>
-                    <p:cNvCxnSpPr/>
-                    <p:nvPr/>
-                  </p:nvCxnSpPr>
-                  <p:spPr>
-                    <a:xfrm flipV="1">
-                      <a:off x="1516583" y="1884900"/>
-                      <a:ext cx="7346" cy="655380"/>
-                    </a:xfrm>
-                    <a:prstGeom prst="straightConnector1">
-                      <a:avLst/>
-                    </a:prstGeom>
-                    <a:ln w="38100">
-                      <a:solidFill>
-                        <a:schemeClr val="tx1"/>
-                      </a:solidFill>
-                      <a:tailEnd type="triangle"/>
-                    </a:ln>
-                  </p:spPr>
-                  <p:style>
-                    <a:lnRef idx="1">
-                      <a:schemeClr val="accent1"/>
-                    </a:lnRef>
-                    <a:fillRef idx="0">
-                      <a:schemeClr val="accent1"/>
-                    </a:fillRef>
-                    <a:effectRef idx="0">
-                      <a:schemeClr val="accent1"/>
-                    </a:effectRef>
-                    <a:fontRef idx="minor">
-                      <a:schemeClr val="tx1"/>
-                    </a:fontRef>
-                  </p:style>
-                </p:cxnSp>
-                <p:cxnSp>
-                  <p:nvCxnSpPr>
-                    <p:cNvPr id="234" name="Straight Arrow Connector 233">
-                      <a:extLst>
-                        <a:ext uri="{FF2B5EF4-FFF2-40B4-BE49-F238E27FC236}">
-                          <a16:creationId xmlns:a16="http://schemas.microsoft.com/office/drawing/2014/main" id="{530203B1-6371-814C-BB13-24D171C5799A}"/>
-                        </a:ext>
-                      </a:extLst>
-                    </p:cNvPr>
-                    <p:cNvCxnSpPr/>
-                    <p:nvPr/>
-                  </p:nvCxnSpPr>
-                  <p:spPr>
-                    <a:xfrm>
-                      <a:off x="1509817" y="2538065"/>
-                      <a:ext cx="712531" cy="2215"/>
-                    </a:xfrm>
-                    <a:prstGeom prst="straightConnector1">
-                      <a:avLst/>
-                    </a:prstGeom>
-                    <a:ln w="38100">
-                      <a:solidFill>
-                        <a:schemeClr val="tx1"/>
-                      </a:solidFill>
-                      <a:tailEnd type="triangle"/>
-                    </a:ln>
-                  </p:spPr>
-                  <p:style>
-                    <a:lnRef idx="1">
-                      <a:schemeClr val="accent1"/>
-                    </a:lnRef>
-                    <a:fillRef idx="0">
-                      <a:schemeClr val="accent1"/>
-                    </a:fillRef>
-                    <a:effectRef idx="0">
-                      <a:schemeClr val="accent1"/>
-                    </a:effectRef>
-                    <a:fontRef idx="minor">
-                      <a:schemeClr val="tx1"/>
-                    </a:fontRef>
-                  </p:style>
-                </p:cxnSp>
-                <mc:AlternateContent xmlns:mc="http://schemas.openxmlformats.org/markup-compatibility/2006" xmlns:a14="http://schemas.microsoft.com/office/drawing/2010/main">
-                  <mc:Choice Requires="a14">
-                    <p:sp>
-                      <p:nvSpPr>
-                        <p:cNvPr id="235" name="Rectangle 234">
-                          <a:extLst>
-                            <a:ext uri="{FF2B5EF4-FFF2-40B4-BE49-F238E27FC236}">
-                              <a16:creationId xmlns:a16="http://schemas.microsoft.com/office/drawing/2014/main" id="{0AE86D2A-A7B9-854A-B4CD-EA009C808A9B}"/>
-                            </a:ext>
-                          </a:extLst>
-                        </p:cNvPr>
-                        <p:cNvSpPr/>
-                        <p:nvPr/>
-                      </p:nvSpPr>
-                      <p:spPr>
-                        <a:xfrm>
-                          <a:off x="1966608" y="2464631"/>
-                          <a:ext cx="367985" cy="369332"/>
-                        </a:xfrm>
-                        <a:prstGeom prst="rect">
-                          <a:avLst/>
-                        </a:prstGeom>
-                      </p:spPr>
-                      <p:txBody>
-                        <a:bodyPr wrap="none">
-                          <a:spAutoFit/>
-                        </a:bodyPr>
-                        <a:lstStyle/>
-                        <a:p>
-                          <a:pPr/>
-                          <a14:m>
-                            <m:oMathPara xmlns:m="http://schemas.openxmlformats.org/officeDocument/2006/math">
-                              <m:oMathParaPr>
-                                <m:jc m:val="centerGroup"/>
-                              </m:oMathParaPr>
-                              <m:oMath xmlns:m="http://schemas.openxmlformats.org/officeDocument/2006/math">
-                                <m:r>
-                                  <a:rPr lang="en-US" i="1">
-                                    <a:latin typeface="Cambria Math" panose="02040503050406030204" pitchFamily="18" charset="0"/>
-                                    <a:cs typeface="Arial" panose="020B0604020202020204" pitchFamily="34" charset="0"/>
-                                  </a:rPr>
-                                  <m:t>𝑥</m:t>
-                                </m:r>
-                              </m:oMath>
-                            </m:oMathPara>
-                          </a14:m>
-                          <a:endParaRPr lang="en-CA" dirty="0"/>
-                        </a:p>
-                      </p:txBody>
-                    </p:sp>
-                  </mc:Choice>
-                  <mc:Fallback xmlns="">
-                    <p:sp>
-                      <p:nvSpPr>
-                        <p:cNvPr id="18" name="Rectangle 17"/>
-                        <p:cNvSpPr>
-                          <a:spLocks noRot="1" noChangeAspect="1" noMove="1" noResize="1" noEditPoints="1" noAdjustHandles="1" noChangeArrowheads="1" noChangeShapeType="1" noTextEdit="1"/>
-                        </p:cNvSpPr>
-                        <p:nvPr/>
-                      </p:nvSpPr>
-                      <p:spPr>
-                        <a:xfrm>
-                          <a:off x="1966608" y="2464631"/>
-                          <a:ext cx="367985" cy="369332"/>
-                        </a:xfrm>
-                        <a:prstGeom prst="rect">
-                          <a:avLst/>
-                        </a:prstGeom>
-                        <a:blipFill rotWithShape="0">
-                          <a:blip r:embed="rId36"/>
-                          <a:stretch>
-                            <a:fillRect/>
-                          </a:stretch>
-                        </a:blipFill>
-                      </p:spPr>
-                      <p:txBody>
-                        <a:bodyPr/>
-                        <a:lstStyle/>
-                        <a:p>
-                          <a:r>
-                            <a:rPr lang="en-CA">
-                              <a:noFill/>
-                            </a:rPr>
-                            <a:t> </a:t>
-                          </a:r>
-                        </a:p>
-                      </p:txBody>
-                    </p:sp>
-                  </mc:Fallback>
-                </mc:AlternateContent>
-                <mc:AlternateContent xmlns:mc="http://schemas.openxmlformats.org/markup-compatibility/2006" xmlns:a14="http://schemas.microsoft.com/office/drawing/2010/main">
-                  <mc:Choice Requires="a14">
-                    <p:sp>
-                      <p:nvSpPr>
-                        <p:cNvPr id="236" name="Rectangle 235">
-                          <a:extLst>
-                            <a:ext uri="{FF2B5EF4-FFF2-40B4-BE49-F238E27FC236}">
-                              <a16:creationId xmlns:a16="http://schemas.microsoft.com/office/drawing/2014/main" id="{69AEE039-DC37-0C42-90B1-177CB1623A1B}"/>
-                            </a:ext>
-                          </a:extLst>
-                        </p:cNvPr>
-                        <p:cNvSpPr/>
-                        <p:nvPr/>
-                      </p:nvSpPr>
-                      <p:spPr>
-                        <a:xfrm>
-                          <a:off x="1164196" y="1973145"/>
-                          <a:ext cx="371384" cy="369332"/>
-                        </a:xfrm>
-                        <a:prstGeom prst="rect">
-                          <a:avLst/>
-                        </a:prstGeom>
-                      </p:spPr>
-                      <p:txBody>
-                        <a:bodyPr wrap="none">
-                          <a:spAutoFit/>
-                        </a:bodyPr>
-                        <a:lstStyle/>
-                        <a:p>
-                          <a:pPr/>
-                          <a14:m>
-                            <m:oMathPara xmlns:m="http://schemas.openxmlformats.org/officeDocument/2006/math">
-                              <m:oMathParaPr>
-                                <m:jc m:val="centerGroup"/>
-                              </m:oMathParaPr>
-                              <m:oMath xmlns:m="http://schemas.openxmlformats.org/officeDocument/2006/math">
-                                <m:r>
-                                  <a:rPr lang="en-US" b="0" i="1" smtClean="0">
-                                    <a:latin typeface="Cambria Math" panose="02040503050406030204" pitchFamily="18" charset="0"/>
-                                  </a:rPr>
-                                  <m:t>𝑦</m:t>
-                                </m:r>
-                              </m:oMath>
-                            </m:oMathPara>
-                          </a14:m>
-                          <a:endParaRPr lang="en-CA" dirty="0"/>
-                        </a:p>
-                      </p:txBody>
-                    </p:sp>
-                  </mc:Choice>
-                  <mc:Fallback xmlns="">
-                    <p:sp>
-                      <p:nvSpPr>
-                        <p:cNvPr id="64" name="Rectangle 63"/>
-                        <p:cNvSpPr>
-                          <a:spLocks noRot="1" noChangeAspect="1" noMove="1" noResize="1" noEditPoints="1" noAdjustHandles="1" noChangeArrowheads="1" noChangeShapeType="1" noTextEdit="1"/>
-                        </p:cNvSpPr>
-                        <p:nvPr/>
-                      </p:nvSpPr>
-                      <p:spPr>
-                        <a:xfrm>
-                          <a:off x="1164196" y="1973145"/>
-                          <a:ext cx="371384" cy="369332"/>
-                        </a:xfrm>
-                        <a:prstGeom prst="rect">
-                          <a:avLst/>
-                        </a:prstGeom>
-                        <a:blipFill rotWithShape="0">
-                          <a:blip r:embed="rId10"/>
-                          <a:stretch>
-                            <a:fillRect b="-6667"/>
-                          </a:stretch>
-                        </a:blipFill>
-                      </p:spPr>
-                      <p:txBody>
-                        <a:bodyPr/>
-                        <a:lstStyle/>
-                        <a:p>
-                          <a:r>
-                            <a:rPr lang="en-CA">
-                              <a:noFill/>
-                            </a:rPr>
-                            <a:t> </a:t>
-                          </a:r>
-                        </a:p>
-                      </p:txBody>
-                    </p:sp>
-                  </mc:Fallback>
-                </mc:AlternateContent>
-                <mc:AlternateContent xmlns:mc="http://schemas.openxmlformats.org/markup-compatibility/2006" xmlns:a14="http://schemas.microsoft.com/office/drawing/2010/main">
-                  <mc:Choice Requires="a14">
-                    <p:sp>
-                      <p:nvSpPr>
-                        <p:cNvPr id="237" name="Rectangle 236">
-                          <a:extLst>
-                            <a:ext uri="{FF2B5EF4-FFF2-40B4-BE49-F238E27FC236}">
-                              <a16:creationId xmlns:a16="http://schemas.microsoft.com/office/drawing/2014/main" id="{16E0F214-4B17-9F42-88E1-617004BCC4A7}"/>
-                            </a:ext>
-                          </a:extLst>
-                        </p:cNvPr>
-                        <p:cNvSpPr/>
-                        <p:nvPr/>
-                      </p:nvSpPr>
-                      <p:spPr>
-                        <a:xfrm>
-                          <a:off x="1243583" y="2447020"/>
-                          <a:ext cx="367985" cy="369332"/>
-                        </a:xfrm>
-                        <a:prstGeom prst="rect">
-                          <a:avLst/>
-                        </a:prstGeom>
-                      </p:spPr>
-                      <p:txBody>
-                        <a:bodyPr wrap="none">
-                          <a:spAutoFit/>
-                        </a:bodyPr>
-                        <a:lstStyle/>
-                        <a:p>
-                          <a:pPr/>
-                          <a14:m>
-                            <m:oMathPara xmlns:m="http://schemas.openxmlformats.org/officeDocument/2006/math">
-                              <m:oMathParaPr>
-                                <m:jc m:val="centerGroup"/>
-                              </m:oMathParaPr>
-                              <m:oMath xmlns:m="http://schemas.openxmlformats.org/officeDocument/2006/math">
-                                <m:r>
-                                  <a:rPr lang="en-US" b="0" i="1" smtClean="0">
-                                    <a:latin typeface="Cambria Math" panose="02040503050406030204" pitchFamily="18" charset="0"/>
-                                    <a:cs typeface="Arial" panose="020B0604020202020204" pitchFamily="34" charset="0"/>
-                                  </a:rPr>
-                                  <m:t>0</m:t>
-                                </m:r>
-                              </m:oMath>
-                            </m:oMathPara>
-                          </a14:m>
-                          <a:endParaRPr lang="en-CA" dirty="0"/>
-                        </a:p>
-                      </p:txBody>
-                    </p:sp>
-                  </mc:Choice>
-                  <mc:Fallback xmlns="">
-                    <p:sp>
-                      <p:nvSpPr>
-                        <p:cNvPr id="65" name="Rectangle 64"/>
-                        <p:cNvSpPr>
-                          <a:spLocks noRot="1" noChangeAspect="1" noMove="1" noResize="1" noEditPoints="1" noAdjustHandles="1" noChangeArrowheads="1" noChangeShapeType="1" noTextEdit="1"/>
-                        </p:cNvSpPr>
-                        <p:nvPr/>
-                      </p:nvSpPr>
-                      <p:spPr>
-                        <a:xfrm>
-                          <a:off x="1243583" y="2447020"/>
-                          <a:ext cx="367985" cy="369332"/>
-                        </a:xfrm>
-                        <a:prstGeom prst="rect">
-                          <a:avLst/>
-                        </a:prstGeom>
-                        <a:blipFill rotWithShape="0">
-                          <a:blip r:embed="rId11"/>
-                          <a:stretch>
-                            <a:fillRect/>
-                          </a:stretch>
-                        </a:blipFill>
-                      </p:spPr>
-                      <p:txBody>
-                        <a:bodyPr/>
-                        <a:lstStyle/>
-                        <a:p>
-                          <a:r>
-                            <a:rPr lang="en-CA">
-                              <a:noFill/>
-                            </a:rPr>
-                            <a:t> </a:t>
-                          </a:r>
-                        </a:p>
-                      </p:txBody>
-                    </p:sp>
-                  </mc:Fallback>
-                </mc:AlternateContent>
-              </p:grpSp>
-              <p:sp>
-                <p:nvSpPr>
-                  <p:cNvPr id="232" name="Rectangle 231">
-                    <a:extLst>
-                      <a:ext uri="{FF2B5EF4-FFF2-40B4-BE49-F238E27FC236}">
-                        <a16:creationId xmlns:a16="http://schemas.microsoft.com/office/drawing/2014/main" id="{EC9F338D-D7BA-5741-969A-1FCC35E0B9E9}"/>
-                      </a:ext>
-                    </a:extLst>
-                  </p:cNvPr>
-                  <p:cNvSpPr/>
-                  <p:nvPr/>
-                </p:nvSpPr>
-                <p:spPr>
-                  <a:xfrm>
-                    <a:off x="1129904" y="1614682"/>
-                    <a:ext cx="184731" cy="369332"/>
-                  </a:xfrm>
-                  <a:prstGeom prst="rect">
-                    <a:avLst/>
-                  </a:prstGeom>
-                </p:spPr>
-                <p:txBody>
-                  <a:bodyPr wrap="none">
-                    <a:spAutoFit/>
-                  </a:bodyPr>
-                  <a:lstStyle/>
-                  <a:p>
-                    <a:endParaRPr lang="en-CA" dirty="0"/>
-                  </a:p>
-                </p:txBody>
-              </p:sp>
-            </p:grpSp>
-            <p:cxnSp>
-              <p:nvCxnSpPr>
-                <p:cNvPr id="226" name="Straight Connector 225">
-                  <a:extLst>
-                    <a:ext uri="{FF2B5EF4-FFF2-40B4-BE49-F238E27FC236}">
-                      <a16:creationId xmlns:a16="http://schemas.microsoft.com/office/drawing/2014/main" id="{30737523-4292-AF45-9DF4-9DACB8F73E2F}"/>
-                    </a:ext>
-                  </a:extLst>
-                </p:cNvPr>
-                <p:cNvCxnSpPr>
-                  <a:cxnSpLocks/>
-                  <a:stCxn id="216" idx="5"/>
-                </p:cNvCxnSpPr>
-                <p:nvPr/>
-              </p:nvCxnSpPr>
-              <p:spPr>
-                <a:xfrm>
-                  <a:off x="6871570" y="1450920"/>
-                  <a:ext cx="776670" cy="441967"/>
-                </a:xfrm>
-                <a:prstGeom prst="line">
-                  <a:avLst/>
-                </a:prstGeom>
-                <a:ln w="28575">
-                  <a:solidFill>
-                    <a:schemeClr val="tx1"/>
-                  </a:solidFill>
-                  <a:prstDash val="sysDot"/>
-                </a:ln>
-              </p:spPr>
-              <p:style>
-                <a:lnRef idx="1">
-                  <a:schemeClr val="accent1"/>
-                </a:lnRef>
-                <a:fillRef idx="0">
-                  <a:schemeClr val="accent1"/>
-                </a:fillRef>
-                <a:effectRef idx="0">
-                  <a:schemeClr val="accent1"/>
-                </a:effectRef>
-                <a:fontRef idx="minor">
-                  <a:schemeClr val="tx1"/>
-                </a:fontRef>
-              </p:style>
-            </p:cxnSp>
-            <mc:AlternateContent xmlns:mc="http://schemas.openxmlformats.org/markup-compatibility/2006" xmlns:a14="http://schemas.microsoft.com/office/drawing/2010/main">
-              <mc:Choice Requires="a14">
-                <p:sp>
-                  <p:nvSpPr>
-                    <p:cNvPr id="227" name="Rectangle 226">
-                      <a:extLst>
-                        <a:ext uri="{FF2B5EF4-FFF2-40B4-BE49-F238E27FC236}">
-                          <a16:creationId xmlns:a16="http://schemas.microsoft.com/office/drawing/2014/main" id="{4CF91009-60D7-BD47-8E0F-E5AE92E2625F}"/>
-                        </a:ext>
-                      </a:extLst>
-                    </p:cNvPr>
-                    <p:cNvSpPr/>
-                    <p:nvPr/>
-                  </p:nvSpPr>
-                  <p:spPr>
-                    <a:xfrm>
-                      <a:off x="6859080" y="1207863"/>
-                      <a:ext cx="391774" cy="369332"/>
-                    </a:xfrm>
-                    <a:prstGeom prst="rect">
-                      <a:avLst/>
-                    </a:prstGeom>
-                  </p:spPr>
-                  <p:txBody>
-                    <a:bodyPr wrap="none">
-                      <a:spAutoFit/>
-                    </a:bodyPr>
-                    <a:lstStyle/>
-                    <a:p>
-                      <a:pPr/>
-                      <a14:m>
-                        <m:oMathPara xmlns:m="http://schemas.openxmlformats.org/officeDocument/2006/math">
-                          <m:oMathParaPr>
-                            <m:jc m:val="centerGroup"/>
-                          </m:oMathParaPr>
-                          <m:oMath xmlns:m="http://schemas.openxmlformats.org/officeDocument/2006/math">
-                            <m:r>
-                              <a:rPr lang="en-US" b="0" i="1" smtClean="0">
-                                <a:solidFill>
-                                  <a:schemeClr val="tx1"/>
-                                </a:solidFill>
-                                <a:latin typeface="Cambria Math" panose="02040503050406030204" pitchFamily="18" charset="0"/>
-                                <a:cs typeface="Arial" panose="020B0604020202020204" pitchFamily="34" charset="0"/>
-                              </a:rPr>
-                              <m:t>𝑅</m:t>
-                            </m:r>
-                          </m:oMath>
-                        </m:oMathPara>
-                      </a14:m>
-                      <a:endParaRPr lang="en-CA" dirty="0">
-                        <a:solidFill>
-                          <a:schemeClr val="tx1"/>
-                        </a:solidFill>
-                      </a:endParaRPr>
-                    </a:p>
-                  </p:txBody>
-                </p:sp>
-              </mc:Choice>
-              <mc:Fallback xmlns="">
-                <p:sp>
-                  <p:nvSpPr>
-                    <p:cNvPr id="154" name="Rectangle 153"/>
-                    <p:cNvSpPr>
-                      <a:spLocks noRot="1" noChangeAspect="1" noMove="1" noResize="1" noEditPoints="1" noAdjustHandles="1" noChangeArrowheads="1" noChangeShapeType="1" noTextEdit="1"/>
-                    </p:cNvSpPr>
-                    <p:nvPr/>
-                  </p:nvSpPr>
-                  <p:spPr>
-                    <a:xfrm>
-                      <a:off x="6859080" y="1207863"/>
-                      <a:ext cx="391774" cy="369332"/>
-                    </a:xfrm>
-                    <a:prstGeom prst="rect">
-                      <a:avLst/>
-                    </a:prstGeom>
-                    <a:blipFill>
-                      <a:blip r:embed="rId38"/>
-                      <a:stretch>
-                        <a:fillRect/>
-                      </a:stretch>
-                    </a:blipFill>
-                  </p:spPr>
-                  <p:txBody>
-                    <a:bodyPr/>
-                    <a:lstStyle/>
-                    <a:p>
-                      <a:r>
-                        <a:rPr lang="en-US">
-                          <a:noFill/>
-                        </a:rPr>
-                        <a:t> </a:t>
-                      </a:r>
-                    </a:p>
-                  </p:txBody>
-                </p:sp>
-              </mc:Fallback>
-            </mc:AlternateContent>
-          </p:grpSp>
-          <p:cxnSp>
-            <p:nvCxnSpPr>
-              <p:cNvPr id="253" name="Straight Arrow Connector 252">
-                <a:extLst>
-                  <a:ext uri="{FF2B5EF4-FFF2-40B4-BE49-F238E27FC236}">
-                    <a16:creationId xmlns:a16="http://schemas.microsoft.com/office/drawing/2014/main" id="{A84A374D-CF84-BA4D-A245-5924A3143468}"/>
-                  </a:ext>
-                </a:extLst>
-              </p:cNvPr>
-              <p:cNvCxnSpPr/>
-              <p:nvPr/>
-            </p:nvCxnSpPr>
-            <p:spPr>
-              <a:xfrm>
-                <a:off x="11376121" y="4665657"/>
-                <a:ext cx="628234" cy="396159"/>
-              </a:xfrm>
-              <a:prstGeom prst="straightConnector1">
-                <a:avLst/>
-              </a:prstGeom>
-              <a:ln w="57150">
-                <a:solidFill>
-                  <a:srgbClr val="FF0000"/>
-                </a:solidFill>
-                <a:tailEnd type="triangle"/>
-              </a:ln>
-            </p:spPr>
-            <p:style>
-              <a:lnRef idx="1">
-                <a:schemeClr val="accent1"/>
-              </a:lnRef>
-              <a:fillRef idx="0">
-                <a:schemeClr val="accent1"/>
-              </a:fillRef>
-              <a:effectRef idx="0">
-                <a:schemeClr val="accent1"/>
-              </a:effectRef>
-              <a:fontRef idx="minor">
-                <a:schemeClr val="tx1"/>
-              </a:fontRef>
-            </p:style>
-          </p:cxnSp>
-          <mc:AlternateContent xmlns:mc="http://schemas.openxmlformats.org/markup-compatibility/2006">
-            <mc:Choice xmlns:a14="http://schemas.microsoft.com/office/drawing/2010/main" Requires="a14">
-              <p:sp>
-                <p:nvSpPr>
-                  <p:cNvPr id="255" name="Rectangle 254">
-                    <a:extLst>
-                      <a:ext uri="{FF2B5EF4-FFF2-40B4-BE49-F238E27FC236}">
-                        <a16:creationId xmlns:a16="http://schemas.microsoft.com/office/drawing/2014/main" id="{2D374B11-BF89-3F48-A96E-E643CE3312AC}"/>
-                      </a:ext>
-                    </a:extLst>
-                  </p:cNvPr>
-                  <p:cNvSpPr/>
-                  <p:nvPr/>
-                </p:nvSpPr>
-                <p:spPr>
-                  <a:xfrm>
-                    <a:off x="11264353" y="4807643"/>
-                    <a:ext cx="531235" cy="402931"/>
-                  </a:xfrm>
-                  <a:prstGeom prst="rect">
-                    <a:avLst/>
-                  </a:prstGeom>
-                </p:spPr>
-                <p:txBody>
-                  <a:bodyPr wrap="none">
-                    <a:spAutoFit/>
-                  </a:bodyPr>
-                  <a:lstStyle/>
-                  <a:p>
-                    <a:pPr/>
-                    <a14:m>
-                      <m:oMathPara xmlns:m="http://schemas.openxmlformats.org/officeDocument/2006/math">
-                        <m:oMathParaPr>
-                          <m:jc m:val="centerGroup"/>
-                        </m:oMathParaPr>
-                        <m:oMath xmlns:m="http://schemas.openxmlformats.org/officeDocument/2006/math">
-                          <m:r>
-                            <a:rPr lang="en-US" i="1" smtClean="0">
-                              <a:solidFill>
-                                <a:srgbClr val="FF0000"/>
-                              </a:solidFill>
-                              <a:latin typeface="Cambria Math" panose="02040503050406030204" pitchFamily="18" charset="0"/>
-                              <a:cs typeface="Arial" panose="020B0604020202020204" pitchFamily="34" charset="0"/>
-                            </a:rPr>
-                            <m:t>𝑑</m:t>
-                          </m:r>
-                          <m:acc>
-                            <m:accPr>
-                              <m:chr m:val="⃗"/>
-                              <m:ctrlPr>
-                                <a:rPr lang="en-US" b="0" i="1" smtClean="0">
-                                  <a:solidFill>
-                                    <a:srgbClr val="FF0000"/>
-                                  </a:solidFill>
-                                  <a:latin typeface="Cambria Math" panose="02040503050406030204" pitchFamily="18" charset="0"/>
-                                  <a:cs typeface="Arial" panose="020B0604020202020204" pitchFamily="34" charset="0"/>
-                                </a:rPr>
-                              </m:ctrlPr>
-                            </m:accPr>
-                            <m:e>
-                              <m:r>
-                                <a:rPr lang="en-US" i="1" smtClean="0">
-                                  <a:solidFill>
-                                    <a:srgbClr val="FF0000"/>
-                                  </a:solidFill>
-                                  <a:latin typeface="Cambria Math" panose="02040503050406030204" pitchFamily="18" charset="0"/>
-                                  <a:cs typeface="Arial" panose="020B0604020202020204" pitchFamily="34" charset="0"/>
-                                </a:rPr>
-                                <m:t>𝐸</m:t>
-                              </m:r>
-                            </m:e>
-                          </m:acc>
-                        </m:oMath>
-                      </m:oMathPara>
-                    </a14:m>
-                    <a:endParaRPr lang="en-CA" dirty="0"/>
-                  </a:p>
-                </p:txBody>
-              </p:sp>
-            </mc:Choice>
-            <mc:Fallback>
-              <p:sp>
-                <p:nvSpPr>
-                  <p:cNvPr id="255" name="Rectangle 254">
-                    <a:extLst>
-                      <a:ext uri="{FF2B5EF4-FFF2-40B4-BE49-F238E27FC236}">
-                        <a16:creationId xmlns:a16="http://schemas.microsoft.com/office/drawing/2014/main" id="{2D374B11-BF89-3F48-A96E-E643CE3312AC}"/>
-                      </a:ext>
-                    </a:extLst>
-                  </p:cNvPr>
-                  <p:cNvSpPr>
-                    <a:spLocks noRot="1" noChangeAspect="1" noMove="1" noResize="1" noEditPoints="1" noAdjustHandles="1" noChangeArrowheads="1" noChangeShapeType="1" noTextEdit="1"/>
-                  </p:cNvSpPr>
-                  <p:nvPr/>
-                </p:nvSpPr>
-                <p:spPr>
-                  <a:xfrm>
-                    <a:off x="11264353" y="4807643"/>
-                    <a:ext cx="531235" cy="402931"/>
-                  </a:xfrm>
-                  <a:prstGeom prst="rect">
-                    <a:avLst/>
-                  </a:prstGeom>
-                  <a:blipFill>
-                    <a:blip r:embed="rId55"/>
-                    <a:stretch>
-                      <a:fillRect/>
-                    </a:stretch>
-                  </a:blipFill>
-                </p:spPr>
-                <p:txBody>
-                  <a:bodyPr/>
-                  <a:lstStyle/>
-                  <a:p>
-                    <a:r>
-                      <a:rPr lang="en-US">
-                        <a:noFill/>
-                      </a:rPr>
-                      <a:t> </a:t>
-                    </a:r>
-                  </a:p>
-                </p:txBody>
-              </p:sp>
-            </mc:Fallback>
-          </mc:AlternateContent>
-        </p:grpSp>
-        <p:cxnSp>
-          <p:nvCxnSpPr>
-            <p:cNvPr id="260" name="Straight Arrow Connector 259">
-              <a:extLst>
-                <a:ext uri="{FF2B5EF4-FFF2-40B4-BE49-F238E27FC236}">
-                  <a16:creationId xmlns:a16="http://schemas.microsoft.com/office/drawing/2014/main" id="{B6FEB149-9261-414B-8471-56DD9F1B18B2}"/>
-                </a:ext>
-              </a:extLst>
-            </p:cNvPr>
-            <p:cNvCxnSpPr/>
-            <p:nvPr/>
-          </p:nvCxnSpPr>
-          <p:spPr>
-            <a:xfrm>
-              <a:off x="9235556" y="4602332"/>
-              <a:ext cx="717417" cy="0"/>
-            </a:xfrm>
-            <a:prstGeom prst="straightConnector1">
-              <a:avLst/>
-            </a:prstGeom>
-            <a:ln w="76200">
-              <a:solidFill>
-                <a:schemeClr val="tx1"/>
-              </a:solidFill>
-              <a:tailEnd type="triangle"/>
-            </a:ln>
-          </p:spPr>
-          <p:style>
-            <a:lnRef idx="1">
-              <a:schemeClr val="accent1"/>
-            </a:lnRef>
-            <a:fillRef idx="0">
-              <a:schemeClr val="accent1"/>
-            </a:fillRef>
-            <a:effectRef idx="0">
-              <a:schemeClr val="accent1"/>
-            </a:effectRef>
-            <a:fontRef idx="minor">
-              <a:schemeClr val="tx1"/>
-            </a:fontRef>
-          </p:style>
-        </p:cxnSp>
       </p:grpSp>
     </p:spTree>
     <p:extLst>

</xml_diff>